<commit_message>
slides ready for intro
</commit_message>
<xml_diff>
--- a/slides/00_environnement.pptx
+++ b/slides/00_environnement.pptx
@@ -20,12 +20,11 @@
     <p:sldId id="264" r:id="rId14"/>
     <p:sldId id="269" r:id="rId15"/>
     <p:sldId id="270" r:id="rId16"/>
-    <p:sldId id="271" r:id="rId17"/>
-    <p:sldId id="272" r:id="rId18"/>
+    <p:sldId id="272" r:id="rId17"/>
+    <p:sldId id="271" r:id="rId18"/>
     <p:sldId id="273" r:id="rId19"/>
     <p:sldId id="274" r:id="rId20"/>
-    <p:sldId id="275" r:id="rId21"/>
-    <p:sldId id="257" r:id="rId22"/>
+    <p:sldId id="257" r:id="rId21"/>
   </p:sldIdLst>
   <p:sldSz cx="12192000" cy="6858000"/>
   <p:notesSz cx="6858000" cy="9144000"/>
@@ -124,13 +123,18 @@
       </a:defRPr>
     </a:lvl9pPr>
   </p:defaultTextStyle>
+  <p:extLst>
+    <p:ext uri="{EFAFB233-063F-42B5-8137-9DF3F51BA10A}">
+      <p15:sldGuideLst xmlns:p15="http://schemas.microsoft.com/office/powerpoint/2012/main"/>
+    </p:ext>
+  </p:extLst>
 </p:presentation>
 </file>
 
 <file path=ppt/revisionInfo.xml><?xml version="1.0" encoding="utf-8"?>
 <p1510:revInfo xmlns:a="http://schemas.openxmlformats.org/drawingml/2006/main" xmlns:r="http://schemas.openxmlformats.org/officeDocument/2006/relationships" xmlns:p1510="http://schemas.microsoft.com/office/powerpoint/2015/10/main">
   <p1510:revLst>
-    <p1510:client id="{B8A90832-4B41-452F-A051-2485BD22C815}" v="189" dt="2020-04-05T21:13:11.677"/>
+    <p1510:client id="{B8A90832-4B41-452F-A051-2485BD22C815}" v="235" dt="2020-04-05T22:01:30.375"/>
   </p1510:revLst>
 </p1510:revInfo>
 </file>
@@ -139,8 +143,8 @@
 <pc:chgInfo xmlns:a="http://schemas.openxmlformats.org/drawingml/2006/main" xmlns:r="http://schemas.openxmlformats.org/officeDocument/2006/relationships" xmlns:ac="http://schemas.microsoft.com/office/drawing/2013/main/command" xmlns:pc="http://schemas.microsoft.com/office/powerpoint/2013/main/command">
   <pc:docChgLst>
     <pc:chgData name="Laurent Prud'hon" userId="196f0b5afced95ca" providerId="LiveId" clId="{B8A90832-4B41-452F-A051-2485BD22C815}"/>
-    <pc:docChg chg="undo custSel addSld modSld sldOrd">
-      <pc:chgData name="Laurent Prud'hon" userId="196f0b5afced95ca" providerId="LiveId" clId="{B8A90832-4B41-452F-A051-2485BD22C815}" dt="2020-04-05T21:13:15.117" v="1427" actId="14100"/>
+    <pc:docChg chg="undo custSel addSld delSld modSld sldOrd">
+      <pc:chgData name="Laurent Prud'hon" userId="196f0b5afced95ca" providerId="LiveId" clId="{B8A90832-4B41-452F-A051-2485BD22C815}" dt="2020-04-05T22:00:36.171" v="2572" actId="14100"/>
       <pc:docMkLst>
         <pc:docMk/>
       </pc:docMkLst>
@@ -341,7 +345,7 @@
         </pc:picChg>
       </pc:sldChg>
       <pc:sldChg chg="addSp modSp add">
-        <pc:chgData name="Laurent Prud'hon" userId="196f0b5afced95ca" providerId="LiveId" clId="{B8A90832-4B41-452F-A051-2485BD22C815}" dt="2020-04-05T09:24:20.495" v="123" actId="1076"/>
+        <pc:chgData name="Laurent Prud'hon" userId="196f0b5afced95ca" providerId="LiveId" clId="{B8A90832-4B41-452F-A051-2485BD22C815}" dt="2020-04-05T21:33:05.733" v="1747" actId="1076"/>
         <pc:sldMkLst>
           <pc:docMk/>
           <pc:sldMk cId="3789365396" sldId="260"/>
@@ -355,7 +359,7 @@
           </ac:spMkLst>
         </pc:spChg>
         <pc:spChg chg="add mod">
-          <ac:chgData name="Laurent Prud'hon" userId="196f0b5afced95ca" providerId="LiveId" clId="{B8A90832-4B41-452F-A051-2485BD22C815}" dt="2020-04-05T09:22:52.362" v="98"/>
+          <ac:chgData name="Laurent Prud'hon" userId="196f0b5afced95ca" providerId="LiveId" clId="{B8A90832-4B41-452F-A051-2485BD22C815}" dt="2020-04-05T21:33:05.733" v="1747" actId="1076"/>
           <ac:spMkLst>
             <pc:docMk/>
             <pc:sldMk cId="3789365396" sldId="260"/>
@@ -363,7 +367,7 @@
           </ac:spMkLst>
         </pc:spChg>
         <pc:spChg chg="add mod">
-          <ac:chgData name="Laurent Prud'hon" userId="196f0b5afced95ca" providerId="LiveId" clId="{B8A90832-4B41-452F-A051-2485BD22C815}" dt="2020-04-05T09:23:43.608" v="114" actId="1076"/>
+          <ac:chgData name="Laurent Prud'hon" userId="196f0b5afced95ca" providerId="LiveId" clId="{B8A90832-4B41-452F-A051-2485BD22C815}" dt="2020-04-05T21:33:05.733" v="1747" actId="1076"/>
           <ac:spMkLst>
             <pc:docMk/>
             <pc:sldMk cId="3789365396" sldId="260"/>
@@ -371,7 +375,7 @@
           </ac:spMkLst>
         </pc:spChg>
         <pc:spChg chg="add mod">
-          <ac:chgData name="Laurent Prud'hon" userId="196f0b5afced95ca" providerId="LiveId" clId="{B8A90832-4B41-452F-A051-2485BD22C815}" dt="2020-04-05T09:24:04.349" v="118" actId="1076"/>
+          <ac:chgData name="Laurent Prud'hon" userId="196f0b5afced95ca" providerId="LiveId" clId="{B8A90832-4B41-452F-A051-2485BD22C815}" dt="2020-04-05T21:33:05.733" v="1747" actId="1076"/>
           <ac:spMkLst>
             <pc:docMk/>
             <pc:sldMk cId="3789365396" sldId="260"/>
@@ -379,7 +383,7 @@
           </ac:spMkLst>
         </pc:spChg>
         <pc:picChg chg="add mod">
-          <ac:chgData name="Laurent Prud'hon" userId="196f0b5afced95ca" providerId="LiveId" clId="{B8A90832-4B41-452F-A051-2485BD22C815}" dt="2020-04-05T09:24:20.495" v="123" actId="1076"/>
+          <ac:chgData name="Laurent Prud'hon" userId="196f0b5afced95ca" providerId="LiveId" clId="{B8A90832-4B41-452F-A051-2485BD22C815}" dt="2020-04-05T21:33:05.733" v="1747" actId="1076"/>
           <ac:picMkLst>
             <pc:docMk/>
             <pc:sldMk cId="3789365396" sldId="260"/>
@@ -387,7 +391,7 @@
           </ac:picMkLst>
         </pc:picChg>
         <pc:picChg chg="add mod">
-          <ac:chgData name="Laurent Prud'hon" userId="196f0b5afced95ca" providerId="LiveId" clId="{B8A90832-4B41-452F-A051-2485BD22C815}" dt="2020-04-05T09:24:17.668" v="122" actId="1076"/>
+          <ac:chgData name="Laurent Prud'hon" userId="196f0b5afced95ca" providerId="LiveId" clId="{B8A90832-4B41-452F-A051-2485BD22C815}" dt="2020-04-05T21:33:05.733" v="1747" actId="1076"/>
           <ac:picMkLst>
             <pc:docMk/>
             <pc:sldMk cId="3789365396" sldId="260"/>
@@ -396,7 +400,7 @@
         </pc:picChg>
       </pc:sldChg>
       <pc:sldChg chg="addSp modSp add">
-        <pc:chgData name="Laurent Prud'hon" userId="196f0b5afced95ca" providerId="LiveId" clId="{B8A90832-4B41-452F-A051-2485BD22C815}" dt="2020-04-05T09:25:17.847" v="132" actId="1076"/>
+        <pc:chgData name="Laurent Prud'hon" userId="196f0b5afced95ca" providerId="LiveId" clId="{B8A90832-4B41-452F-A051-2485BD22C815}" dt="2020-04-05T21:59:11.240" v="2497" actId="1076"/>
         <pc:sldMkLst>
           <pc:docMk/>
           <pc:sldMk cId="1918366983" sldId="261"/>
@@ -410,7 +414,7 @@
           </ac:spMkLst>
         </pc:spChg>
         <pc:picChg chg="add mod">
-          <ac:chgData name="Laurent Prud'hon" userId="196f0b5afced95ca" providerId="LiveId" clId="{B8A90832-4B41-452F-A051-2485BD22C815}" dt="2020-04-05T09:25:13.427" v="131" actId="1076"/>
+          <ac:chgData name="Laurent Prud'hon" userId="196f0b5afced95ca" providerId="LiveId" clId="{B8A90832-4B41-452F-A051-2485BD22C815}" dt="2020-04-05T21:59:11.240" v="2497" actId="1076"/>
           <ac:picMkLst>
             <pc:docMk/>
             <pc:sldMk cId="1918366983" sldId="261"/>
@@ -419,7 +423,7 @@
         </pc:picChg>
       </pc:sldChg>
       <pc:sldChg chg="addSp modSp add">
-        <pc:chgData name="Laurent Prud'hon" userId="196f0b5afced95ca" providerId="LiveId" clId="{B8A90832-4B41-452F-A051-2485BD22C815}" dt="2020-04-05T09:27:23.994" v="157" actId="1076"/>
+        <pc:chgData name="Laurent Prud'hon" userId="196f0b5afced95ca" providerId="LiveId" clId="{B8A90832-4B41-452F-A051-2485BD22C815}" dt="2020-04-05T21:58:42.915" v="2494" actId="20577"/>
         <pc:sldMkLst>
           <pc:docMk/>
           <pc:sldMk cId="3887360170" sldId="262"/>
@@ -441,7 +445,7 @@
           </ac:spMkLst>
         </pc:spChg>
         <pc:spChg chg="add mod">
-          <ac:chgData name="Laurent Prud'hon" userId="196f0b5afced95ca" providerId="LiveId" clId="{B8A90832-4B41-452F-A051-2485BD22C815}" dt="2020-04-05T09:27:23.994" v="157" actId="1076"/>
+          <ac:chgData name="Laurent Prud'hon" userId="196f0b5afced95ca" providerId="LiveId" clId="{B8A90832-4B41-452F-A051-2485BD22C815}" dt="2020-04-05T21:58:42.915" v="2494" actId="20577"/>
           <ac:spMkLst>
             <pc:docMk/>
             <pc:sldMk cId="3887360170" sldId="262"/>
@@ -474,7 +478,7 @@
         </pc:picChg>
       </pc:sldChg>
       <pc:sldChg chg="addSp delSp modSp add ord">
-        <pc:chgData name="Laurent Prud'hon" userId="196f0b5afced95ca" providerId="LiveId" clId="{B8A90832-4B41-452F-A051-2485BD22C815}" dt="2020-04-05T09:39:06.552" v="214"/>
+        <pc:chgData name="Laurent Prud'hon" userId="196f0b5afced95ca" providerId="LiveId" clId="{B8A90832-4B41-452F-A051-2485BD22C815}" dt="2020-04-05T21:56:38.471" v="2448" actId="403"/>
         <pc:sldMkLst>
           <pc:docMk/>
           <pc:sldMk cId="900786518" sldId="263"/>
@@ -488,7 +492,7 @@
           </ac:spMkLst>
         </pc:spChg>
         <pc:spChg chg="add mod">
-          <ac:chgData name="Laurent Prud'hon" userId="196f0b5afced95ca" providerId="LiveId" clId="{B8A90832-4B41-452F-A051-2485BD22C815}" dt="2020-04-05T09:38:47.147" v="212" actId="1076"/>
+          <ac:chgData name="Laurent Prud'hon" userId="196f0b5afced95ca" providerId="LiveId" clId="{B8A90832-4B41-452F-A051-2485BD22C815}" dt="2020-04-05T21:56:38.471" v="2448" actId="403"/>
           <ac:spMkLst>
             <pc:docMk/>
             <pc:sldMk cId="900786518" sldId="263"/>
@@ -537,7 +541,7 @@
         </pc:picChg>
       </pc:sldChg>
       <pc:sldChg chg="addSp delSp modSp add">
-        <pc:chgData name="Laurent Prud'hon" userId="196f0b5afced95ca" providerId="LiveId" clId="{B8A90832-4B41-452F-A051-2485BD22C815}" dt="2020-04-05T20:52:06.450" v="1306" actId="20577"/>
+        <pc:chgData name="Laurent Prud'hon" userId="196f0b5afced95ca" providerId="LiveId" clId="{B8A90832-4B41-452F-A051-2485BD22C815}" dt="2020-04-05T21:27:21.836" v="1585" actId="1076"/>
         <pc:sldMkLst>
           <pc:docMk/>
           <pc:sldMk cId="2924811495" sldId="264"/>
@@ -550,23 +554,63 @@
             <ac:spMk id="2" creationId="{1EC0355F-BC4A-44B9-9CE1-B33F2C5AD421}"/>
           </ac:spMkLst>
         </pc:spChg>
-        <pc:spChg chg="add mod">
-          <ac:chgData name="Laurent Prud'hon" userId="196f0b5afced95ca" providerId="LiveId" clId="{B8A90832-4B41-452F-A051-2485BD22C815}" dt="2020-04-05T20:52:06.450" v="1306" actId="20577"/>
+        <pc:spChg chg="add del mod">
+          <ac:chgData name="Laurent Prud'hon" userId="196f0b5afced95ca" providerId="LiveId" clId="{B8A90832-4B41-452F-A051-2485BD22C815}" dt="2020-04-05T21:25:43.272" v="1566" actId="478"/>
+          <ac:spMkLst>
+            <pc:docMk/>
+            <pc:sldMk cId="2924811495" sldId="264"/>
+            <ac:spMk id="2" creationId="{9D44D334-961B-4418-B5EF-5DEA9D23606F}"/>
+          </ac:spMkLst>
+        </pc:spChg>
+        <pc:spChg chg="add del mod">
+          <ac:chgData name="Laurent Prud'hon" userId="196f0b5afced95ca" providerId="LiveId" clId="{B8A90832-4B41-452F-A051-2485BD22C815}" dt="2020-04-05T21:25:07.792" v="1518" actId="478"/>
           <ac:spMkLst>
             <pc:docMk/>
             <pc:sldMk cId="2924811495" sldId="264"/>
             <ac:spMk id="3" creationId="{AF01AFEE-9A59-4464-8ED2-920C8348A865}"/>
           </ac:spMkLst>
         </pc:spChg>
+        <pc:spChg chg="add mod">
+          <ac:chgData name="Laurent Prud'hon" userId="196f0b5afced95ca" providerId="LiveId" clId="{B8A90832-4B41-452F-A051-2485BD22C815}" dt="2020-04-05T21:27:21.836" v="1585" actId="1076"/>
+          <ac:spMkLst>
+            <pc:docMk/>
+            <pc:sldMk cId="2924811495" sldId="264"/>
+            <ac:spMk id="5" creationId="{F2E2439F-03DF-41C9-8E82-963F7B853361}"/>
+          </ac:spMkLst>
+        </pc:spChg>
+        <pc:picChg chg="add mod">
+          <ac:chgData name="Laurent Prud'hon" userId="196f0b5afced95ca" providerId="LiveId" clId="{B8A90832-4B41-452F-A051-2485BD22C815}" dt="2020-04-05T21:27:17.800" v="1584" actId="1076"/>
+          <ac:picMkLst>
+            <pc:docMk/>
+            <pc:sldMk cId="2924811495" sldId="264"/>
+            <ac:picMk id="4" creationId="{E3D9017A-A59A-4F7B-BC32-0292D4930DD2}"/>
+          </ac:picMkLst>
+        </pc:picChg>
+        <pc:picChg chg="add del mod">
+          <ac:chgData name="Laurent Prud'hon" userId="196f0b5afced95ca" providerId="LiveId" clId="{B8A90832-4B41-452F-A051-2485BD22C815}" dt="2020-04-05T21:26:08.915" v="1579" actId="478"/>
+          <ac:picMkLst>
+            <pc:docMk/>
+            <pc:sldMk cId="2924811495" sldId="264"/>
+            <ac:picMk id="6" creationId="{C8230324-0DB2-46AB-989B-217622E60C10}"/>
+          </ac:picMkLst>
+        </pc:picChg>
+        <pc:picChg chg="add mod">
+          <ac:chgData name="Laurent Prud'hon" userId="196f0b5afced95ca" providerId="LiveId" clId="{B8A90832-4B41-452F-A051-2485BD22C815}" dt="2020-04-05T21:27:14.059" v="1583" actId="14100"/>
+          <ac:picMkLst>
+            <pc:docMk/>
+            <pc:sldMk cId="2924811495" sldId="264"/>
+            <ac:picMk id="7" creationId="{79B8B5EF-7541-4707-9684-4C378AC6A6A8}"/>
+          </ac:picMkLst>
+        </pc:picChg>
       </pc:sldChg>
       <pc:sldChg chg="addSp delSp modSp add ord">
-        <pc:chgData name="Laurent Prud'hon" userId="196f0b5afced95ca" providerId="LiveId" clId="{B8A90832-4B41-452F-A051-2485BD22C815}" dt="2020-04-05T20:47:57.286" v="1267" actId="1076"/>
+        <pc:chgData name="Laurent Prud'hon" userId="196f0b5afced95ca" providerId="LiveId" clId="{B8A90832-4B41-452F-A051-2485BD22C815}" dt="2020-04-05T21:32:41.412" v="1746" actId="20577"/>
         <pc:sldMkLst>
           <pc:docMk/>
           <pc:sldMk cId="2550401579" sldId="265"/>
         </pc:sldMkLst>
         <pc:spChg chg="add mod">
-          <ac:chgData name="Laurent Prud'hon" userId="196f0b5afced95ca" providerId="LiveId" clId="{B8A90832-4B41-452F-A051-2485BD22C815}" dt="2020-04-05T20:43:32.857" v="1217" actId="20577"/>
+          <ac:chgData name="Laurent Prud'hon" userId="196f0b5afced95ca" providerId="LiveId" clId="{B8A90832-4B41-452F-A051-2485BD22C815}" dt="2020-04-05T21:32:41.412" v="1746" actId="20577"/>
           <ac:spMkLst>
             <pc:docMk/>
             <pc:sldMk cId="2550401579" sldId="265"/>
@@ -631,13 +675,13 @@
         </pc:picChg>
       </pc:sldChg>
       <pc:sldChg chg="addSp delSp modSp add ord">
-        <pc:chgData name="Laurent Prud'hon" userId="196f0b5afced95ca" providerId="LiveId" clId="{B8A90832-4B41-452F-A051-2485BD22C815}" dt="2020-04-05T20:59:37.345" v="1337" actId="1076"/>
+        <pc:chgData name="Laurent Prud'hon" userId="196f0b5afced95ca" providerId="LiveId" clId="{B8A90832-4B41-452F-A051-2485BD22C815}" dt="2020-04-05T21:22:15.454" v="1496" actId="21"/>
         <pc:sldMkLst>
           <pc:docMk/>
           <pc:sldMk cId="786320717" sldId="266"/>
         </pc:sldMkLst>
-        <pc:spChg chg="add mod">
-          <ac:chgData name="Laurent Prud'hon" userId="196f0b5afced95ca" providerId="LiveId" clId="{B8A90832-4B41-452F-A051-2485BD22C815}" dt="2020-04-05T20:59:37.345" v="1337" actId="1076"/>
+        <pc:spChg chg="add del mod">
+          <ac:chgData name="Laurent Prud'hon" userId="196f0b5afced95ca" providerId="LiveId" clId="{B8A90832-4B41-452F-A051-2485BD22C815}" dt="2020-04-05T21:22:15.454" v="1496" actId="21"/>
           <ac:spMkLst>
             <pc:docMk/>
             <pc:sldMk cId="786320717" sldId="266"/>
@@ -660,8 +704,8 @@
             <ac:picMk id="2" creationId="{5B77200B-689A-4B62-ADF9-3A198CBF579D}"/>
           </ac:picMkLst>
         </pc:picChg>
-        <pc:picChg chg="add mod">
-          <ac:chgData name="Laurent Prud'hon" userId="196f0b5afced95ca" providerId="LiveId" clId="{B8A90832-4B41-452F-A051-2485BD22C815}" dt="2020-04-05T20:59:34.667" v="1336" actId="1076"/>
+        <pc:picChg chg="add del mod">
+          <ac:chgData name="Laurent Prud'hon" userId="196f0b5afced95ca" providerId="LiveId" clId="{B8A90832-4B41-452F-A051-2485BD22C815}" dt="2020-04-05T21:22:15.454" v="1496" actId="21"/>
           <ac:picMkLst>
             <pc:docMk/>
             <pc:sldMk cId="786320717" sldId="266"/>
@@ -677,14 +721,14 @@
           </ac:picMkLst>
         </pc:picChg>
       </pc:sldChg>
-      <pc:sldChg chg="addSp modSp add ord">
-        <pc:chgData name="Laurent Prud'hon" userId="196f0b5afced95ca" providerId="LiveId" clId="{B8A90832-4B41-452F-A051-2485BD22C815}" dt="2020-04-05T20:53:42.236" v="1315" actId="1076"/>
+      <pc:sldChg chg="addSp delSp modSp add ord">
+        <pc:chgData name="Laurent Prud'hon" userId="196f0b5afced95ca" providerId="LiveId" clId="{B8A90832-4B41-452F-A051-2485BD22C815}" dt="2020-04-05T21:58:17.863" v="2466" actId="20577"/>
         <pc:sldMkLst>
           <pc:docMk/>
           <pc:sldMk cId="1328184158" sldId="267"/>
         </pc:sldMkLst>
         <pc:spChg chg="add mod">
-          <ac:chgData name="Laurent Prud'hon" userId="196f0b5afced95ca" providerId="LiveId" clId="{B8A90832-4B41-452F-A051-2485BD22C815}" dt="2020-04-05T20:53:42.236" v="1315" actId="1076"/>
+          <ac:chgData name="Laurent Prud'hon" userId="196f0b5afced95ca" providerId="LiveId" clId="{B8A90832-4B41-452F-A051-2485BD22C815}" dt="2020-04-05T21:23:02.868" v="1505" actId="1076"/>
           <ac:spMkLst>
             <pc:docMk/>
             <pc:sldMk cId="1328184158" sldId="267"/>
@@ -692,15 +736,31 @@
           </ac:spMkLst>
         </pc:spChg>
         <pc:spChg chg="add mod">
-          <ac:chgData name="Laurent Prud'hon" userId="196f0b5afced95ca" providerId="LiveId" clId="{B8A90832-4B41-452F-A051-2485BD22C815}" dt="2020-04-05T20:53:42.236" v="1315" actId="1076"/>
+          <ac:chgData name="Laurent Prud'hon" userId="196f0b5afced95ca" providerId="LiveId" clId="{B8A90832-4B41-452F-A051-2485BD22C815}" dt="2020-04-05T21:58:17.863" v="2466" actId="20577"/>
           <ac:spMkLst>
             <pc:docMk/>
             <pc:sldMk cId="1328184158" sldId="267"/>
             <ac:spMk id="5" creationId="{DFD57008-E0BB-41F2-A697-33D543BBC6F4}"/>
           </ac:spMkLst>
         </pc:spChg>
-        <pc:picChg chg="add mod">
-          <ac:chgData name="Laurent Prud'hon" userId="196f0b5afced95ca" providerId="LiveId" clId="{B8A90832-4B41-452F-A051-2485BD22C815}" dt="2020-04-05T20:53:42.236" v="1315" actId="1076"/>
+        <pc:spChg chg="add mod ord">
+          <ac:chgData name="Laurent Prud'hon" userId="196f0b5afced95ca" providerId="LiveId" clId="{B8A90832-4B41-452F-A051-2485BD22C815}" dt="2020-04-05T21:30:32.550" v="1599" actId="1076"/>
+          <ac:spMkLst>
+            <pc:docMk/>
+            <pc:sldMk cId="1328184158" sldId="267"/>
+            <ac:spMk id="6" creationId="{3501C77D-F2DC-4CF2-9D30-C1B3D9322BC2}"/>
+          </ac:spMkLst>
+        </pc:spChg>
+        <pc:spChg chg="add mod ord">
+          <ac:chgData name="Laurent Prud'hon" userId="196f0b5afced95ca" providerId="LiveId" clId="{B8A90832-4B41-452F-A051-2485BD22C815}" dt="2020-04-05T21:30:38.262" v="1600" actId="1076"/>
+          <ac:spMkLst>
+            <pc:docMk/>
+            <pc:sldMk cId="1328184158" sldId="267"/>
+            <ac:spMk id="8" creationId="{AAC4D491-FD14-4EAB-9E76-CFA5900070F0}"/>
+          </ac:spMkLst>
+        </pc:spChg>
+        <pc:picChg chg="add del mod">
+          <ac:chgData name="Laurent Prud'hon" userId="196f0b5afced95ca" providerId="LiveId" clId="{B8A90832-4B41-452F-A051-2485BD22C815}" dt="2020-04-05T21:22:30.956" v="1499" actId="478"/>
           <ac:picMkLst>
             <pc:docMk/>
             <pc:sldMk cId="1328184158" sldId="267"/>
@@ -708,73 +768,361 @@
           </ac:picMkLst>
         </pc:picChg>
         <pc:picChg chg="add mod">
-          <ac:chgData name="Laurent Prud'hon" userId="196f0b5afced95ca" providerId="LiveId" clId="{B8A90832-4B41-452F-A051-2485BD22C815}" dt="2020-04-05T20:53:42.236" v="1315" actId="1076"/>
+          <ac:chgData name="Laurent Prud'hon" userId="196f0b5afced95ca" providerId="LiveId" clId="{B8A90832-4B41-452F-A051-2485BD22C815}" dt="2020-04-05T21:23:02.868" v="1505" actId="1076"/>
           <ac:picMkLst>
             <pc:docMk/>
             <pc:sldMk cId="1328184158" sldId="267"/>
             <ac:picMk id="3" creationId="{D085BC46-12AE-4CD8-B7BC-F96D1D878EEC}"/>
           </ac:picMkLst>
         </pc:picChg>
+        <pc:picChg chg="add mod ord">
+          <ac:chgData name="Laurent Prud'hon" userId="196f0b5afced95ca" providerId="LiveId" clId="{B8A90832-4B41-452F-A051-2485BD22C815}" dt="2020-04-05T21:30:07.426" v="1595" actId="1076"/>
+          <ac:picMkLst>
+            <pc:docMk/>
+            <pc:sldMk cId="1328184158" sldId="267"/>
+            <ac:picMk id="7" creationId="{97002550-09F4-4E58-9285-8A138EF5B58B}"/>
+          </ac:picMkLst>
+        </pc:picChg>
+        <pc:picChg chg="add mod">
+          <ac:chgData name="Laurent Prud'hon" userId="196f0b5afced95ca" providerId="LiveId" clId="{B8A90832-4B41-452F-A051-2485BD22C815}" dt="2020-04-05T21:30:14.883" v="1596" actId="1076"/>
+          <ac:picMkLst>
+            <pc:docMk/>
+            <pc:sldMk cId="1328184158" sldId="267"/>
+            <ac:picMk id="9" creationId="{B35BCDD9-0181-4233-B524-8FA5E4550F2B}"/>
+          </ac:picMkLst>
+        </pc:picChg>
       </pc:sldChg>
-      <pc:sldChg chg="addSp modSp add ord">
-        <pc:chgData name="Laurent Prud'hon" userId="196f0b5afced95ca" providerId="LiveId" clId="{B8A90832-4B41-452F-A051-2485BD22C815}" dt="2020-04-05T21:13:15.117" v="1427" actId="14100"/>
+      <pc:sldChg chg="addSp delSp modSp add ord">
+        <pc:chgData name="Laurent Prud'hon" userId="196f0b5afced95ca" providerId="LiveId" clId="{B8A90832-4B41-452F-A051-2485BD22C815}" dt="2020-04-05T22:00:17.680" v="2571" actId="20577"/>
         <pc:sldMkLst>
           <pc:docMk/>
           <pc:sldMk cId="2620422566" sldId="268"/>
         </pc:sldMkLst>
         <pc:spChg chg="add mod">
-          <ac:chgData name="Laurent Prud'hon" userId="196f0b5afced95ca" providerId="LiveId" clId="{B8A90832-4B41-452F-A051-2485BD22C815}" dt="2020-04-05T21:13:15.117" v="1427" actId="14100"/>
+          <ac:chgData name="Laurent Prud'hon" userId="196f0b5afced95ca" providerId="LiveId" clId="{B8A90832-4B41-452F-A051-2485BD22C815}" dt="2020-04-05T21:24:47.153" v="1516" actId="1076"/>
           <ac:spMkLst>
             <pc:docMk/>
             <pc:sldMk cId="2620422566" sldId="268"/>
             <ac:spMk id="2" creationId="{B588C30B-1E80-4C00-9A8A-FD42B89EBAFE}"/>
           </ac:spMkLst>
         </pc:spChg>
+        <pc:spChg chg="add mod">
+          <ac:chgData name="Laurent Prud'hon" userId="196f0b5afced95ca" providerId="LiveId" clId="{B8A90832-4B41-452F-A051-2485BD22C815}" dt="2020-04-05T22:00:17.680" v="2571" actId="20577"/>
+          <ac:spMkLst>
+            <pc:docMk/>
+            <pc:sldMk cId="2620422566" sldId="268"/>
+            <ac:spMk id="5" creationId="{60B09528-39D3-41FB-A9D8-52F8D16123EF}"/>
+          </ac:spMkLst>
+        </pc:spChg>
+        <pc:picChg chg="add mod">
+          <ac:chgData name="Laurent Prud'hon" userId="196f0b5afced95ca" providerId="LiveId" clId="{B8A90832-4B41-452F-A051-2485BD22C815}" dt="2020-04-05T21:24:51.876" v="1517" actId="1076"/>
+          <ac:picMkLst>
+            <pc:docMk/>
+            <pc:sldMk cId="2620422566" sldId="268"/>
+            <ac:picMk id="3" creationId="{F0B5A4B7-AF0B-4932-B0F5-555D678F8248}"/>
+          </ac:picMkLst>
+        </pc:picChg>
+        <pc:picChg chg="add del mod">
+          <ac:chgData name="Laurent Prud'hon" userId="196f0b5afced95ca" providerId="LiveId" clId="{B8A90832-4B41-452F-A051-2485BD22C815}" dt="2020-04-05T21:23:19.115" v="1506" actId="21"/>
+          <ac:picMkLst>
+            <pc:docMk/>
+            <pc:sldMk cId="2620422566" sldId="268"/>
+            <ac:picMk id="4" creationId="{FAFBD0C9-805B-4021-B53C-6AC3EF4D58B9}"/>
+          </ac:picMkLst>
+        </pc:picChg>
       </pc:sldChg>
-      <pc:sldChg chg="add">
-        <pc:chgData name="Laurent Prud'hon" userId="196f0b5afced95ca" providerId="LiveId" clId="{B8A90832-4B41-452F-A051-2485BD22C815}" dt="2020-04-05T09:11:20.964" v="14"/>
+      <pc:sldChg chg="addSp delSp modSp add">
+        <pc:chgData name="Laurent Prud'hon" userId="196f0b5afced95ca" providerId="LiveId" clId="{B8A90832-4B41-452F-A051-2485BD22C815}" dt="2020-04-05T22:00:36.171" v="2572" actId="14100"/>
         <pc:sldMkLst>
           <pc:docMk/>
           <pc:sldMk cId="2208473369" sldId="269"/>
         </pc:sldMkLst>
+        <pc:spChg chg="add mod">
+          <ac:chgData name="Laurent Prud'hon" userId="196f0b5afced95ca" providerId="LiveId" clId="{B8A90832-4B41-452F-A051-2485BD22C815}" dt="2020-04-05T21:32:12.378" v="1709" actId="20577"/>
+          <ac:spMkLst>
+            <pc:docMk/>
+            <pc:sldMk cId="2208473369" sldId="269"/>
+            <ac:spMk id="3" creationId="{ABF94ED0-716A-430A-8875-603B077198DB}"/>
+          </ac:spMkLst>
+        </pc:spChg>
+        <pc:spChg chg="add mod">
+          <ac:chgData name="Laurent Prud'hon" userId="196f0b5afced95ca" providerId="LiveId" clId="{B8A90832-4B41-452F-A051-2485BD22C815}" dt="2020-04-05T21:34:38.867" v="1785" actId="20577"/>
+          <ac:spMkLst>
+            <pc:docMk/>
+            <pc:sldMk cId="2208473369" sldId="269"/>
+            <ac:spMk id="5" creationId="{EE807081-8155-4DCA-A5BF-B4FD8553BB03}"/>
+          </ac:spMkLst>
+        </pc:spChg>
+        <pc:picChg chg="add mod">
+          <ac:chgData name="Laurent Prud'hon" userId="196f0b5afced95ca" providerId="LiveId" clId="{B8A90832-4B41-452F-A051-2485BD22C815}" dt="2020-04-05T21:29:15.015" v="1589" actId="1076"/>
+          <ac:picMkLst>
+            <pc:docMk/>
+            <pc:sldMk cId="2208473369" sldId="269"/>
+            <ac:picMk id="2" creationId="{89A35714-576F-436B-BE08-E70ACA291FFD}"/>
+          </ac:picMkLst>
+        </pc:picChg>
+        <pc:picChg chg="add mod">
+          <ac:chgData name="Laurent Prud'hon" userId="196f0b5afced95ca" providerId="LiveId" clId="{B8A90832-4B41-452F-A051-2485BD22C815}" dt="2020-04-05T21:31:45.780" v="1640" actId="1076"/>
+          <ac:picMkLst>
+            <pc:docMk/>
+            <pc:sldMk cId="2208473369" sldId="269"/>
+            <ac:picMk id="4" creationId="{D8C4225B-11CA-4B35-BD12-014EEDB5F6F0}"/>
+          </ac:picMkLst>
+        </pc:picChg>
+        <pc:picChg chg="add mod">
+          <ac:chgData name="Laurent Prud'hon" userId="196f0b5afced95ca" providerId="LiveId" clId="{B8A90832-4B41-452F-A051-2485BD22C815}" dt="2020-04-05T22:00:36.171" v="2572" actId="14100"/>
+          <ac:picMkLst>
+            <pc:docMk/>
+            <pc:sldMk cId="2208473369" sldId="269"/>
+            <ac:picMk id="6" creationId="{0B6C5042-5197-495C-8727-2F9672A649DA}"/>
+          </ac:picMkLst>
+        </pc:picChg>
+        <pc:picChg chg="add del mod">
+          <ac:chgData name="Laurent Prud'hon" userId="196f0b5afced95ca" providerId="LiveId" clId="{B8A90832-4B41-452F-A051-2485BD22C815}" dt="2020-04-05T21:35:29.958" v="1790" actId="21"/>
+          <ac:picMkLst>
+            <pc:docMk/>
+            <pc:sldMk cId="2208473369" sldId="269"/>
+            <ac:picMk id="7" creationId="{2299E386-8F99-4A41-A5E6-5E51CF563F5C}"/>
+          </ac:picMkLst>
+        </pc:picChg>
       </pc:sldChg>
-      <pc:sldChg chg="add">
-        <pc:chgData name="Laurent Prud'hon" userId="196f0b5afced95ca" providerId="LiveId" clId="{B8A90832-4B41-452F-A051-2485BD22C815}" dt="2020-04-05T09:11:21.464" v="15"/>
+      <pc:sldChg chg="addSp delSp modSp add">
+        <pc:chgData name="Laurent Prud'hon" userId="196f0b5afced95ca" providerId="LiveId" clId="{B8A90832-4B41-452F-A051-2485BD22C815}" dt="2020-04-05T21:42:06.191" v="2114" actId="1076"/>
         <pc:sldMkLst>
           <pc:docMk/>
           <pc:sldMk cId="3247643568" sldId="270"/>
         </pc:sldMkLst>
+        <pc:spChg chg="add mod">
+          <ac:chgData name="Laurent Prud'hon" userId="196f0b5afced95ca" providerId="LiveId" clId="{B8A90832-4B41-452F-A051-2485BD22C815}" dt="2020-04-05T21:42:01.170" v="2112" actId="1076"/>
+          <ac:spMkLst>
+            <pc:docMk/>
+            <pc:sldMk cId="3247643568" sldId="270"/>
+            <ac:spMk id="3" creationId="{8BE4C383-17E5-471D-A6DC-763D7CBBC42B}"/>
+          </ac:spMkLst>
+        </pc:spChg>
+        <pc:spChg chg="add mod">
+          <ac:chgData name="Laurent Prud'hon" userId="196f0b5afced95ca" providerId="LiveId" clId="{B8A90832-4B41-452F-A051-2485BD22C815}" dt="2020-04-05T21:42:04.585" v="2113" actId="1076"/>
+          <ac:spMkLst>
+            <pc:docMk/>
+            <pc:sldMk cId="3247643568" sldId="270"/>
+            <ac:spMk id="6" creationId="{545AECD3-75FB-4898-B390-0F2D9EF582B9}"/>
+          </ac:spMkLst>
+        </pc:spChg>
+        <pc:picChg chg="add del mod">
+          <ac:chgData name="Laurent Prud'hon" userId="196f0b5afced95ca" providerId="LiveId" clId="{B8A90832-4B41-452F-A051-2485BD22C815}" dt="2020-04-05T21:37:55.293" v="1911" actId="478"/>
+          <ac:picMkLst>
+            <pc:docMk/>
+            <pc:sldMk cId="3247643568" sldId="270"/>
+            <ac:picMk id="2" creationId="{44A3E674-EDFF-486D-A554-B4206F0F1433}"/>
+          </ac:picMkLst>
+        </pc:picChg>
+        <pc:picChg chg="add del mod">
+          <ac:chgData name="Laurent Prud'hon" userId="196f0b5afced95ca" providerId="LiveId" clId="{B8A90832-4B41-452F-A051-2485BD22C815}" dt="2020-04-05T21:37:44.743" v="1909" actId="21"/>
+          <ac:picMkLst>
+            <pc:docMk/>
+            <pc:sldMk cId="3247643568" sldId="270"/>
+            <ac:picMk id="4" creationId="{04BA6C95-5833-4DDF-9E8C-4BDDBD43E702}"/>
+          </ac:picMkLst>
+        </pc:picChg>
+        <pc:picChg chg="add mod">
+          <ac:chgData name="Laurent Prud'hon" userId="196f0b5afced95ca" providerId="LiveId" clId="{B8A90832-4B41-452F-A051-2485BD22C815}" dt="2020-04-05T21:41:58.123" v="2111" actId="1076"/>
+          <ac:picMkLst>
+            <pc:docMk/>
+            <pc:sldMk cId="3247643568" sldId="270"/>
+            <ac:picMk id="5" creationId="{49DE5CC9-6C64-41DA-8B2F-CD4E2F3F5E7D}"/>
+          </ac:picMkLst>
+        </pc:picChg>
+        <pc:picChg chg="add mod">
+          <ac:chgData name="Laurent Prud'hon" userId="196f0b5afced95ca" providerId="LiveId" clId="{B8A90832-4B41-452F-A051-2485BD22C815}" dt="2020-04-05T21:42:06.191" v="2114" actId="1076"/>
+          <ac:picMkLst>
+            <pc:docMk/>
+            <pc:sldMk cId="3247643568" sldId="270"/>
+            <ac:picMk id="7" creationId="{C9EC0B8F-238C-4DC4-848B-692EE6BF775D}"/>
+          </ac:picMkLst>
+        </pc:picChg>
       </pc:sldChg>
-      <pc:sldChg chg="add">
-        <pc:chgData name="Laurent Prud'hon" userId="196f0b5afced95ca" providerId="LiveId" clId="{B8A90832-4B41-452F-A051-2485BD22C815}" dt="2020-04-05T09:11:21.651" v="16"/>
+      <pc:sldChg chg="addSp delSp modSp add">
+        <pc:chgData name="Laurent Prud'hon" userId="196f0b5afced95ca" providerId="LiveId" clId="{B8A90832-4B41-452F-A051-2485BD22C815}" dt="2020-04-05T21:48:03.240" v="2241" actId="1076"/>
         <pc:sldMkLst>
           <pc:docMk/>
           <pc:sldMk cId="1704384860" sldId="271"/>
         </pc:sldMkLst>
+        <pc:spChg chg="add mod">
+          <ac:chgData name="Laurent Prud'hon" userId="196f0b5afced95ca" providerId="LiveId" clId="{B8A90832-4B41-452F-A051-2485BD22C815}" dt="2020-04-05T21:37:22.858" v="1900" actId="20577"/>
+          <ac:spMkLst>
+            <pc:docMk/>
+            <pc:sldMk cId="1704384860" sldId="271"/>
+            <ac:spMk id="2" creationId="{9771AC74-F963-4D54-8D1B-4A6C89C67EEA}"/>
+          </ac:spMkLst>
+        </pc:spChg>
+        <pc:spChg chg="add mod">
+          <ac:chgData name="Laurent Prud'hon" userId="196f0b5afced95ca" providerId="LiveId" clId="{B8A90832-4B41-452F-A051-2485BD22C815}" dt="2020-04-05T21:47:50.133" v="2239" actId="20577"/>
+          <ac:spMkLst>
+            <pc:docMk/>
+            <pc:sldMk cId="1704384860" sldId="271"/>
+            <ac:spMk id="5" creationId="{0C09ECDB-0E91-4443-B118-4820FE331A9A}"/>
+          </ac:spMkLst>
+        </pc:spChg>
+        <pc:picChg chg="add del">
+          <ac:chgData name="Laurent Prud'hon" userId="196f0b5afced95ca" providerId="LiveId" clId="{B8A90832-4B41-452F-A051-2485BD22C815}" dt="2020-04-05T21:46:25.097" v="2158" actId="21"/>
+          <ac:picMkLst>
+            <pc:docMk/>
+            <pc:sldMk cId="1704384860" sldId="271"/>
+            <ac:picMk id="3" creationId="{2EF3818A-B3EC-4E79-B64C-849645339F6A}"/>
+          </ac:picMkLst>
+        </pc:picChg>
+        <pc:picChg chg="add mod">
+          <ac:chgData name="Laurent Prud'hon" userId="196f0b5afced95ca" providerId="LiveId" clId="{B8A90832-4B41-452F-A051-2485BD22C815}" dt="2020-04-05T21:48:03.240" v="2241" actId="1076"/>
+          <ac:picMkLst>
+            <pc:docMk/>
+            <pc:sldMk cId="1704384860" sldId="271"/>
+            <ac:picMk id="4" creationId="{1D3D14F0-AE40-4D6D-92D4-C07E4F65E404}"/>
+          </ac:picMkLst>
+        </pc:picChg>
       </pc:sldChg>
-      <pc:sldChg chg="add">
-        <pc:chgData name="Laurent Prud'hon" userId="196f0b5afced95ca" providerId="LiveId" clId="{B8A90832-4B41-452F-A051-2485BD22C815}" dt="2020-04-05T09:11:21.906" v="17"/>
+      <pc:sldChg chg="addSp delSp modSp add ord">
+        <pc:chgData name="Laurent Prud'hon" userId="196f0b5afced95ca" providerId="LiveId" clId="{B8A90832-4B41-452F-A051-2485BD22C815}" dt="2020-04-05T21:44:43.083" v="2156" actId="20577"/>
         <pc:sldMkLst>
           <pc:docMk/>
           <pc:sldMk cId="2604629836" sldId="272"/>
         </pc:sldMkLst>
+        <pc:spChg chg="add mod">
+          <ac:chgData name="Laurent Prud'hon" userId="196f0b5afced95ca" providerId="LiveId" clId="{B8A90832-4B41-452F-A051-2485BD22C815}" dt="2020-04-05T21:44:43.083" v="2156" actId="20577"/>
+          <ac:spMkLst>
+            <pc:docMk/>
+            <pc:sldMk cId="2604629836" sldId="272"/>
+            <ac:spMk id="5" creationId="{B7E04031-6708-469F-B359-0BA086888DDF}"/>
+          </ac:spMkLst>
+        </pc:spChg>
+        <pc:picChg chg="add del mod">
+          <ac:chgData name="Laurent Prud'hon" userId="196f0b5afced95ca" providerId="LiveId" clId="{B8A90832-4B41-452F-A051-2485BD22C815}" dt="2020-04-05T21:42:12.041" v="2116" actId="478"/>
+          <ac:picMkLst>
+            <pc:docMk/>
+            <pc:sldMk cId="2604629836" sldId="272"/>
+            <ac:picMk id="2" creationId="{1133E5E7-6ADF-495F-A4BD-FE7CE34EBDF2}"/>
+          </ac:picMkLst>
+        </pc:picChg>
+        <pc:picChg chg="add mod">
+          <ac:chgData name="Laurent Prud'hon" userId="196f0b5afced95ca" providerId="LiveId" clId="{B8A90832-4B41-452F-A051-2485BD22C815}" dt="2020-04-05T21:44:07.037" v="2125" actId="1076"/>
+          <ac:picMkLst>
+            <pc:docMk/>
+            <pc:sldMk cId="2604629836" sldId="272"/>
+            <ac:picMk id="3" creationId="{90336A8C-AF97-4CBA-8FA7-DC3222F65175}"/>
+          </ac:picMkLst>
+        </pc:picChg>
+        <pc:picChg chg="add mod">
+          <ac:chgData name="Laurent Prud'hon" userId="196f0b5afced95ca" providerId="LiveId" clId="{B8A90832-4B41-452F-A051-2485BD22C815}" dt="2020-04-05T21:44:09.728" v="2126" actId="1076"/>
+          <ac:picMkLst>
+            <pc:docMk/>
+            <pc:sldMk cId="2604629836" sldId="272"/>
+            <ac:picMk id="4" creationId="{E7A8C056-E030-41A1-AFEB-07F6730B9D06}"/>
+          </ac:picMkLst>
+        </pc:picChg>
       </pc:sldChg>
-      <pc:sldChg chg="add">
-        <pc:chgData name="Laurent Prud'hon" userId="196f0b5afced95ca" providerId="LiveId" clId="{B8A90832-4B41-452F-A051-2485BD22C815}" dt="2020-04-05T09:11:22.181" v="18"/>
+      <pc:sldChg chg="addSp delSp modSp add ord">
+        <pc:chgData name="Laurent Prud'hon" userId="196f0b5afced95ca" providerId="LiveId" clId="{B8A90832-4B41-452F-A051-2485BD22C815}" dt="2020-04-05T21:54:20.800" v="2366" actId="14100"/>
         <pc:sldMkLst>
           <pc:docMk/>
           <pc:sldMk cId="1965277440" sldId="273"/>
         </pc:sldMkLst>
+        <pc:spChg chg="add mod">
+          <ac:chgData name="Laurent Prud'hon" userId="196f0b5afced95ca" providerId="LiveId" clId="{B8A90832-4B41-452F-A051-2485BD22C815}" dt="2020-04-05T21:48:48.137" v="2322" actId="20577"/>
+          <ac:spMkLst>
+            <pc:docMk/>
+            <pc:sldMk cId="1965277440" sldId="273"/>
+            <ac:spMk id="3" creationId="{8C733B1C-16CC-404F-A268-10AF8F08424C}"/>
+          </ac:spMkLst>
+        </pc:spChg>
+        <pc:spChg chg="add mod">
+          <ac:chgData name="Laurent Prud'hon" userId="196f0b5afced95ca" providerId="LiveId" clId="{B8A90832-4B41-452F-A051-2485BD22C815}" dt="2020-04-05T21:53:36.872" v="2360" actId="14100"/>
+          <ac:spMkLst>
+            <pc:docMk/>
+            <pc:sldMk cId="1965277440" sldId="273"/>
+            <ac:spMk id="7" creationId="{B41E6A44-D44E-47BC-8C26-0A9B04BE5807}"/>
+          </ac:spMkLst>
+        </pc:spChg>
+        <pc:picChg chg="add del mod">
+          <ac:chgData name="Laurent Prud'hon" userId="196f0b5afced95ca" providerId="LiveId" clId="{B8A90832-4B41-452F-A051-2485BD22C815}" dt="2020-04-05T21:49:53.420" v="2326" actId="478"/>
+          <ac:picMkLst>
+            <pc:docMk/>
+            <pc:sldMk cId="1965277440" sldId="273"/>
+            <ac:picMk id="2" creationId="{B0E54CDF-7D57-44BE-A301-D90B246BADD7}"/>
+          </ac:picMkLst>
+        </pc:picChg>
+        <pc:picChg chg="add del mod">
+          <ac:chgData name="Laurent Prud'hon" userId="196f0b5afced95ca" providerId="LiveId" clId="{B8A90832-4B41-452F-A051-2485BD22C815}" dt="2020-04-05T21:50:44.607" v="2330" actId="21"/>
+          <ac:picMkLst>
+            <pc:docMk/>
+            <pc:sldMk cId="1965277440" sldId="273"/>
+            <ac:picMk id="4" creationId="{9809E3E5-40E8-4217-B4AC-8967E7E86488}"/>
+          </ac:picMkLst>
+        </pc:picChg>
+        <pc:picChg chg="add mod">
+          <ac:chgData name="Laurent Prud'hon" userId="196f0b5afced95ca" providerId="LiveId" clId="{B8A90832-4B41-452F-A051-2485BD22C815}" dt="2020-04-05T21:50:40.170" v="2328" actId="1076"/>
+          <ac:picMkLst>
+            <pc:docMk/>
+            <pc:sldMk cId="1965277440" sldId="273"/>
+            <ac:picMk id="5" creationId="{5BD3A0CA-E448-4438-9F28-A377701FBEDE}"/>
+          </ac:picMkLst>
+        </pc:picChg>
+        <pc:picChg chg="add del mod">
+          <ac:chgData name="Laurent Prud'hon" userId="196f0b5afced95ca" providerId="LiveId" clId="{B8A90832-4B41-452F-A051-2485BD22C815}" dt="2020-04-05T21:51:50.583" v="2333" actId="21"/>
+          <ac:picMkLst>
+            <pc:docMk/>
+            <pc:sldMk cId="1965277440" sldId="273"/>
+            <ac:picMk id="6" creationId="{A3702FD3-91DD-41B0-BD9C-DB5585F1EA9C}"/>
+          </ac:picMkLst>
+        </pc:picChg>
+        <pc:picChg chg="add mod">
+          <ac:chgData name="Laurent Prud'hon" userId="196f0b5afced95ca" providerId="LiveId" clId="{B8A90832-4B41-452F-A051-2485BD22C815}" dt="2020-04-05T21:54:20.800" v="2366" actId="14100"/>
+          <ac:picMkLst>
+            <pc:docMk/>
+            <pc:sldMk cId="1965277440" sldId="273"/>
+            <ac:picMk id="8" creationId="{C32486FF-D731-441B-AECF-0E2ACACE9560}"/>
+          </ac:picMkLst>
+        </pc:picChg>
       </pc:sldChg>
-      <pc:sldChg chg="add">
-        <pc:chgData name="Laurent Prud'hon" userId="196f0b5afced95ca" providerId="LiveId" clId="{B8A90832-4B41-452F-A051-2485BD22C815}" dt="2020-04-05T09:11:22.526" v="19"/>
+      <pc:sldChg chg="addSp modSp add">
+        <pc:chgData name="Laurent Prud'hon" userId="196f0b5afced95ca" providerId="LiveId" clId="{B8A90832-4B41-452F-A051-2485BD22C815}" dt="2020-04-05T21:55:34.742" v="2416" actId="1076"/>
         <pc:sldMkLst>
           <pc:docMk/>
           <pc:sldMk cId="2129542755" sldId="274"/>
         </pc:sldMkLst>
+        <pc:spChg chg="add mod">
+          <ac:chgData name="Laurent Prud'hon" userId="196f0b5afced95ca" providerId="LiveId" clId="{B8A90832-4B41-452F-A051-2485BD22C815}" dt="2020-04-05T21:54:59.731" v="2408" actId="20577"/>
+          <ac:spMkLst>
+            <pc:docMk/>
+            <pc:sldMk cId="2129542755" sldId="274"/>
+            <ac:spMk id="3" creationId="{DE9CC235-7543-4846-AE01-6C5704C642CF}"/>
+          </ac:spMkLst>
+        </pc:spChg>
+        <pc:spChg chg="add mod">
+          <ac:chgData name="Laurent Prud'hon" userId="196f0b5afced95ca" providerId="LiveId" clId="{B8A90832-4B41-452F-A051-2485BD22C815}" dt="2020-04-05T21:55:34.742" v="2416" actId="1076"/>
+          <ac:spMkLst>
+            <pc:docMk/>
+            <pc:sldMk cId="2129542755" sldId="274"/>
+            <ac:spMk id="5" creationId="{5B1C96BF-4700-4E8E-B2EB-70738F53B91A}"/>
+          </ac:spMkLst>
+        </pc:spChg>
+        <pc:picChg chg="add mod">
+          <ac:chgData name="Laurent Prud'hon" userId="196f0b5afced95ca" providerId="LiveId" clId="{B8A90832-4B41-452F-A051-2485BD22C815}" dt="2020-04-05T21:55:03.095" v="2409" actId="1076"/>
+          <ac:picMkLst>
+            <pc:docMk/>
+            <pc:sldMk cId="2129542755" sldId="274"/>
+            <ac:picMk id="2" creationId="{D7E9860F-2992-4CDB-9BFD-816935D789E2}"/>
+          </ac:picMkLst>
+        </pc:picChg>
+        <pc:picChg chg="add mod">
+          <ac:chgData name="Laurent Prud'hon" userId="196f0b5afced95ca" providerId="LiveId" clId="{B8A90832-4B41-452F-A051-2485BD22C815}" dt="2020-04-05T21:55:20.551" v="2414" actId="14100"/>
+          <ac:picMkLst>
+            <pc:docMk/>
+            <pc:sldMk cId="2129542755" sldId="274"/>
+            <ac:picMk id="4" creationId="{F5945831-AAC2-4FC9-B82C-E03D6B95DA47}"/>
+          </ac:picMkLst>
+        </pc:picChg>
       </pc:sldChg>
-      <pc:sldChg chg="add">
-        <pc:chgData name="Laurent Prud'hon" userId="196f0b5afced95ca" providerId="LiveId" clId="{B8A90832-4B41-452F-A051-2485BD22C815}" dt="2020-04-05T09:11:23.253" v="20"/>
+      <pc:sldChg chg="add del">
+        <pc:chgData name="Laurent Prud'hon" userId="196f0b5afced95ca" providerId="LiveId" clId="{B8A90832-4B41-452F-A051-2485BD22C815}" dt="2020-04-05T21:55:38.339" v="2417" actId="47"/>
         <pc:sldMkLst>
           <pc:docMk/>
           <pc:sldMk cId="3177583253" sldId="275"/>
@@ -922,6 +1270,13 @@
             <ac:picMk id="2072" creationId="{3E01D68F-FF00-4F78-A485-EBE35111E5B1}"/>
           </ac:picMkLst>
         </pc:picChg>
+      </pc:sldChg>
+      <pc:sldChg chg="add del">
+        <pc:chgData name="Laurent Prud'hon" userId="196f0b5afced95ca" providerId="LiveId" clId="{B8A90832-4B41-452F-A051-2485BD22C815}" dt="2020-04-05T21:37:42.286" v="1907"/>
+        <pc:sldMkLst>
+          <pc:docMk/>
+          <pc:sldMk cId="3518381646" sldId="277"/>
+        </pc:sldMkLst>
       </pc:sldChg>
     </pc:docChg>
   </pc:docChgLst>
@@ -4157,10 +4512,10 @@
           <p:nvPr/>
         </p:nvPicPr>
         <p:blipFill>
-          <a:blip r:embed="rId2">
+          <a:blip r:embed="rId2" cstate="email">
             <a:extLst>
               <a:ext uri="{28A0092B-C50C-407E-A947-70E740481C1C}">
-                <a14:useLocalDpi xmlns:a14="http://schemas.microsoft.com/office/drawing/2010/main" val="0"/>
+                <a14:useLocalDpi xmlns:a14="http://schemas.microsoft.com/office/drawing/2010/main"/>
               </a:ext>
             </a:extLst>
           </a:blip>
@@ -4204,10 +4559,10 @@
           <p:nvPr/>
         </p:nvPicPr>
         <p:blipFill>
-          <a:blip r:embed="rId3">
+          <a:blip r:embed="rId3" cstate="email">
             <a:extLst>
               <a:ext uri="{28A0092B-C50C-407E-A947-70E740481C1C}">
-                <a14:useLocalDpi xmlns:a14="http://schemas.microsoft.com/office/drawing/2010/main" val="0"/>
+                <a14:useLocalDpi xmlns:a14="http://schemas.microsoft.com/office/drawing/2010/main"/>
               </a:ext>
             </a:extLst>
           </a:blip>
@@ -4251,10 +4606,10 @@
           <p:nvPr/>
         </p:nvPicPr>
         <p:blipFill>
-          <a:blip r:embed="rId4">
+          <a:blip r:embed="rId4" cstate="email">
             <a:extLst>
               <a:ext uri="{28A0092B-C50C-407E-A947-70E740481C1C}">
-                <a14:useLocalDpi xmlns:a14="http://schemas.microsoft.com/office/drawing/2010/main" val="0"/>
+                <a14:useLocalDpi xmlns:a14="http://schemas.microsoft.com/office/drawing/2010/main"/>
               </a:ext>
             </a:extLst>
           </a:blip>
@@ -4373,10 +4728,10 @@
           <p:nvPr/>
         </p:nvPicPr>
         <p:blipFill>
-          <a:blip r:embed="rId5">
+          <a:blip r:embed="rId5" cstate="email">
             <a:extLst>
               <a:ext uri="{28A0092B-C50C-407E-A947-70E740481C1C}">
-                <a14:useLocalDpi xmlns:a14="http://schemas.microsoft.com/office/drawing/2010/main" val="0"/>
+                <a14:useLocalDpi xmlns:a14="http://schemas.microsoft.com/office/drawing/2010/main"/>
               </a:ext>
             </a:extLst>
           </a:blip>
@@ -4455,10 +4810,10 @@
           <p:nvPr/>
         </p:nvPicPr>
         <p:blipFill>
-          <a:blip r:embed="rId6">
+          <a:blip r:embed="rId6" cstate="email">
             <a:extLst>
               <a:ext uri="{28A0092B-C50C-407E-A947-70E740481C1C}">
-                <a14:useLocalDpi xmlns:a14="http://schemas.microsoft.com/office/drawing/2010/main" val="0"/>
+                <a14:useLocalDpi xmlns:a14="http://schemas.microsoft.com/office/drawing/2010/main"/>
               </a:ext>
             </a:extLst>
           </a:blip>
@@ -4502,10 +4857,10 @@
           <p:nvPr/>
         </p:nvPicPr>
         <p:blipFill>
-          <a:blip r:embed="rId7">
+          <a:blip r:embed="rId7" cstate="email">
             <a:extLst>
               <a:ext uri="{28A0092B-C50C-407E-A947-70E740481C1C}">
-                <a14:useLocalDpi xmlns:a14="http://schemas.microsoft.com/office/drawing/2010/main" val="0"/>
+                <a14:useLocalDpi xmlns:a14="http://schemas.microsoft.com/office/drawing/2010/main"/>
               </a:ext>
             </a:extLst>
           </a:blip>
@@ -4549,10 +4904,10 @@
           <p:nvPr/>
         </p:nvPicPr>
         <p:blipFill>
-          <a:blip r:embed="rId8">
+          <a:blip r:embed="rId8" cstate="email">
             <a:extLst>
               <a:ext uri="{28A0092B-C50C-407E-A947-70E740481C1C}">
-                <a14:useLocalDpi xmlns:a14="http://schemas.microsoft.com/office/drawing/2010/main" val="0"/>
+                <a14:useLocalDpi xmlns:a14="http://schemas.microsoft.com/office/drawing/2010/main"/>
               </a:ext>
             </a:extLst>
           </a:blip>
@@ -4596,10 +4951,10 @@
           <p:nvPr/>
         </p:nvPicPr>
         <p:blipFill>
-          <a:blip r:embed="rId9">
+          <a:blip r:embed="rId9" cstate="email">
             <a:extLst>
               <a:ext uri="{28A0092B-C50C-407E-A947-70E740481C1C}">
-                <a14:useLocalDpi xmlns:a14="http://schemas.microsoft.com/office/drawing/2010/main" val="0"/>
+                <a14:useLocalDpi xmlns:a14="http://schemas.microsoft.com/office/drawing/2010/main"/>
               </a:ext>
             </a:extLst>
           </a:blip>
@@ -4672,8 +5027,8 @@
         </p:nvSpPr>
         <p:spPr>
           <a:xfrm>
-            <a:off x="602310" y="468705"/>
-            <a:ext cx="8910658" cy="774507"/>
+            <a:off x="634393" y="1311335"/>
+            <a:ext cx="9985479" cy="774507"/>
           </a:xfrm>
           <a:prstGeom prst="rect">
             <a:avLst/>
@@ -4701,7 +5056,7 @@
                 <a:ea typeface="Calibri" panose="020F0502020204030204" pitchFamily="34" charset="0"/>
                 <a:cs typeface="Times New Roman" panose="02020603050405020304" pitchFamily="18" charset="0"/>
               </a:rPr>
-              <a:t>Saisir successivement les commandes suivantes :</a:t>
+              <a:t>Saisir la commande suivante (copier-coller par clic droit dans le Terminal) :</a:t>
             </a:r>
           </a:p>
           <a:p>
@@ -4722,6 +5077,84 @@
                 <a:cs typeface="Times New Roman" panose="02020603050405020304" pitchFamily="18" charset="0"/>
               </a:rPr>
               <a:t>git clone https://github.com/laurentprudhon/cours-deeplearning-2020.git</a:t>
+            </a:r>
+          </a:p>
+        </p:txBody>
+      </p:sp>
+      <p:pic>
+        <p:nvPicPr>
+          <p:cNvPr id="3" name="Image 2">
+            <a:extLst>
+              <a:ext uri="{FF2B5EF4-FFF2-40B4-BE49-F238E27FC236}">
+                <a16:creationId xmlns:a16="http://schemas.microsoft.com/office/drawing/2014/main" id="{F0B5A4B7-AF0B-4932-B0F5-555D678F8248}"/>
+              </a:ext>
+            </a:extLst>
+          </p:cNvPr>
+          <p:cNvPicPr>
+            <a:picLocks noChangeAspect="1"/>
+          </p:cNvPicPr>
+          <p:nvPr/>
+        </p:nvPicPr>
+        <p:blipFill>
+          <a:blip r:embed="rId2"/>
+          <a:stretch>
+            <a:fillRect/>
+          </a:stretch>
+        </p:blipFill>
+        <p:spPr>
+          <a:xfrm>
+            <a:off x="215017" y="2325260"/>
+            <a:ext cx="11761966" cy="2641646"/>
+          </a:xfrm>
+          <a:prstGeom prst="rect">
+            <a:avLst/>
+          </a:prstGeom>
+        </p:spPr>
+      </p:pic>
+      <p:sp>
+        <p:nvSpPr>
+          <p:cNvPr id="5" name="Rectangle 4">
+            <a:extLst>
+              <a:ext uri="{FF2B5EF4-FFF2-40B4-BE49-F238E27FC236}">
+                <a16:creationId xmlns:a16="http://schemas.microsoft.com/office/drawing/2014/main" id="{60B09528-39D3-41FB-A9D8-52F8D16123EF}"/>
+              </a:ext>
+            </a:extLst>
+          </p:cNvPr>
+          <p:cNvSpPr/>
+          <p:nvPr/>
+        </p:nvSpPr>
+        <p:spPr>
+          <a:xfrm>
+            <a:off x="634393" y="5546665"/>
+            <a:ext cx="9985479" cy="375552"/>
+          </a:xfrm>
+          <a:prstGeom prst="rect">
+            <a:avLst/>
+          </a:prstGeom>
+        </p:spPr>
+        <p:txBody>
+          <a:bodyPr wrap="square">
+            <a:spAutoFit/>
+          </a:bodyPr>
+          <a:lstStyle/>
+          <a:p>
+            <a:pPr marL="342900" lvl="0" indent="-342900">
+              <a:lnSpc>
+                <a:spcPct val="107000"/>
+              </a:lnSpc>
+              <a:spcAft>
+                <a:spcPts val="800"/>
+              </a:spcAft>
+              <a:buFont typeface="Wingdings" panose="05000000000000000000" pitchFamily="2" charset="2"/>
+              <a:buChar char=""/>
+            </a:pPr>
+            <a:r>
+              <a:rPr lang="fr-FR" dirty="0">
+                <a:latin typeface="Calibri" panose="020F0502020204030204" pitchFamily="34" charset="0"/>
+                <a:ea typeface="Calibri" panose="020F0502020204030204" pitchFamily="34" charset="0"/>
+                <a:cs typeface="Times New Roman" panose="02020603050405020304" pitchFamily="18" charset="0"/>
+              </a:rPr>
+              <a:t>Aller directement au slide 13 (sauter les deux slides suivants) </a:t>
             </a:r>
           </a:p>
         </p:txBody>
@@ -4797,7 +5230,7 @@
                 <a:ea typeface="Calibri" panose="020F0502020204030204" pitchFamily="34" charset="0"/>
                 <a:cs typeface="Times New Roman" panose="02020603050405020304" pitchFamily="18" charset="0"/>
               </a:rPr>
-              <a:t>2b.  Lancer la machine virtuelle à la reprise du travail</a:t>
+              <a:t>3.  Lancer la machine virtuelle à la reprise du travail</a:t>
             </a:r>
             <a:endParaRPr lang="fr-FR" sz="3200" dirty="0">
               <a:effectLst/>
@@ -4860,7 +5293,13 @@
           <p:nvPr/>
         </p:nvPicPr>
         <p:blipFill>
-          <a:blip r:embed="rId3"/>
+          <a:blip r:embed="rId3" cstate="email">
+            <a:extLst>
+              <a:ext uri="{28A0092B-C50C-407E-A947-70E740481C1C}">
+                <a14:useLocalDpi xmlns:a14="http://schemas.microsoft.com/office/drawing/2010/main"/>
+              </a:ext>
+            </a:extLst>
+          </a:blip>
           <a:stretch>
             <a:fillRect/>
           </a:stretch>
@@ -4955,10 +5394,10 @@
       </p:grpSpPr>
       <p:pic>
         <p:nvPicPr>
-          <p:cNvPr id="2" name="Image 1">
-            <a:extLst>
-              <a:ext uri="{FF2B5EF4-FFF2-40B4-BE49-F238E27FC236}">
-                <a16:creationId xmlns:a16="http://schemas.microsoft.com/office/drawing/2014/main" id="{6DFCA6B6-3D4B-477D-B19D-9F223982C8EA}"/>
+          <p:cNvPr id="3" name="Image 2">
+            <a:extLst>
+              <a:ext uri="{FF2B5EF4-FFF2-40B4-BE49-F238E27FC236}">
+                <a16:creationId xmlns:a16="http://schemas.microsoft.com/office/drawing/2014/main" id="{D085BC46-12AE-4CD8-B7BC-F96D1D878EEC}"/>
               </a:ext>
             </a:extLst>
           </p:cNvPr>
@@ -4966,7 +5405,7 @@
           <p:nvPr/>
         </p:nvPicPr>
         <p:blipFill>
-          <a:blip r:embed="rId2" cstate="print">
+          <a:blip r:embed="rId2" cstate="email">
             <a:extLst>
               <a:ext uri="{28A0092B-C50C-407E-A947-70E740481C1C}">
                 <a14:useLocalDpi xmlns:a14="http://schemas.microsoft.com/office/drawing/2010/main"/>
@@ -4979,48 +5418,14 @@
         </p:blipFill>
         <p:spPr>
           <a:xfrm>
-            <a:off x="905578" y="1416836"/>
-            <a:ext cx="6890886" cy="1064577"/>
+            <a:off x="905578" y="1171976"/>
+            <a:ext cx="6890886" cy="1052696"/>
           </a:xfrm>
           <a:prstGeom prst="rect">
             <a:avLst/>
           </a:prstGeom>
         </p:spPr>
       </p:pic>
-      <p:pic>
-        <p:nvPicPr>
-          <p:cNvPr id="3" name="Image 2">
-            <a:extLst>
-              <a:ext uri="{FF2B5EF4-FFF2-40B4-BE49-F238E27FC236}">
-                <a16:creationId xmlns:a16="http://schemas.microsoft.com/office/drawing/2014/main" id="{D085BC46-12AE-4CD8-B7BC-F96D1D878EEC}"/>
-              </a:ext>
-            </a:extLst>
-          </p:cNvPr>
-          <p:cNvPicPr/>
-          <p:nvPr/>
-        </p:nvPicPr>
-        <p:blipFill>
-          <a:blip r:embed="rId3" cstate="print">
-            <a:extLst>
-              <a:ext uri="{28A0092B-C50C-407E-A947-70E740481C1C}">
-                <a14:useLocalDpi xmlns:a14="http://schemas.microsoft.com/office/drawing/2010/main"/>
-              </a:ext>
-            </a:extLst>
-          </a:blip>
-          <a:stretch>
-            <a:fillRect/>
-          </a:stretch>
-        </p:blipFill>
-        <p:spPr>
-          <a:xfrm>
-            <a:off x="905578" y="3937235"/>
-            <a:ext cx="6890886" cy="1052696"/>
-          </a:xfrm>
-          <a:prstGeom prst="rect">
-            <a:avLst/>
-          </a:prstGeom>
-        </p:spPr>
-      </p:pic>
       <p:sp>
         <p:nvSpPr>
           <p:cNvPr id="4" name="Rectangle 3">
@@ -5035,7 +5440,7 @@
         </p:nvSpPr>
         <p:spPr>
           <a:xfrm>
-            <a:off x="1763279" y="2645996"/>
+            <a:off x="905578" y="608648"/>
             <a:ext cx="4751172" cy="375552"/>
           </a:xfrm>
           <a:prstGeom prst="rect">
@@ -5059,12 +5464,36 @@
               <a:buChar char=""/>
             </a:pPr>
             <a:r>
-              <a:rPr lang="fr-FR">
+              <a:rPr lang="fr-FR" dirty="0">
                 <a:latin typeface="Calibri" panose="020F0502020204030204" pitchFamily="34" charset="0"/>
                 <a:ea typeface="Calibri" panose="020F0502020204030204" pitchFamily="34" charset="0"/>
                 <a:cs typeface="Times New Roman" panose="02020603050405020304" pitchFamily="18" charset="0"/>
               </a:rPr>
-              <a:t>Attendre quelques secondes : Status Pending</a:t>
+              <a:t>Attendre quelques secondes : </a:t>
+            </a:r>
+            <a:r>
+              <a:rPr lang="fr-FR" dirty="0" err="1">
+                <a:latin typeface="Calibri" panose="020F0502020204030204" pitchFamily="34" charset="0"/>
+                <a:ea typeface="Calibri" panose="020F0502020204030204" pitchFamily="34" charset="0"/>
+                <a:cs typeface="Times New Roman" panose="02020603050405020304" pitchFamily="18" charset="0"/>
+              </a:rPr>
+              <a:t>Status</a:t>
+            </a:r>
+            <a:r>
+              <a:rPr lang="fr-FR" dirty="0">
+                <a:latin typeface="Calibri" panose="020F0502020204030204" pitchFamily="34" charset="0"/>
+                <a:ea typeface="Calibri" panose="020F0502020204030204" pitchFamily="34" charset="0"/>
+                <a:cs typeface="Times New Roman" panose="02020603050405020304" pitchFamily="18" charset="0"/>
+              </a:rPr>
+              <a:t> </a:t>
+            </a:r>
+            <a:r>
+              <a:rPr lang="fr-FR" dirty="0" err="1">
+                <a:latin typeface="Calibri" panose="020F0502020204030204" pitchFamily="34" charset="0"/>
+                <a:ea typeface="Calibri" panose="020F0502020204030204" pitchFamily="34" charset="0"/>
+                <a:cs typeface="Times New Roman" panose="02020603050405020304" pitchFamily="18" charset="0"/>
+              </a:rPr>
+              <a:t>Pending</a:t>
             </a:r>
             <a:endParaRPr lang="fr-FR" dirty="0">
               <a:latin typeface="Calibri" panose="020F0502020204030204" pitchFamily="34" charset="0"/>
@@ -5088,8 +5517,8 @@
         </p:nvSpPr>
         <p:spPr>
           <a:xfrm>
-            <a:off x="2193076" y="5209291"/>
-            <a:ext cx="3891578" cy="375552"/>
+            <a:off x="905578" y="2412448"/>
+            <a:ext cx="4719625" cy="375552"/>
           </a:xfrm>
           <a:prstGeom prst="rect">
             <a:avLst/>
@@ -5117,7 +5546,7 @@
                 <a:ea typeface="Calibri" panose="020F0502020204030204" pitchFamily="34" charset="0"/>
                 <a:cs typeface="Times New Roman" panose="02020603050405020304" pitchFamily="18" charset="0"/>
               </a:rPr>
-              <a:t>Notebook </a:t>
+              <a:t>Machine </a:t>
             </a:r>
             <a:r>
               <a:rPr lang="en-US" dirty="0" err="1">
@@ -5125,7 +5554,23 @@
                 <a:ea typeface="Calibri" panose="020F0502020204030204" pitchFamily="34" charset="0"/>
                 <a:cs typeface="Times New Roman" panose="02020603050405020304" pitchFamily="18" charset="0"/>
               </a:rPr>
-              <a:t>démarré</a:t>
+              <a:t>virtuelle</a:t>
+            </a:r>
+            <a:r>
+              <a:rPr lang="en-US" dirty="0">
+                <a:latin typeface="Calibri" panose="020F0502020204030204" pitchFamily="34" charset="0"/>
+                <a:ea typeface="Calibri" panose="020F0502020204030204" pitchFamily="34" charset="0"/>
+                <a:cs typeface="Times New Roman" panose="02020603050405020304" pitchFamily="18" charset="0"/>
+              </a:rPr>
+              <a:t> </a:t>
+            </a:r>
+            <a:r>
+              <a:rPr lang="en-US" dirty="0" err="1">
+                <a:latin typeface="Calibri" panose="020F0502020204030204" pitchFamily="34" charset="0"/>
+                <a:ea typeface="Calibri" panose="020F0502020204030204" pitchFamily="34" charset="0"/>
+                <a:cs typeface="Times New Roman" panose="02020603050405020304" pitchFamily="18" charset="0"/>
+              </a:rPr>
+              <a:t>démarrée</a:t>
             </a:r>
             <a:r>
               <a:rPr lang="en-US" dirty="0">
@@ -5140,6 +5585,168 @@
               <a:ea typeface="Calibri" panose="020F0502020204030204" pitchFamily="34" charset="0"/>
               <a:cs typeface="Times New Roman" panose="02020603050405020304" pitchFamily="18" charset="0"/>
             </a:endParaRPr>
+          </a:p>
+        </p:txBody>
+      </p:sp>
+      <p:pic>
+        <p:nvPicPr>
+          <p:cNvPr id="9" name="Image 8">
+            <a:extLst>
+              <a:ext uri="{FF2B5EF4-FFF2-40B4-BE49-F238E27FC236}">
+                <a16:creationId xmlns:a16="http://schemas.microsoft.com/office/drawing/2014/main" id="{B35BCDD9-0181-4233-B524-8FA5E4550F2B}"/>
+              </a:ext>
+            </a:extLst>
+          </p:cNvPr>
+          <p:cNvPicPr>
+            <a:picLocks noChangeAspect="1"/>
+          </p:cNvPicPr>
+          <p:nvPr/>
+        </p:nvPicPr>
+        <p:blipFill>
+          <a:blip r:embed="rId3" cstate="email">
+            <a:extLst>
+              <a:ext uri="{28A0092B-C50C-407E-A947-70E740481C1C}">
+                <a14:useLocalDpi xmlns:a14="http://schemas.microsoft.com/office/drawing/2010/main"/>
+              </a:ext>
+            </a:extLst>
+          </a:blip>
+          <a:stretch>
+            <a:fillRect/>
+          </a:stretch>
+        </p:blipFill>
+        <p:spPr>
+          <a:xfrm>
+            <a:off x="2486526" y="3530181"/>
+            <a:ext cx="9512968" cy="2867720"/>
+          </a:xfrm>
+          <a:prstGeom prst="rect">
+            <a:avLst/>
+          </a:prstGeom>
+        </p:spPr>
+      </p:pic>
+      <p:pic>
+        <p:nvPicPr>
+          <p:cNvPr id="7" name="Image 6">
+            <a:extLst>
+              <a:ext uri="{FF2B5EF4-FFF2-40B4-BE49-F238E27FC236}">
+                <a16:creationId xmlns:a16="http://schemas.microsoft.com/office/drawing/2014/main" id="{97002550-09F4-4E58-9285-8A138EF5B58B}"/>
+              </a:ext>
+            </a:extLst>
+          </p:cNvPr>
+          <p:cNvPicPr>
+            <a:picLocks noChangeAspect="1"/>
+          </p:cNvPicPr>
+          <p:nvPr/>
+        </p:nvPicPr>
+        <p:blipFill>
+          <a:blip r:embed="rId4"/>
+          <a:stretch>
+            <a:fillRect/>
+          </a:stretch>
+        </p:blipFill>
+        <p:spPr>
+          <a:xfrm>
+            <a:off x="1226948" y="2975776"/>
+            <a:ext cx="4629150" cy="2133600"/>
+          </a:xfrm>
+          <a:prstGeom prst="rect">
+            <a:avLst/>
+          </a:prstGeom>
+        </p:spPr>
+      </p:pic>
+      <p:sp>
+        <p:nvSpPr>
+          <p:cNvPr id="8" name="Rectangle 7">
+            <a:extLst>
+              <a:ext uri="{FF2B5EF4-FFF2-40B4-BE49-F238E27FC236}">
+                <a16:creationId xmlns:a16="http://schemas.microsoft.com/office/drawing/2014/main" id="{AAC4D491-FD14-4EAB-9E76-CFA5900070F0}"/>
+              </a:ext>
+            </a:extLst>
+          </p:cNvPr>
+          <p:cNvSpPr/>
+          <p:nvPr/>
+        </p:nvSpPr>
+        <p:spPr>
+          <a:xfrm>
+            <a:off x="3541523" y="6195414"/>
+            <a:ext cx="6096000" cy="375552"/>
+          </a:xfrm>
+          <a:prstGeom prst="rect">
+            <a:avLst/>
+          </a:prstGeom>
+        </p:spPr>
+        <p:txBody>
+          <a:bodyPr>
+            <a:spAutoFit/>
+          </a:bodyPr>
+          <a:lstStyle/>
+          <a:p>
+            <a:pPr marL="342900" lvl="0" indent="-342900">
+              <a:lnSpc>
+                <a:spcPct val="107000"/>
+              </a:lnSpc>
+              <a:spcAft>
+                <a:spcPts val="800"/>
+              </a:spcAft>
+              <a:buFont typeface="Wingdings" panose="05000000000000000000" pitchFamily="2" charset="2"/>
+              <a:buChar char=""/>
+            </a:pPr>
+            <a:r>
+              <a:rPr lang="fr-FR" dirty="0">
+                <a:latin typeface="Calibri" panose="020F0502020204030204" pitchFamily="34" charset="0"/>
+                <a:ea typeface="Calibri" panose="020F0502020204030204" pitchFamily="34" charset="0"/>
+                <a:cs typeface="Times New Roman" panose="02020603050405020304" pitchFamily="18" charset="0"/>
+              </a:rPr>
+              <a:t>Bouton New &gt; Terminal</a:t>
+            </a:r>
+          </a:p>
+        </p:txBody>
+      </p:sp>
+      <p:sp>
+        <p:nvSpPr>
+          <p:cNvPr id="6" name="Rectangle 5">
+            <a:extLst>
+              <a:ext uri="{FF2B5EF4-FFF2-40B4-BE49-F238E27FC236}">
+                <a16:creationId xmlns:a16="http://schemas.microsoft.com/office/drawing/2014/main" id="{3501C77D-F2DC-4CF2-9D30-C1B3D9322BC2}"/>
+              </a:ext>
+            </a:extLst>
+          </p:cNvPr>
+          <p:cNvSpPr/>
+          <p:nvPr/>
+        </p:nvSpPr>
+        <p:spPr>
+          <a:xfrm>
+            <a:off x="6096000" y="2981564"/>
+            <a:ext cx="4968861" cy="375552"/>
+          </a:xfrm>
+          <a:prstGeom prst="rect">
+            <a:avLst/>
+          </a:prstGeom>
+        </p:spPr>
+        <p:txBody>
+          <a:bodyPr wrap="none">
+            <a:spAutoFit/>
+          </a:bodyPr>
+          <a:lstStyle/>
+          <a:p>
+            <a:pPr marL="342900" lvl="0" indent="-342900">
+              <a:lnSpc>
+                <a:spcPct val="107000"/>
+              </a:lnSpc>
+              <a:spcAft>
+                <a:spcPts val="800"/>
+              </a:spcAft>
+              <a:buFont typeface="Wingdings" panose="05000000000000000000" pitchFamily="2" charset="2"/>
+              <a:buChar char=""/>
+            </a:pPr>
+            <a:r>
+              <a:rPr lang="fr-FR" dirty="0">
+                <a:latin typeface="Calibri" panose="020F0502020204030204" pitchFamily="34" charset="0"/>
+                <a:ea typeface="Calibri" panose="020F0502020204030204" pitchFamily="34" charset="0"/>
+                <a:cs typeface="Times New Roman" panose="02020603050405020304" pitchFamily="18" charset="0"/>
+              </a:rPr>
+              <a:t>Ouvrir le notebook : bouton « OPEN v2 (beta) »</a:t>
+            </a:r>
           </a:p>
         </p:txBody>
       </p:sp>
@@ -5173,58 +5780,182 @@
           <a:chExt cx="0" cy="0"/>
         </a:xfrm>
       </p:grpSpPr>
-      <p:sp>
-        <p:nvSpPr>
-          <p:cNvPr id="3" name="Rectangle 2">
-            <a:extLst>
-              <a:ext uri="{FF2B5EF4-FFF2-40B4-BE49-F238E27FC236}">
-                <a16:creationId xmlns:a16="http://schemas.microsoft.com/office/drawing/2014/main" id="{AF01AFEE-9A59-4464-8ED2-920C8348A865}"/>
-              </a:ext>
-            </a:extLst>
-          </p:cNvPr>
-          <p:cNvSpPr/>
+      <p:pic>
+        <p:nvPicPr>
+          <p:cNvPr id="4" name="Image 3">
+            <a:extLst>
+              <a:ext uri="{FF2B5EF4-FFF2-40B4-BE49-F238E27FC236}">
+                <a16:creationId xmlns:a16="http://schemas.microsoft.com/office/drawing/2014/main" id="{E3D9017A-A59A-4F7B-BC32-0292D4930DD2}"/>
+              </a:ext>
+            </a:extLst>
+          </p:cNvPr>
+          <p:cNvPicPr>
+            <a:picLocks noChangeAspect="1"/>
+          </p:cNvPicPr>
           <p:nvPr/>
-        </p:nvSpPr>
-        <p:spPr>
-          <a:xfrm>
-            <a:off x="351461" y="337603"/>
-            <a:ext cx="5853269" cy="595932"/>
+        </p:nvPicPr>
+        <p:blipFill>
+          <a:blip r:embed="rId2"/>
+          <a:stretch>
+            <a:fillRect/>
+          </a:stretch>
+        </p:blipFill>
+        <p:spPr>
+          <a:xfrm>
+            <a:off x="602309" y="2408470"/>
+            <a:ext cx="8835634" cy="2592948"/>
           </a:xfrm>
           <a:prstGeom prst="rect">
             <a:avLst/>
           </a:prstGeom>
         </p:spPr>
-        <p:txBody>
-          <a:bodyPr wrap="none">
+      </p:pic>
+      <p:sp>
+        <p:nvSpPr>
+          <p:cNvPr id="5" name="Rectangle 4">
+            <a:extLst>
+              <a:ext uri="{FF2B5EF4-FFF2-40B4-BE49-F238E27FC236}">
+                <a16:creationId xmlns:a16="http://schemas.microsoft.com/office/drawing/2014/main" id="{F2E2439F-03DF-41C9-8E82-963F7B853361}"/>
+              </a:ext>
+            </a:extLst>
+          </p:cNvPr>
+          <p:cNvSpPr/>
+          <p:nvPr/>
+        </p:nvSpPr>
+        <p:spPr>
+          <a:xfrm>
+            <a:off x="602309" y="613008"/>
+            <a:ext cx="9985479" cy="1572418"/>
+          </a:xfrm>
+          <a:prstGeom prst="rect">
+            <a:avLst/>
+          </a:prstGeom>
+        </p:spPr>
+        <p:txBody>
+          <a:bodyPr wrap="square">
             <a:spAutoFit/>
           </a:bodyPr>
           <a:lstStyle/>
           <a:p>
-            <a:pPr lvl="0">
+            <a:pPr marL="342900" lvl="0" indent="-342900">
               <a:lnSpc>
                 <a:spcPct val="107000"/>
               </a:lnSpc>
               <a:spcAft>
                 <a:spcPts val="800"/>
               </a:spcAft>
+              <a:buFont typeface="Wingdings" panose="05000000000000000000" pitchFamily="2" charset="2"/>
+              <a:buChar char=""/>
             </a:pPr>
             <a:r>
-              <a:rPr lang="fr-FR" sz="3200" b="1" dirty="0">
+              <a:rPr lang="fr-FR" dirty="0">
                 <a:latin typeface="Calibri" panose="020F0502020204030204" pitchFamily="34" charset="0"/>
                 <a:ea typeface="Calibri" panose="020F0502020204030204" pitchFamily="34" charset="0"/>
                 <a:cs typeface="Times New Roman" panose="02020603050405020304" pitchFamily="18" charset="0"/>
               </a:rPr>
-              <a:t>3.  Mettre à jour l’environnement</a:t>
-            </a:r>
-            <a:endParaRPr lang="fr-FR" sz="3200" dirty="0">
-              <a:effectLst/>
-              <a:latin typeface="Calibri" panose="020F0502020204030204" pitchFamily="34" charset="0"/>
-              <a:ea typeface="Calibri" panose="020F0502020204030204" pitchFamily="34" charset="0"/>
-              <a:cs typeface="Times New Roman" panose="02020603050405020304" pitchFamily="18" charset="0"/>
-            </a:endParaRPr>
-          </a:p>
-        </p:txBody>
-      </p:sp>
+              <a:t>Saisir successivement les commandes suivantes pour mettre à jour l’environnement :</a:t>
+            </a:r>
+          </a:p>
+          <a:p>
+            <a:pPr marL="342900" indent="-342900">
+              <a:lnSpc>
+                <a:spcPct val="107000"/>
+              </a:lnSpc>
+              <a:spcAft>
+                <a:spcPts val="800"/>
+              </a:spcAft>
+              <a:buFont typeface="Wingdings" panose="05000000000000000000" pitchFamily="2" charset="2"/>
+              <a:buChar char="§"/>
+            </a:pPr>
+            <a:r>
+              <a:rPr lang="fr-FR" dirty="0" err="1"/>
+              <a:t>pip</a:t>
+            </a:r>
+            <a:r>
+              <a:rPr lang="fr-FR" dirty="0"/>
+              <a:t> </a:t>
+            </a:r>
+            <a:r>
+              <a:rPr lang="fr-FR" dirty="0" err="1"/>
+              <a:t>install</a:t>
+            </a:r>
+            <a:r>
+              <a:rPr lang="fr-FR" dirty="0"/>
+              <a:t> fastai2 --upgrade</a:t>
+            </a:r>
+          </a:p>
+          <a:p>
+            <a:pPr marL="342900" lvl="0" indent="-342900">
+              <a:lnSpc>
+                <a:spcPct val="107000"/>
+              </a:lnSpc>
+              <a:spcAft>
+                <a:spcPts val="800"/>
+              </a:spcAft>
+              <a:buFont typeface="Wingdings" panose="05000000000000000000" pitchFamily="2" charset="2"/>
+              <a:buChar char="§"/>
+            </a:pPr>
+            <a:r>
+              <a:rPr lang="fr-FR" dirty="0">
+                <a:latin typeface="Calibri" panose="020F0502020204030204" pitchFamily="34" charset="0"/>
+                <a:ea typeface="Calibri" panose="020F0502020204030204" pitchFamily="34" charset="0"/>
+                <a:cs typeface="Times New Roman" panose="02020603050405020304" pitchFamily="18" charset="0"/>
+              </a:rPr>
+              <a:t>cd cours-deeplearning-2020</a:t>
+            </a:r>
+          </a:p>
+          <a:p>
+            <a:pPr marL="342900" lvl="0" indent="-342900">
+              <a:lnSpc>
+                <a:spcPct val="107000"/>
+              </a:lnSpc>
+              <a:spcAft>
+                <a:spcPts val="800"/>
+              </a:spcAft>
+              <a:buFont typeface="Wingdings" panose="05000000000000000000" pitchFamily="2" charset="2"/>
+              <a:buChar char="§"/>
+            </a:pPr>
+            <a:r>
+              <a:rPr lang="fr-FR" dirty="0">
+                <a:latin typeface="Calibri" panose="020F0502020204030204" pitchFamily="34" charset="0"/>
+                <a:ea typeface="Calibri" panose="020F0502020204030204" pitchFamily="34" charset="0"/>
+                <a:cs typeface="Times New Roman" panose="02020603050405020304" pitchFamily="18" charset="0"/>
+              </a:rPr>
+              <a:t>git pull</a:t>
+            </a:r>
+          </a:p>
+        </p:txBody>
+      </p:sp>
+      <p:pic>
+        <p:nvPicPr>
+          <p:cNvPr id="7" name="Image 6">
+            <a:extLst>
+              <a:ext uri="{FF2B5EF4-FFF2-40B4-BE49-F238E27FC236}">
+                <a16:creationId xmlns:a16="http://schemas.microsoft.com/office/drawing/2014/main" id="{79B8B5EF-7541-4707-9684-4C378AC6A6A8}"/>
+              </a:ext>
+            </a:extLst>
+          </p:cNvPr>
+          <p:cNvPicPr>
+            <a:picLocks noChangeAspect="1"/>
+          </p:cNvPicPr>
+          <p:nvPr/>
+        </p:nvPicPr>
+        <p:blipFill>
+          <a:blip r:embed="rId3"/>
+          <a:stretch>
+            <a:fillRect/>
+          </a:stretch>
+        </p:blipFill>
+        <p:spPr>
+          <a:xfrm>
+            <a:off x="602309" y="5224462"/>
+            <a:ext cx="8725948" cy="759243"/>
+          </a:xfrm>
+          <a:prstGeom prst="rect">
+            <a:avLst/>
+          </a:prstGeom>
+        </p:spPr>
+      </p:pic>
     </p:spTree>
     <p:extLst>
       <p:ext uri="{BB962C8B-B14F-4D97-AF65-F5344CB8AC3E}">
@@ -5255,6 +5986,204 @@
           <a:chExt cx="0" cy="0"/>
         </a:xfrm>
       </p:grpSpPr>
+      <p:pic>
+        <p:nvPicPr>
+          <p:cNvPr id="2" name="Image 1">
+            <a:extLst>
+              <a:ext uri="{FF2B5EF4-FFF2-40B4-BE49-F238E27FC236}">
+                <a16:creationId xmlns:a16="http://schemas.microsoft.com/office/drawing/2014/main" id="{89A35714-576F-436B-BE08-E70ACA291FFD}"/>
+              </a:ext>
+            </a:extLst>
+          </p:cNvPr>
+          <p:cNvPicPr>
+            <a:picLocks noChangeAspect="1"/>
+          </p:cNvPicPr>
+          <p:nvPr/>
+        </p:nvPicPr>
+        <p:blipFill>
+          <a:blip r:embed="rId2" cstate="email">
+            <a:extLst>
+              <a:ext uri="{28A0092B-C50C-407E-A947-70E740481C1C}">
+                <a14:useLocalDpi xmlns:a14="http://schemas.microsoft.com/office/drawing/2010/main"/>
+              </a:ext>
+            </a:extLst>
+          </a:blip>
+          <a:stretch>
+            <a:fillRect/>
+          </a:stretch>
+        </p:blipFill>
+        <p:spPr>
+          <a:xfrm>
+            <a:off x="1023436" y="1105402"/>
+            <a:ext cx="6692817" cy="1797747"/>
+          </a:xfrm>
+          <a:prstGeom prst="rect">
+            <a:avLst/>
+          </a:prstGeom>
+        </p:spPr>
+      </p:pic>
+      <p:sp>
+        <p:nvSpPr>
+          <p:cNvPr id="3" name="Rectangle 2">
+            <a:extLst>
+              <a:ext uri="{FF2B5EF4-FFF2-40B4-BE49-F238E27FC236}">
+                <a16:creationId xmlns:a16="http://schemas.microsoft.com/office/drawing/2014/main" id="{ABF94ED0-716A-430A-8875-603B077198DB}"/>
+              </a:ext>
+            </a:extLst>
+          </p:cNvPr>
+          <p:cNvSpPr/>
+          <p:nvPr/>
+        </p:nvSpPr>
+        <p:spPr>
+          <a:xfrm>
+            <a:off x="905578" y="608648"/>
+            <a:ext cx="6254854" cy="375552"/>
+          </a:xfrm>
+          <a:prstGeom prst="rect">
+            <a:avLst/>
+          </a:prstGeom>
+        </p:spPr>
+        <p:txBody>
+          <a:bodyPr wrap="none">
+            <a:spAutoFit/>
+          </a:bodyPr>
+          <a:lstStyle/>
+          <a:p>
+            <a:pPr marL="342900" lvl="0" indent="-342900">
+              <a:lnSpc>
+                <a:spcPct val="107000"/>
+              </a:lnSpc>
+              <a:spcAft>
+                <a:spcPts val="800"/>
+              </a:spcAft>
+              <a:buFont typeface="Wingdings" panose="05000000000000000000" pitchFamily="2" charset="2"/>
+              <a:buChar char=""/>
+            </a:pPr>
+            <a:r>
+              <a:rPr lang="fr-FR" dirty="0">
+                <a:latin typeface="Calibri" panose="020F0502020204030204" pitchFamily="34" charset="0"/>
+                <a:ea typeface="Calibri" panose="020F0502020204030204" pitchFamily="34" charset="0"/>
+                <a:cs typeface="Times New Roman" panose="02020603050405020304" pitchFamily="18" charset="0"/>
+              </a:rPr>
+              <a:t>Clic sur le logo Jupyter pour revenir à l’explorateur de fichiers</a:t>
+            </a:r>
+          </a:p>
+        </p:txBody>
+      </p:sp>
+      <p:pic>
+        <p:nvPicPr>
+          <p:cNvPr id="4" name="Image 3">
+            <a:extLst>
+              <a:ext uri="{FF2B5EF4-FFF2-40B4-BE49-F238E27FC236}">
+                <a16:creationId xmlns:a16="http://schemas.microsoft.com/office/drawing/2014/main" id="{D8C4225B-11CA-4B35-BD12-014EEDB5F6F0}"/>
+              </a:ext>
+            </a:extLst>
+          </p:cNvPr>
+          <p:cNvPicPr>
+            <a:picLocks noChangeAspect="1"/>
+          </p:cNvPicPr>
+          <p:nvPr/>
+        </p:nvPicPr>
+        <p:blipFill>
+          <a:blip r:embed="rId3"/>
+          <a:stretch>
+            <a:fillRect/>
+          </a:stretch>
+        </p:blipFill>
+        <p:spPr>
+          <a:xfrm>
+            <a:off x="905578" y="3659104"/>
+            <a:ext cx="2790825" cy="2876550"/>
+          </a:xfrm>
+          <a:prstGeom prst="rect">
+            <a:avLst/>
+          </a:prstGeom>
+        </p:spPr>
+      </p:pic>
+      <p:sp>
+        <p:nvSpPr>
+          <p:cNvPr id="5" name="Rectangle 4">
+            <a:extLst>
+              <a:ext uri="{FF2B5EF4-FFF2-40B4-BE49-F238E27FC236}">
+                <a16:creationId xmlns:a16="http://schemas.microsoft.com/office/drawing/2014/main" id="{EE807081-8155-4DCA-A5BF-B4FD8553BB03}"/>
+              </a:ext>
+            </a:extLst>
+          </p:cNvPr>
+          <p:cNvSpPr/>
+          <p:nvPr/>
+        </p:nvSpPr>
+        <p:spPr>
+          <a:xfrm>
+            <a:off x="1023436" y="3241224"/>
+            <a:ext cx="7946599" cy="375552"/>
+          </a:xfrm>
+          <a:prstGeom prst="rect">
+            <a:avLst/>
+          </a:prstGeom>
+        </p:spPr>
+        <p:txBody>
+          <a:bodyPr wrap="none">
+            <a:spAutoFit/>
+          </a:bodyPr>
+          <a:lstStyle/>
+          <a:p>
+            <a:pPr marL="342900" lvl="0" indent="-342900">
+              <a:lnSpc>
+                <a:spcPct val="107000"/>
+              </a:lnSpc>
+              <a:spcAft>
+                <a:spcPts val="800"/>
+              </a:spcAft>
+              <a:buFont typeface="Wingdings" panose="05000000000000000000" pitchFamily="2" charset="2"/>
+              <a:buChar char=""/>
+            </a:pPr>
+            <a:r>
+              <a:rPr lang="fr-FR" dirty="0">
+                <a:latin typeface="Calibri" panose="020F0502020204030204" pitchFamily="34" charset="0"/>
+                <a:ea typeface="Calibri" panose="020F0502020204030204" pitchFamily="34" charset="0"/>
+                <a:cs typeface="Times New Roman" panose="02020603050405020304" pitchFamily="18" charset="0"/>
+              </a:rPr>
+              <a:t>Clic sur le répertoire cours-deeplearning-2020, puis sur le répertoire notebooks</a:t>
+            </a:r>
+          </a:p>
+        </p:txBody>
+      </p:sp>
+      <p:pic>
+        <p:nvPicPr>
+          <p:cNvPr id="6" name="Image 5">
+            <a:extLst>
+              <a:ext uri="{FF2B5EF4-FFF2-40B4-BE49-F238E27FC236}">
+                <a16:creationId xmlns:a16="http://schemas.microsoft.com/office/drawing/2014/main" id="{0B6C5042-5197-495C-8727-2F9672A649DA}"/>
+              </a:ext>
+            </a:extLst>
+          </p:cNvPr>
+          <p:cNvPicPr>
+            <a:picLocks noChangeAspect="1"/>
+          </p:cNvPicPr>
+          <p:nvPr/>
+        </p:nvPicPr>
+        <p:blipFill>
+          <a:blip r:embed="rId4" cstate="email">
+            <a:extLst>
+              <a:ext uri="{28A0092B-C50C-407E-A947-70E740481C1C}">
+                <a14:useLocalDpi xmlns:a14="http://schemas.microsoft.com/office/drawing/2010/main"/>
+              </a:ext>
+            </a:extLst>
+          </a:blip>
+          <a:stretch>
+            <a:fillRect/>
+          </a:stretch>
+        </p:blipFill>
+        <p:spPr>
+          <a:xfrm>
+            <a:off x="4538161" y="3659104"/>
+            <a:ext cx="3306428" cy="3063435"/>
+          </a:xfrm>
+          <a:prstGeom prst="rect">
+            <a:avLst/>
+          </a:prstGeom>
+        </p:spPr>
+      </p:pic>
     </p:spTree>
     <p:extLst>
       <p:ext uri="{BB962C8B-B14F-4D97-AF65-F5344CB8AC3E}">
@@ -5285,6 +6214,182 @@
           <a:chExt cx="0" cy="0"/>
         </a:xfrm>
       </p:grpSpPr>
+      <p:sp>
+        <p:nvSpPr>
+          <p:cNvPr id="3" name="Rectangle 2">
+            <a:extLst>
+              <a:ext uri="{FF2B5EF4-FFF2-40B4-BE49-F238E27FC236}">
+                <a16:creationId xmlns:a16="http://schemas.microsoft.com/office/drawing/2014/main" id="{8BE4C383-17E5-471D-A6DC-763D7CBBC42B}"/>
+              </a:ext>
+            </a:extLst>
+          </p:cNvPr>
+          <p:cNvSpPr/>
+          <p:nvPr/>
+        </p:nvSpPr>
+        <p:spPr>
+          <a:xfrm>
+            <a:off x="919542" y="525839"/>
+            <a:ext cx="6953891" cy="774507"/>
+          </a:xfrm>
+          <a:prstGeom prst="rect">
+            <a:avLst/>
+          </a:prstGeom>
+        </p:spPr>
+        <p:txBody>
+          <a:bodyPr wrap="none">
+            <a:spAutoFit/>
+          </a:bodyPr>
+          <a:lstStyle/>
+          <a:p>
+            <a:pPr marL="342900" lvl="0" indent="-342900">
+              <a:lnSpc>
+                <a:spcPct val="107000"/>
+              </a:lnSpc>
+              <a:spcAft>
+                <a:spcPts val="800"/>
+              </a:spcAft>
+              <a:buFont typeface="Wingdings" panose="05000000000000000000" pitchFamily="2" charset="2"/>
+              <a:buChar char=""/>
+            </a:pPr>
+            <a:r>
+              <a:rPr lang="fr-FR" dirty="0">
+                <a:latin typeface="Calibri" panose="020F0502020204030204" pitchFamily="34" charset="0"/>
+                <a:ea typeface="Calibri" panose="020F0502020204030204" pitchFamily="34" charset="0"/>
+                <a:cs typeface="Times New Roman" panose="02020603050405020304" pitchFamily="18" charset="0"/>
+              </a:rPr>
+              <a:t>Cocher la case en face du notebook correspondant à la leçon du jour</a:t>
+            </a:r>
+          </a:p>
+          <a:p>
+            <a:pPr marL="342900" lvl="0" indent="-342900">
+              <a:lnSpc>
+                <a:spcPct val="107000"/>
+              </a:lnSpc>
+              <a:spcAft>
+                <a:spcPts val="800"/>
+              </a:spcAft>
+              <a:buFont typeface="Wingdings" panose="05000000000000000000" pitchFamily="2" charset="2"/>
+              <a:buChar char=""/>
+            </a:pPr>
+            <a:r>
+              <a:rPr lang="fr-FR" dirty="0">
+                <a:latin typeface="Calibri" panose="020F0502020204030204" pitchFamily="34" charset="0"/>
+                <a:ea typeface="Calibri" panose="020F0502020204030204" pitchFamily="34" charset="0"/>
+                <a:cs typeface="Times New Roman" panose="02020603050405020304" pitchFamily="18" charset="0"/>
+              </a:rPr>
+              <a:t>Cliquer sur le bouton Duplicate</a:t>
+            </a:r>
+          </a:p>
+        </p:txBody>
+      </p:sp>
+      <p:pic>
+        <p:nvPicPr>
+          <p:cNvPr id="5" name="Image 4">
+            <a:extLst>
+              <a:ext uri="{FF2B5EF4-FFF2-40B4-BE49-F238E27FC236}">
+                <a16:creationId xmlns:a16="http://schemas.microsoft.com/office/drawing/2014/main" id="{49DE5CC9-6C64-41DA-8B2F-CD4E2F3F5E7D}"/>
+              </a:ext>
+            </a:extLst>
+          </p:cNvPr>
+          <p:cNvPicPr>
+            <a:picLocks noChangeAspect="1"/>
+          </p:cNvPicPr>
+          <p:nvPr/>
+        </p:nvPicPr>
+        <p:blipFill>
+          <a:blip r:embed="rId2"/>
+          <a:stretch>
+            <a:fillRect/>
+          </a:stretch>
+        </p:blipFill>
+        <p:spPr>
+          <a:xfrm>
+            <a:off x="919542" y="1427244"/>
+            <a:ext cx="6267450" cy="2495550"/>
+          </a:xfrm>
+          <a:prstGeom prst="rect">
+            <a:avLst/>
+          </a:prstGeom>
+        </p:spPr>
+      </p:pic>
+      <p:sp>
+        <p:nvSpPr>
+          <p:cNvPr id="6" name="Rectangle 5">
+            <a:extLst>
+              <a:ext uri="{FF2B5EF4-FFF2-40B4-BE49-F238E27FC236}">
+                <a16:creationId xmlns:a16="http://schemas.microsoft.com/office/drawing/2014/main" id="{545AECD3-75FB-4898-B390-0F2D9EF582B9}"/>
+              </a:ext>
+            </a:extLst>
+          </p:cNvPr>
+          <p:cNvSpPr/>
+          <p:nvPr/>
+        </p:nvSpPr>
+        <p:spPr>
+          <a:xfrm>
+            <a:off x="919542" y="4118240"/>
+            <a:ext cx="9129615" cy="375552"/>
+          </a:xfrm>
+          <a:prstGeom prst="rect">
+            <a:avLst/>
+          </a:prstGeom>
+        </p:spPr>
+        <p:txBody>
+          <a:bodyPr wrap="none">
+            <a:spAutoFit/>
+          </a:bodyPr>
+          <a:lstStyle/>
+          <a:p>
+            <a:pPr marL="342900" lvl="0" indent="-342900">
+              <a:lnSpc>
+                <a:spcPct val="107000"/>
+              </a:lnSpc>
+              <a:spcAft>
+                <a:spcPts val="800"/>
+              </a:spcAft>
+              <a:buFont typeface="Wingdings" panose="05000000000000000000" pitchFamily="2" charset="2"/>
+              <a:buChar char=""/>
+            </a:pPr>
+            <a:r>
+              <a:rPr lang="fr-FR" dirty="0">
+                <a:latin typeface="Calibri" panose="020F0502020204030204" pitchFamily="34" charset="0"/>
+                <a:ea typeface="Calibri" panose="020F0502020204030204" pitchFamily="34" charset="0"/>
+                <a:cs typeface="Times New Roman" panose="02020603050405020304" pitchFamily="18" charset="0"/>
+              </a:rPr>
+              <a:t>Ouvrir et modifier le fichier dupliqué uniquement (pour faciliter les mises à jour ultérieures)</a:t>
+            </a:r>
+          </a:p>
+        </p:txBody>
+      </p:sp>
+      <p:pic>
+        <p:nvPicPr>
+          <p:cNvPr id="7" name="Image 6">
+            <a:extLst>
+              <a:ext uri="{FF2B5EF4-FFF2-40B4-BE49-F238E27FC236}">
+                <a16:creationId xmlns:a16="http://schemas.microsoft.com/office/drawing/2014/main" id="{C9EC0B8F-238C-4DC4-848B-692EE6BF775D}"/>
+              </a:ext>
+            </a:extLst>
+          </p:cNvPr>
+          <p:cNvPicPr>
+            <a:picLocks noChangeAspect="1"/>
+          </p:cNvPicPr>
+          <p:nvPr/>
+        </p:nvPicPr>
+        <p:blipFill>
+          <a:blip r:embed="rId3"/>
+          <a:stretch>
+            <a:fillRect/>
+          </a:stretch>
+        </p:blipFill>
+        <p:spPr>
+          <a:xfrm>
+            <a:off x="1691067" y="4585468"/>
+            <a:ext cx="4724400" cy="1971675"/>
+          </a:xfrm>
+          <a:prstGeom prst="rect">
+            <a:avLst/>
+          </a:prstGeom>
+        </p:spPr>
+      </p:pic>
     </p:spTree>
     <p:extLst>
       <p:ext uri="{BB962C8B-B14F-4D97-AF65-F5344CB8AC3E}">
@@ -5315,10 +6420,124 @@
           <a:chExt cx="0" cy="0"/>
         </a:xfrm>
       </p:grpSpPr>
+      <p:pic>
+        <p:nvPicPr>
+          <p:cNvPr id="3" name="Image 2">
+            <a:extLst>
+              <a:ext uri="{FF2B5EF4-FFF2-40B4-BE49-F238E27FC236}">
+                <a16:creationId xmlns:a16="http://schemas.microsoft.com/office/drawing/2014/main" id="{90336A8C-AF97-4CBA-8FA7-DC3222F65175}"/>
+              </a:ext>
+            </a:extLst>
+          </p:cNvPr>
+          <p:cNvPicPr>
+            <a:picLocks noChangeAspect="1"/>
+          </p:cNvPicPr>
+          <p:nvPr/>
+        </p:nvPicPr>
+        <p:blipFill>
+          <a:blip r:embed="rId2" cstate="email">
+            <a:extLst>
+              <a:ext uri="{28A0092B-C50C-407E-A947-70E740481C1C}">
+                <a14:useLocalDpi xmlns:a14="http://schemas.microsoft.com/office/drawing/2010/main"/>
+              </a:ext>
+            </a:extLst>
+          </a:blip>
+          <a:stretch>
+            <a:fillRect/>
+          </a:stretch>
+        </p:blipFill>
+        <p:spPr>
+          <a:xfrm>
+            <a:off x="1210427" y="918599"/>
+            <a:ext cx="4300952" cy="5020802"/>
+          </a:xfrm>
+          <a:prstGeom prst="rect">
+            <a:avLst/>
+          </a:prstGeom>
+        </p:spPr>
+      </p:pic>
+      <p:pic>
+        <p:nvPicPr>
+          <p:cNvPr id="4" name="Image 3">
+            <a:extLst>
+              <a:ext uri="{FF2B5EF4-FFF2-40B4-BE49-F238E27FC236}">
+                <a16:creationId xmlns:a16="http://schemas.microsoft.com/office/drawing/2014/main" id="{E7A8C056-E030-41A1-AFEB-07F6730B9D06}"/>
+              </a:ext>
+            </a:extLst>
+          </p:cNvPr>
+          <p:cNvPicPr>
+            <a:picLocks noChangeAspect="1"/>
+          </p:cNvPicPr>
+          <p:nvPr/>
+        </p:nvPicPr>
+        <p:blipFill>
+          <a:blip r:embed="rId3"/>
+          <a:stretch>
+            <a:fillRect/>
+          </a:stretch>
+        </p:blipFill>
+        <p:spPr>
+          <a:xfrm>
+            <a:off x="6472237" y="1615051"/>
+            <a:ext cx="4124325" cy="4324350"/>
+          </a:xfrm>
+          <a:prstGeom prst="rect">
+            <a:avLst/>
+          </a:prstGeom>
+        </p:spPr>
+      </p:pic>
+      <p:sp>
+        <p:nvSpPr>
+          <p:cNvPr id="5" name="Rectangle 4">
+            <a:extLst>
+              <a:ext uri="{FF2B5EF4-FFF2-40B4-BE49-F238E27FC236}">
+                <a16:creationId xmlns:a16="http://schemas.microsoft.com/office/drawing/2014/main" id="{B7E04031-6708-469F-B359-0BA086888DDF}"/>
+              </a:ext>
+            </a:extLst>
+          </p:cNvPr>
+          <p:cNvSpPr/>
+          <p:nvPr/>
+        </p:nvSpPr>
+        <p:spPr>
+          <a:xfrm>
+            <a:off x="6096000" y="730822"/>
+            <a:ext cx="5021179" cy="671915"/>
+          </a:xfrm>
+          <a:prstGeom prst="rect">
+            <a:avLst/>
+          </a:prstGeom>
+        </p:spPr>
+        <p:txBody>
+          <a:bodyPr wrap="square">
+            <a:spAutoFit/>
+          </a:bodyPr>
+          <a:lstStyle/>
+          <a:p>
+            <a:pPr marL="342900" lvl="0" indent="-342900">
+              <a:lnSpc>
+                <a:spcPct val="107000"/>
+              </a:lnSpc>
+              <a:spcAft>
+                <a:spcPts val="800"/>
+              </a:spcAft>
+              <a:buFont typeface="Wingdings" panose="05000000000000000000" pitchFamily="2" charset="2"/>
+              <a:buChar char=""/>
+            </a:pPr>
+            <a:r>
+              <a:rPr lang="fr-FR" dirty="0">
+                <a:latin typeface="Calibri" panose="020F0502020204030204" pitchFamily="34" charset="0"/>
+                <a:ea typeface="Calibri" panose="020F0502020204030204" pitchFamily="34" charset="0"/>
+                <a:cs typeface="Times New Roman" panose="02020603050405020304" pitchFamily="18" charset="0"/>
+              </a:rPr>
+              <a:t>Bouton Back du navigateur pour revenir à l’explorateur de fichiers</a:t>
+            </a:r>
+          </a:p>
+        </p:txBody>
+      </p:sp>
     </p:spTree>
     <p:extLst>
       <p:ext uri="{BB962C8B-B14F-4D97-AF65-F5344CB8AC3E}">
-        <p14:creationId xmlns:p14="http://schemas.microsoft.com/office/powerpoint/2010/main" val="1704384860"/>
+        <p14:creationId xmlns:p14="http://schemas.microsoft.com/office/powerpoint/2010/main" val="2604629836"/>
       </p:ext>
     </p:extLst>
   </p:cSld>
@@ -5345,10 +6564,140 @@
           <a:chExt cx="0" cy="0"/>
         </a:xfrm>
       </p:grpSpPr>
+      <p:sp>
+        <p:nvSpPr>
+          <p:cNvPr id="2" name="Rectangle 1">
+            <a:extLst>
+              <a:ext uri="{FF2B5EF4-FFF2-40B4-BE49-F238E27FC236}">
+                <a16:creationId xmlns:a16="http://schemas.microsoft.com/office/drawing/2014/main" id="{9771AC74-F963-4D54-8D1B-4A6C89C67EEA}"/>
+              </a:ext>
+            </a:extLst>
+          </p:cNvPr>
+          <p:cNvSpPr/>
+          <p:nvPr/>
+        </p:nvSpPr>
+        <p:spPr>
+          <a:xfrm>
+            <a:off x="351461" y="337603"/>
+            <a:ext cx="8169993" cy="595932"/>
+          </a:xfrm>
+          <a:prstGeom prst="rect">
+            <a:avLst/>
+          </a:prstGeom>
+        </p:spPr>
+        <p:txBody>
+          <a:bodyPr wrap="none">
+            <a:spAutoFit/>
+          </a:bodyPr>
+          <a:lstStyle/>
+          <a:p>
+            <a:pPr lvl="0">
+              <a:lnSpc>
+                <a:spcPct val="107000"/>
+              </a:lnSpc>
+              <a:spcAft>
+                <a:spcPts val="800"/>
+              </a:spcAft>
+            </a:pPr>
+            <a:r>
+              <a:rPr lang="fr-FR" sz="3200" b="1" dirty="0">
+                <a:latin typeface="Calibri" panose="020F0502020204030204" pitchFamily="34" charset="0"/>
+                <a:ea typeface="Calibri" panose="020F0502020204030204" pitchFamily="34" charset="0"/>
+                <a:cs typeface="Times New Roman" panose="02020603050405020304" pitchFamily="18" charset="0"/>
+              </a:rPr>
+              <a:t>4.  Terminer proprement une session de travail</a:t>
+            </a:r>
+            <a:endParaRPr lang="fr-FR" sz="3200" dirty="0">
+              <a:effectLst/>
+              <a:latin typeface="Calibri" panose="020F0502020204030204" pitchFamily="34" charset="0"/>
+              <a:ea typeface="Calibri" panose="020F0502020204030204" pitchFamily="34" charset="0"/>
+              <a:cs typeface="Times New Roman" panose="02020603050405020304" pitchFamily="18" charset="0"/>
+            </a:endParaRPr>
+          </a:p>
+        </p:txBody>
+      </p:sp>
+      <p:pic>
+        <p:nvPicPr>
+          <p:cNvPr id="4" name="Image 3">
+            <a:extLst>
+              <a:ext uri="{FF2B5EF4-FFF2-40B4-BE49-F238E27FC236}">
+                <a16:creationId xmlns:a16="http://schemas.microsoft.com/office/drawing/2014/main" id="{1D3D14F0-AE40-4D6D-92D4-C07E4F65E404}"/>
+              </a:ext>
+            </a:extLst>
+          </p:cNvPr>
+          <p:cNvPicPr>
+            <a:picLocks noChangeAspect="1"/>
+          </p:cNvPicPr>
+          <p:nvPr/>
+        </p:nvPicPr>
+        <p:blipFill>
+          <a:blip r:embed="rId2"/>
+          <a:stretch>
+            <a:fillRect/>
+          </a:stretch>
+        </p:blipFill>
+        <p:spPr>
+          <a:xfrm>
+            <a:off x="5212682" y="1476918"/>
+            <a:ext cx="4076700" cy="4200525"/>
+          </a:xfrm>
+          <a:prstGeom prst="rect">
+            <a:avLst/>
+          </a:prstGeom>
+        </p:spPr>
+      </p:pic>
+      <p:sp>
+        <p:nvSpPr>
+          <p:cNvPr id="5" name="Rectangle 4">
+            <a:extLst>
+              <a:ext uri="{FF2B5EF4-FFF2-40B4-BE49-F238E27FC236}">
+                <a16:creationId xmlns:a16="http://schemas.microsoft.com/office/drawing/2014/main" id="{0C09ECDB-0E91-4443-B118-4820FE331A9A}"/>
+              </a:ext>
+            </a:extLst>
+          </p:cNvPr>
+          <p:cNvSpPr/>
+          <p:nvPr/>
+        </p:nvSpPr>
+        <p:spPr>
+          <a:xfrm>
+            <a:off x="721894" y="3093042"/>
+            <a:ext cx="4076701" cy="968278"/>
+          </a:xfrm>
+          <a:prstGeom prst="rect">
+            <a:avLst/>
+          </a:prstGeom>
+        </p:spPr>
+        <p:txBody>
+          <a:bodyPr wrap="square">
+            <a:spAutoFit/>
+          </a:bodyPr>
+          <a:lstStyle/>
+          <a:p>
+            <a:pPr marL="342900" lvl="0" indent="-342900">
+              <a:lnSpc>
+                <a:spcPct val="107000"/>
+              </a:lnSpc>
+              <a:spcAft>
+                <a:spcPts val="800"/>
+              </a:spcAft>
+              <a:buFont typeface="Wingdings" panose="05000000000000000000" pitchFamily="2" charset="2"/>
+              <a:buChar char=""/>
+            </a:pPr>
+            <a:r>
+              <a:rPr lang="fr-FR" dirty="0">
+                <a:latin typeface="Calibri" panose="020F0502020204030204" pitchFamily="34" charset="0"/>
+                <a:ea typeface="Calibri" panose="020F0502020204030204" pitchFamily="34" charset="0"/>
+                <a:cs typeface="Times New Roman" panose="02020603050405020304" pitchFamily="18" charset="0"/>
+              </a:rPr>
+              <a:t>Sauvegarder les modifications effectuées dans les notebooks ouverts</a:t>
+            </a:r>
+          </a:p>
+        </p:txBody>
+      </p:sp>
     </p:spTree>
     <p:extLst>
       <p:ext uri="{BB962C8B-B14F-4D97-AF65-F5344CB8AC3E}">
-        <p14:creationId xmlns:p14="http://schemas.microsoft.com/office/powerpoint/2010/main" val="2604629836"/>
+        <p14:creationId xmlns:p14="http://schemas.microsoft.com/office/powerpoint/2010/main" val="1704384860"/>
       </p:ext>
     </p:extLst>
   </p:cSld>
@@ -5375,6 +6724,166 @@
           <a:chExt cx="0" cy="0"/>
         </a:xfrm>
       </p:grpSpPr>
+      <p:sp>
+        <p:nvSpPr>
+          <p:cNvPr id="3" name="Rectangle 2">
+            <a:extLst>
+              <a:ext uri="{FF2B5EF4-FFF2-40B4-BE49-F238E27FC236}">
+                <a16:creationId xmlns:a16="http://schemas.microsoft.com/office/drawing/2014/main" id="{8C733B1C-16CC-404F-A268-10AF8F08424C}"/>
+              </a:ext>
+            </a:extLst>
+          </p:cNvPr>
+          <p:cNvSpPr/>
+          <p:nvPr/>
+        </p:nvSpPr>
+        <p:spPr>
+          <a:xfrm>
+            <a:off x="721894" y="518165"/>
+            <a:ext cx="7780422" cy="375552"/>
+          </a:xfrm>
+          <a:prstGeom prst="rect">
+            <a:avLst/>
+          </a:prstGeom>
+        </p:spPr>
+        <p:txBody>
+          <a:bodyPr wrap="square">
+            <a:spAutoFit/>
+          </a:bodyPr>
+          <a:lstStyle/>
+          <a:p>
+            <a:pPr marL="342900" lvl="0" indent="-342900">
+              <a:lnSpc>
+                <a:spcPct val="107000"/>
+              </a:lnSpc>
+              <a:spcAft>
+                <a:spcPts val="800"/>
+              </a:spcAft>
+              <a:buFont typeface="Wingdings" panose="05000000000000000000" pitchFamily="2" charset="2"/>
+              <a:buChar char=""/>
+            </a:pPr>
+            <a:r>
+              <a:rPr lang="fr-FR" dirty="0">
+                <a:latin typeface="Calibri" panose="020F0502020204030204" pitchFamily="34" charset="0"/>
+                <a:ea typeface="Calibri" panose="020F0502020204030204" pitchFamily="34" charset="0"/>
+                <a:cs typeface="Times New Roman" panose="02020603050405020304" pitchFamily="18" charset="0"/>
+              </a:rPr>
+              <a:t>Revenir à la console de gestion Gradient par le bouton Back to console</a:t>
+            </a:r>
+          </a:p>
+        </p:txBody>
+      </p:sp>
+      <p:pic>
+        <p:nvPicPr>
+          <p:cNvPr id="5" name="Image 4">
+            <a:extLst>
+              <a:ext uri="{FF2B5EF4-FFF2-40B4-BE49-F238E27FC236}">
+                <a16:creationId xmlns:a16="http://schemas.microsoft.com/office/drawing/2014/main" id="{5BD3A0CA-E448-4438-9F28-A377701FBEDE}"/>
+              </a:ext>
+            </a:extLst>
+          </p:cNvPr>
+          <p:cNvPicPr>
+            <a:picLocks noChangeAspect="1"/>
+          </p:cNvPicPr>
+          <p:nvPr/>
+        </p:nvPicPr>
+        <p:blipFill>
+          <a:blip r:embed="rId2"/>
+          <a:stretch>
+            <a:fillRect/>
+          </a:stretch>
+        </p:blipFill>
+        <p:spPr>
+          <a:xfrm>
+            <a:off x="1075071" y="996116"/>
+            <a:ext cx="5229225" cy="2571750"/>
+          </a:xfrm>
+          <a:prstGeom prst="rect">
+            <a:avLst/>
+          </a:prstGeom>
+        </p:spPr>
+      </p:pic>
+      <p:sp>
+        <p:nvSpPr>
+          <p:cNvPr id="7" name="Rectangle 6">
+            <a:extLst>
+              <a:ext uri="{FF2B5EF4-FFF2-40B4-BE49-F238E27FC236}">
+                <a16:creationId xmlns:a16="http://schemas.microsoft.com/office/drawing/2014/main" id="{B41E6A44-D44E-47BC-8C26-0A9B04BE5807}"/>
+              </a:ext>
+            </a:extLst>
+          </p:cNvPr>
+          <p:cNvSpPr/>
+          <p:nvPr/>
+        </p:nvSpPr>
+        <p:spPr>
+          <a:xfrm>
+            <a:off x="721894" y="4135780"/>
+            <a:ext cx="8678780" cy="375552"/>
+          </a:xfrm>
+          <a:prstGeom prst="rect">
+            <a:avLst/>
+          </a:prstGeom>
+        </p:spPr>
+        <p:txBody>
+          <a:bodyPr wrap="square">
+            <a:spAutoFit/>
+          </a:bodyPr>
+          <a:lstStyle/>
+          <a:p>
+            <a:pPr marL="342900" lvl="0" indent="-342900">
+              <a:lnSpc>
+                <a:spcPct val="107000"/>
+              </a:lnSpc>
+              <a:spcAft>
+                <a:spcPts val="800"/>
+              </a:spcAft>
+              <a:buFont typeface="Wingdings" panose="05000000000000000000" pitchFamily="2" charset="2"/>
+              <a:buChar char=""/>
+            </a:pPr>
+            <a:r>
+              <a:rPr lang="fr-FR" dirty="0">
+                <a:latin typeface="Calibri" panose="020F0502020204030204" pitchFamily="34" charset="0"/>
+                <a:ea typeface="Calibri" panose="020F0502020204030204" pitchFamily="34" charset="0"/>
+                <a:cs typeface="Times New Roman" panose="02020603050405020304" pitchFamily="18" charset="0"/>
+              </a:rPr>
+              <a:t>Arrêter la machine virtuelle en cliquant sur le bouton Stop dans la colonne Actions</a:t>
+            </a:r>
+          </a:p>
+        </p:txBody>
+      </p:sp>
+      <p:pic>
+        <p:nvPicPr>
+          <p:cNvPr id="8" name="Image 7">
+            <a:extLst>
+              <a:ext uri="{FF2B5EF4-FFF2-40B4-BE49-F238E27FC236}">
+                <a16:creationId xmlns:a16="http://schemas.microsoft.com/office/drawing/2014/main" id="{C32486FF-D731-441B-AECF-0E2ACACE9560}"/>
+              </a:ext>
+            </a:extLst>
+          </p:cNvPr>
+          <p:cNvPicPr/>
+          <p:nvPr/>
+        </p:nvPicPr>
+        <p:blipFill>
+          <a:blip r:embed="rId3" cstate="email">
+            <a:extLst>
+              <a:ext uri="{28A0092B-C50C-407E-A947-70E740481C1C}">
+                <a14:useLocalDpi xmlns:a14="http://schemas.microsoft.com/office/drawing/2010/main"/>
+              </a:ext>
+            </a:extLst>
+          </a:blip>
+          <a:stretch>
+            <a:fillRect/>
+          </a:stretch>
+        </p:blipFill>
+        <p:spPr>
+          <a:xfrm>
+            <a:off x="1075071" y="4575937"/>
+            <a:ext cx="8919161" cy="1937158"/>
+          </a:xfrm>
+          <a:prstGeom prst="rect">
+            <a:avLst/>
+          </a:prstGeom>
+        </p:spPr>
+      </p:pic>
     </p:spTree>
     <p:extLst>
       <p:ext uri="{BB962C8B-B14F-4D97-AF65-F5344CB8AC3E}">
@@ -5405,6 +6914,195 @@
           <a:chExt cx="0" cy="0"/>
         </a:xfrm>
       </p:grpSpPr>
+      <p:pic>
+        <p:nvPicPr>
+          <p:cNvPr id="2" name="Image 1">
+            <a:extLst>
+              <a:ext uri="{FF2B5EF4-FFF2-40B4-BE49-F238E27FC236}">
+                <a16:creationId xmlns:a16="http://schemas.microsoft.com/office/drawing/2014/main" id="{D7E9860F-2992-4CDB-9BFD-816935D789E2}"/>
+              </a:ext>
+            </a:extLst>
+          </p:cNvPr>
+          <p:cNvPicPr>
+            <a:picLocks noChangeAspect="1"/>
+          </p:cNvPicPr>
+          <p:nvPr/>
+        </p:nvPicPr>
+        <p:blipFill>
+          <a:blip r:embed="rId2"/>
+          <a:stretch>
+            <a:fillRect/>
+          </a:stretch>
+        </p:blipFill>
+        <p:spPr>
+          <a:xfrm>
+            <a:off x="1818523" y="1609725"/>
+            <a:ext cx="3228975" cy="1819275"/>
+          </a:xfrm>
+          <a:prstGeom prst="rect">
+            <a:avLst/>
+          </a:prstGeom>
+        </p:spPr>
+      </p:pic>
+      <p:sp>
+        <p:nvSpPr>
+          <p:cNvPr id="3" name="Rectangle 2">
+            <a:extLst>
+              <a:ext uri="{FF2B5EF4-FFF2-40B4-BE49-F238E27FC236}">
+                <a16:creationId xmlns:a16="http://schemas.microsoft.com/office/drawing/2014/main" id="{DE9CC235-7543-4846-AE01-6C5704C642CF}"/>
+              </a:ext>
+            </a:extLst>
+          </p:cNvPr>
+          <p:cNvSpPr/>
+          <p:nvPr/>
+        </p:nvSpPr>
+        <p:spPr>
+          <a:xfrm>
+            <a:off x="1347537" y="1007570"/>
+            <a:ext cx="6096000" cy="375552"/>
+          </a:xfrm>
+          <a:prstGeom prst="rect">
+            <a:avLst/>
+          </a:prstGeom>
+        </p:spPr>
+        <p:txBody>
+          <a:bodyPr>
+            <a:spAutoFit/>
+          </a:bodyPr>
+          <a:lstStyle/>
+          <a:p>
+            <a:pPr marL="342900" lvl="0" indent="-342900">
+              <a:lnSpc>
+                <a:spcPct val="107000"/>
+              </a:lnSpc>
+              <a:spcAft>
+                <a:spcPts val="800"/>
+              </a:spcAft>
+              <a:buFont typeface="Wingdings" panose="05000000000000000000" pitchFamily="2" charset="2"/>
+              <a:buChar char=""/>
+            </a:pPr>
+            <a:r>
+              <a:rPr lang="fr-FR" dirty="0">
+                <a:latin typeface="Calibri" panose="020F0502020204030204" pitchFamily="34" charset="0"/>
+                <a:ea typeface="Calibri" panose="020F0502020204030204" pitchFamily="34" charset="0"/>
+                <a:cs typeface="Times New Roman" panose="02020603050405020304" pitchFamily="18" charset="0"/>
+              </a:rPr>
+              <a:t>Attendre que la sauvegarde soit terminée</a:t>
+            </a:r>
+          </a:p>
+        </p:txBody>
+      </p:sp>
+      <p:pic>
+        <p:nvPicPr>
+          <p:cNvPr id="4" name="Image 3">
+            <a:extLst>
+              <a:ext uri="{FF2B5EF4-FFF2-40B4-BE49-F238E27FC236}">
+                <a16:creationId xmlns:a16="http://schemas.microsoft.com/office/drawing/2014/main" id="{F5945831-AAC2-4FC9-B82C-E03D6B95DA47}"/>
+              </a:ext>
+            </a:extLst>
+          </p:cNvPr>
+          <p:cNvPicPr/>
+          <p:nvPr/>
+        </p:nvPicPr>
+        <p:blipFill>
+          <a:blip r:embed="rId3" cstate="email">
+            <a:extLst>
+              <a:ext uri="{28A0092B-C50C-407E-A947-70E740481C1C}">
+                <a14:useLocalDpi xmlns:a14="http://schemas.microsoft.com/office/drawing/2010/main"/>
+              </a:ext>
+            </a:extLst>
+          </a:blip>
+          <a:stretch>
+            <a:fillRect/>
+          </a:stretch>
+        </p:blipFill>
+        <p:spPr>
+          <a:xfrm>
+            <a:off x="1818523" y="4586020"/>
+            <a:ext cx="5760720" cy="926465"/>
+          </a:xfrm>
+          <a:prstGeom prst="rect">
+            <a:avLst/>
+          </a:prstGeom>
+        </p:spPr>
+      </p:pic>
+      <p:sp>
+        <p:nvSpPr>
+          <p:cNvPr id="5" name="Rectangle 4">
+            <a:extLst>
+              <a:ext uri="{FF2B5EF4-FFF2-40B4-BE49-F238E27FC236}">
+                <a16:creationId xmlns:a16="http://schemas.microsoft.com/office/drawing/2014/main" id="{5B1C96BF-4700-4E8E-B2EB-70738F53B91A}"/>
+              </a:ext>
+            </a:extLst>
+          </p:cNvPr>
+          <p:cNvSpPr/>
+          <p:nvPr/>
+        </p:nvSpPr>
+        <p:spPr>
+          <a:xfrm>
+            <a:off x="1347537" y="3963119"/>
+            <a:ext cx="4973413" cy="375552"/>
+          </a:xfrm>
+          <a:prstGeom prst="rect">
+            <a:avLst/>
+          </a:prstGeom>
+        </p:spPr>
+        <p:txBody>
+          <a:bodyPr wrap="none">
+            <a:spAutoFit/>
+          </a:bodyPr>
+          <a:lstStyle/>
+          <a:p>
+            <a:pPr marL="342900" lvl="0" indent="-342900">
+              <a:lnSpc>
+                <a:spcPct val="107000"/>
+              </a:lnSpc>
+              <a:spcAft>
+                <a:spcPts val="800"/>
+              </a:spcAft>
+              <a:buFont typeface="Wingdings" panose="05000000000000000000" pitchFamily="2" charset="2"/>
+              <a:buChar char=""/>
+            </a:pPr>
+            <a:r>
+              <a:rPr lang="fr-FR" dirty="0">
+                <a:latin typeface="Calibri" panose="020F0502020204030204" pitchFamily="34" charset="0"/>
+                <a:ea typeface="Calibri" panose="020F0502020204030204" pitchFamily="34" charset="0"/>
+                <a:cs typeface="Times New Roman" panose="02020603050405020304" pitchFamily="18" charset="0"/>
+              </a:rPr>
+              <a:t>Vérifier que le statut passe de </a:t>
+            </a:r>
+            <a:r>
+              <a:rPr lang="fr-FR" dirty="0" err="1">
+                <a:latin typeface="Calibri" panose="020F0502020204030204" pitchFamily="34" charset="0"/>
+                <a:ea typeface="Calibri" panose="020F0502020204030204" pitchFamily="34" charset="0"/>
+                <a:cs typeface="Times New Roman" panose="02020603050405020304" pitchFamily="18" charset="0"/>
+              </a:rPr>
+              <a:t>Saving</a:t>
+            </a:r>
+            <a:r>
+              <a:rPr lang="fr-FR" dirty="0">
+                <a:latin typeface="Calibri" panose="020F0502020204030204" pitchFamily="34" charset="0"/>
+                <a:ea typeface="Calibri" panose="020F0502020204030204" pitchFamily="34" charset="0"/>
+                <a:cs typeface="Times New Roman" panose="02020603050405020304" pitchFamily="18" charset="0"/>
+              </a:rPr>
+              <a:t> à </a:t>
+            </a:r>
+            <a:r>
+              <a:rPr lang="fr-FR" dirty="0" err="1">
+                <a:latin typeface="Calibri" panose="020F0502020204030204" pitchFamily="34" charset="0"/>
+                <a:ea typeface="Calibri" panose="020F0502020204030204" pitchFamily="34" charset="0"/>
+                <a:cs typeface="Times New Roman" panose="02020603050405020304" pitchFamily="18" charset="0"/>
+              </a:rPr>
+              <a:t>Stopped</a:t>
+            </a:r>
+            <a:endParaRPr lang="fr-FR" dirty="0">
+              <a:latin typeface="Calibri" panose="020F0502020204030204" pitchFamily="34" charset="0"/>
+              <a:ea typeface="Calibri" panose="020F0502020204030204" pitchFamily="34" charset="0"/>
+              <a:cs typeface="Times New Roman" panose="02020603050405020304" pitchFamily="18" charset="0"/>
+            </a:endParaRPr>
+          </a:p>
+        </p:txBody>
+      </p:sp>
     </p:spTree>
     <p:extLst>
       <p:ext uri="{BB962C8B-B14F-4D97-AF65-F5344CB8AC3E}">
@@ -5450,10 +7148,10 @@
           <p:nvPr/>
         </p:nvPicPr>
         <p:blipFill>
-          <a:blip r:embed="rId2">
+          <a:blip r:embed="rId2" cstate="email">
             <a:extLst>
               <a:ext uri="{28A0092B-C50C-407E-A947-70E740481C1C}">
-                <a14:useLocalDpi xmlns:a14="http://schemas.microsoft.com/office/drawing/2010/main" val="0"/>
+                <a14:useLocalDpi xmlns:a14="http://schemas.microsoft.com/office/drawing/2010/main"/>
               </a:ext>
             </a:extLst>
           </a:blip>
@@ -5497,7 +7195,7 @@
         <p:spPr>
           <a:xfrm>
             <a:off x="514126" y="974775"/>
-            <a:ext cx="2999539" cy="830997"/>
+            <a:ext cx="2999539" cy="1138773"/>
           </a:xfrm>
           <a:prstGeom prst="rect">
             <a:avLst/>
@@ -5517,6 +7215,13 @@
             <a:r>
               <a:rPr lang="fr-FR" sz="4800" dirty="0"/>
               <a:t> GPU</a:t>
+            </a:r>
+          </a:p>
+          <a:p>
+            <a:pPr algn="ctr"/>
+            <a:r>
+              <a:rPr lang="fr-FR" sz="2000" dirty="0"/>
+              <a:t>(&gt; GTX 1070, 8 Go)</a:t>
             </a:r>
           </a:p>
         </p:txBody>
@@ -5536,10 +7241,10 @@
           <p:nvPr/>
         </p:nvPicPr>
         <p:blipFill>
-          <a:blip r:embed="rId3">
+          <a:blip r:embed="rId3" cstate="email">
             <a:extLst>
               <a:ext uri="{28A0092B-C50C-407E-A947-70E740481C1C}">
-                <a14:useLocalDpi xmlns:a14="http://schemas.microsoft.com/office/drawing/2010/main" val="0"/>
+                <a14:useLocalDpi xmlns:a14="http://schemas.microsoft.com/office/drawing/2010/main"/>
               </a:ext>
             </a:extLst>
           </a:blip>
@@ -5583,10 +7288,10 @@
           <p:nvPr/>
         </p:nvPicPr>
         <p:blipFill>
-          <a:blip r:embed="rId4">
+          <a:blip r:embed="rId4" cstate="email">
             <a:extLst>
               <a:ext uri="{28A0092B-C50C-407E-A947-70E740481C1C}">
-                <a14:useLocalDpi xmlns:a14="http://schemas.microsoft.com/office/drawing/2010/main" val="0"/>
+                <a14:useLocalDpi xmlns:a14="http://schemas.microsoft.com/office/drawing/2010/main"/>
               </a:ext>
             </a:extLst>
           </a:blip>
@@ -5645,36 +7350,6 @@
           <a:chExt cx="0" cy="0"/>
         </a:xfrm>
       </p:grpSpPr>
-    </p:spTree>
-    <p:extLst>
-      <p:ext uri="{BB962C8B-B14F-4D97-AF65-F5344CB8AC3E}">
-        <p14:creationId xmlns:p14="http://schemas.microsoft.com/office/powerpoint/2010/main" val="3177583253"/>
-      </p:ext>
-    </p:extLst>
-  </p:cSld>
-  <p:clrMapOvr>
-    <a:masterClrMapping/>
-  </p:clrMapOvr>
-</p:sld>
-</file>
-
-<file path=ppt/slides/slide21.xml><?xml version="1.0" encoding="utf-8"?>
-<p:sld xmlns:a="http://schemas.openxmlformats.org/drawingml/2006/main" xmlns:r="http://schemas.openxmlformats.org/officeDocument/2006/relationships" xmlns:p="http://schemas.openxmlformats.org/presentationml/2006/main">
-  <p:cSld>
-    <p:spTree>
-      <p:nvGrpSpPr>
-        <p:cNvPr id="1" name=""/>
-        <p:cNvGrpSpPr/>
-        <p:nvPr/>
-      </p:nvGrpSpPr>
-      <p:grpSpPr>
-        <a:xfrm>
-          <a:off x="0" y="0"/>
-          <a:ext cx="0" cy="0"/>
-          <a:chOff x="0" y="0"/>
-          <a:chExt cx="0" cy="0"/>
-        </a:xfrm>
-      </p:grpSpPr>
       <p:sp>
         <p:nvSpPr>
           <p:cNvPr id="2" name="Rectangle 1">
@@ -6316,7 +7991,13 @@
           <p:nvPr/>
         </p:nvPicPr>
         <p:blipFill>
-          <a:blip r:embed="rId3"/>
+          <a:blip r:embed="rId3" cstate="email">
+            <a:extLst>
+              <a:ext uri="{28A0092B-C50C-407E-A947-70E740481C1C}">
+                <a14:useLocalDpi xmlns:a14="http://schemas.microsoft.com/office/drawing/2010/main"/>
+              </a:ext>
+            </a:extLst>
+          </a:blip>
           <a:stretch>
             <a:fillRect/>
           </a:stretch>
@@ -6558,7 +8239,13 @@
           <p:nvPr/>
         </p:nvPicPr>
         <p:blipFill>
-          <a:blip r:embed="rId3"/>
+          <a:blip r:embed="rId3" cstate="email">
+            <a:extLst>
+              <a:ext uri="{28A0092B-C50C-407E-A947-70E740481C1C}">
+                <a14:useLocalDpi xmlns:a14="http://schemas.microsoft.com/office/drawing/2010/main"/>
+              </a:ext>
+            </a:extLst>
+          </a:blip>
           <a:stretch>
             <a:fillRect/>
           </a:stretch>
@@ -6586,7 +8273,13 @@
           <p:nvPr/>
         </p:nvPicPr>
         <p:blipFill>
-          <a:blip r:embed="rId4"/>
+          <a:blip r:embed="rId4" cstate="email">
+            <a:extLst>
+              <a:ext uri="{28A0092B-C50C-407E-A947-70E740481C1C}">
+                <a14:useLocalDpi xmlns:a14="http://schemas.microsoft.com/office/drawing/2010/main"/>
+              </a:ext>
+            </a:extLst>
+          </a:blip>
           <a:stretch>
             <a:fillRect/>
           </a:stretch>
@@ -6794,7 +8487,13 @@
           <p:nvPr/>
         </p:nvPicPr>
         <p:blipFill>
-          <a:blip r:embed="rId2"/>
+          <a:blip r:embed="rId2" cstate="email">
+            <a:extLst>
+              <a:ext uri="{28A0092B-C50C-407E-A947-70E740481C1C}">
+                <a14:useLocalDpi xmlns:a14="http://schemas.microsoft.com/office/drawing/2010/main"/>
+              </a:ext>
+            </a:extLst>
+          </a:blip>
           <a:stretch>
             <a:fillRect/>
           </a:stretch>
@@ -7050,7 +8749,7 @@
         </p:nvSpPr>
         <p:spPr>
           <a:xfrm>
-            <a:off x="2286463" y="1383449"/>
+            <a:off x="2286463" y="1126775"/>
             <a:ext cx="7619073" cy="584775"/>
           </a:xfrm>
           <a:prstGeom prst="rect">
@@ -7093,7 +8792,7 @@
         </p:nvSpPr>
         <p:spPr>
           <a:xfrm>
-            <a:off x="877051" y="2193181"/>
+            <a:off x="877051" y="1936507"/>
             <a:ext cx="3379964" cy="671915"/>
           </a:xfrm>
           <a:prstGeom prst="rect">
@@ -7160,14 +8859,20 @@
           <p:nvPr/>
         </p:nvPicPr>
         <p:blipFill>
-          <a:blip r:embed="rId3"/>
+          <a:blip r:embed="rId3" cstate="email">
+            <a:extLst>
+              <a:ext uri="{28A0092B-C50C-407E-A947-70E740481C1C}">
+                <a14:useLocalDpi xmlns:a14="http://schemas.microsoft.com/office/drawing/2010/main"/>
+              </a:ext>
+            </a:extLst>
+          </a:blip>
           <a:stretch>
             <a:fillRect/>
           </a:stretch>
         </p:blipFill>
         <p:spPr>
           <a:xfrm>
-            <a:off x="1516442" y="2865096"/>
+            <a:off x="1516442" y="2608422"/>
             <a:ext cx="2101182" cy="3602274"/>
           </a:xfrm>
           <a:prstGeom prst="rect">
@@ -7188,14 +8893,20 @@
           <p:nvPr/>
         </p:nvPicPr>
         <p:blipFill>
-          <a:blip r:embed="rId4"/>
+          <a:blip r:embed="rId4" cstate="email">
+            <a:extLst>
+              <a:ext uri="{28A0092B-C50C-407E-A947-70E740481C1C}">
+                <a14:useLocalDpi xmlns:a14="http://schemas.microsoft.com/office/drawing/2010/main"/>
+              </a:ext>
+            </a:extLst>
+          </a:blip>
           <a:stretch>
             <a:fillRect/>
           </a:stretch>
         </p:blipFill>
         <p:spPr>
           <a:xfrm>
-            <a:off x="6347804" y="2305843"/>
+            <a:off x="6347804" y="2049169"/>
             <a:ext cx="4047480" cy="3726707"/>
           </a:xfrm>
           <a:prstGeom prst="rect">
@@ -7217,7 +8928,7 @@
         </p:nvSpPr>
         <p:spPr>
           <a:xfrm>
-            <a:off x="6347804" y="6144845"/>
+            <a:off x="6347804" y="5888171"/>
             <a:ext cx="3149452" cy="375552"/>
           </a:xfrm>
           <a:prstGeom prst="rect">
@@ -7299,7 +9010,7 @@
           <p:nvPr/>
         </p:nvPicPr>
         <p:blipFill>
-          <a:blip r:embed="rId2" cstate="print">
+          <a:blip r:embed="rId2" cstate="email">
             <a:extLst>
               <a:ext uri="{28A0092B-C50C-407E-A947-70E740481C1C}">
                 <a14:useLocalDpi xmlns:a14="http://schemas.microsoft.com/office/drawing/2010/main"/>
@@ -7312,8 +9023,8 @@
         </p:blipFill>
         <p:spPr>
           <a:xfrm>
-            <a:off x="1880534" y="1550737"/>
-            <a:ext cx="8430929" cy="2712452"/>
+            <a:off x="739737" y="864885"/>
+            <a:ext cx="10712519" cy="3530651"/>
           </a:xfrm>
           <a:prstGeom prst="rect">
             <a:avLst/>
@@ -7416,7 +9127,13 @@
           <p:nvPr/>
         </p:nvPicPr>
         <p:blipFill>
-          <a:blip r:embed="rId2"/>
+          <a:blip r:embed="rId2" cstate="email">
+            <a:extLst>
+              <a:ext uri="{28A0092B-C50C-407E-A947-70E740481C1C}">
+                <a14:useLocalDpi xmlns:a14="http://schemas.microsoft.com/office/drawing/2010/main"/>
+              </a:ext>
+            </a:extLst>
+          </a:blip>
           <a:stretch>
             <a:fillRect/>
           </a:stretch>
@@ -7497,7 +9214,7 @@
           <p:nvPr/>
         </p:nvPicPr>
         <p:blipFill>
-          <a:blip r:embed="rId3" cstate="print">
+          <a:blip r:embed="rId3" cstate="email">
             <a:extLst>
               <a:ext uri="{28A0092B-C50C-407E-A947-70E740481C1C}">
                 <a14:useLocalDpi xmlns:a14="http://schemas.microsoft.com/office/drawing/2010/main"/>
@@ -7531,7 +9248,7 @@
           <p:nvPr/>
         </p:nvPicPr>
         <p:blipFill>
-          <a:blip r:embed="rId4" cstate="print">
+          <a:blip r:embed="rId4" cstate="email">
             <a:extLst>
               <a:ext uri="{28A0092B-C50C-407E-A947-70E740481C1C}">
                 <a14:useLocalDpi xmlns:a14="http://schemas.microsoft.com/office/drawing/2010/main"/>
@@ -7620,7 +9337,7 @@
         <p:spPr>
           <a:xfrm>
             <a:off x="5962970" y="5177207"/>
-            <a:ext cx="3891578" cy="375552"/>
+            <a:ext cx="4719625" cy="375552"/>
           </a:xfrm>
           <a:prstGeom prst="rect">
             <a:avLst/>
@@ -7648,7 +9365,7 @@
                 <a:ea typeface="Calibri" panose="020F0502020204030204" pitchFamily="34" charset="0"/>
                 <a:cs typeface="Times New Roman" panose="02020603050405020304" pitchFamily="18" charset="0"/>
               </a:rPr>
-              <a:t>Notebook </a:t>
+              <a:t>Machine </a:t>
             </a:r>
             <a:r>
               <a:rPr lang="en-US" dirty="0" err="1">
@@ -7656,7 +9373,23 @@
                 <a:ea typeface="Calibri" panose="020F0502020204030204" pitchFamily="34" charset="0"/>
                 <a:cs typeface="Times New Roman" panose="02020603050405020304" pitchFamily="18" charset="0"/>
               </a:rPr>
-              <a:t>démarré</a:t>
+              <a:t>virtuelle</a:t>
+            </a:r>
+            <a:r>
+              <a:rPr lang="en-US" dirty="0">
+                <a:latin typeface="Calibri" panose="020F0502020204030204" pitchFamily="34" charset="0"/>
+                <a:ea typeface="Calibri" panose="020F0502020204030204" pitchFamily="34" charset="0"/>
+                <a:cs typeface="Times New Roman" panose="02020603050405020304" pitchFamily="18" charset="0"/>
+              </a:rPr>
+              <a:t> </a:t>
+            </a:r>
+            <a:r>
+              <a:rPr lang="en-US" dirty="0" err="1">
+                <a:latin typeface="Calibri" panose="020F0502020204030204" pitchFamily="34" charset="0"/>
+                <a:ea typeface="Calibri" panose="020F0502020204030204" pitchFamily="34" charset="0"/>
+                <a:cs typeface="Times New Roman" panose="02020603050405020304" pitchFamily="18" charset="0"/>
+              </a:rPr>
+              <a:t>démarrée</a:t>
             </a:r>
             <a:r>
               <a:rPr lang="en-US" dirty="0">
@@ -7822,7 +9555,7 @@
         </p:blipFill>
         <p:spPr>
           <a:xfrm>
-            <a:off x="1368501" y="334837"/>
+            <a:off x="1708212" y="395187"/>
             <a:ext cx="4629150" cy="2133600"/>
           </a:xfrm>
           <a:prstGeom prst="rect">
@@ -7845,7 +9578,13 @@
           <p:nvPr/>
         </p:nvPicPr>
         <p:blipFill>
-          <a:blip r:embed="rId3"/>
+          <a:blip r:embed="rId3" cstate="email">
+            <a:extLst>
+              <a:ext uri="{28A0092B-C50C-407E-A947-70E740481C1C}">
+                <a14:useLocalDpi xmlns:a14="http://schemas.microsoft.com/office/drawing/2010/main"/>
+              </a:ext>
+            </a:extLst>
+          </a:blip>
           <a:stretch>
             <a:fillRect/>
           </a:stretch>

</xml_diff>

<commit_message>
que faire si plus de GPUs gratuits ?
</commit_message>
<xml_diff>
--- a/slides/00_environnement.pptx
+++ b/slides/00_environnement.pptx
@@ -24,7 +24,9 @@
     <p:sldId id="271" r:id="rId18"/>
     <p:sldId id="273" r:id="rId19"/>
     <p:sldId id="274" r:id="rId20"/>
-    <p:sldId id="257" r:id="rId21"/>
+    <p:sldId id="278" r:id="rId21"/>
+    <p:sldId id="277" r:id="rId22"/>
+    <p:sldId id="257" r:id="rId23"/>
   </p:sldIdLst>
   <p:sldSz cx="12192000" cy="6858000"/>
   <p:notesSz cx="6858000" cy="9144000"/>
@@ -1430,7 +1432,7 @@
           <a:p>
             <a:fld id="{8F6C6F0F-7534-4227-B0AE-457D579C3186}" type="datetimeFigureOut">
               <a:rPr lang="fr-FR" smtClean="0"/>
-              <a:t>05/04/2020</a:t>
+              <a:t>06/04/2020</a:t>
             </a:fld>
             <a:endParaRPr lang="fr-FR"/>
           </a:p>
@@ -1628,7 +1630,7 @@
           <a:p>
             <a:fld id="{8F6C6F0F-7534-4227-B0AE-457D579C3186}" type="datetimeFigureOut">
               <a:rPr lang="fr-FR" smtClean="0"/>
-              <a:t>05/04/2020</a:t>
+              <a:t>06/04/2020</a:t>
             </a:fld>
             <a:endParaRPr lang="fr-FR"/>
           </a:p>
@@ -1836,7 +1838,7 @@
           <a:p>
             <a:fld id="{8F6C6F0F-7534-4227-B0AE-457D579C3186}" type="datetimeFigureOut">
               <a:rPr lang="fr-FR" smtClean="0"/>
-              <a:t>05/04/2020</a:t>
+              <a:t>06/04/2020</a:t>
             </a:fld>
             <a:endParaRPr lang="fr-FR"/>
           </a:p>
@@ -2034,7 +2036,7 @@
           <a:p>
             <a:fld id="{8F6C6F0F-7534-4227-B0AE-457D579C3186}" type="datetimeFigureOut">
               <a:rPr lang="fr-FR" smtClean="0"/>
-              <a:t>05/04/2020</a:t>
+              <a:t>06/04/2020</a:t>
             </a:fld>
             <a:endParaRPr lang="fr-FR"/>
           </a:p>
@@ -2309,7 +2311,7 @@
           <a:p>
             <a:fld id="{8F6C6F0F-7534-4227-B0AE-457D579C3186}" type="datetimeFigureOut">
               <a:rPr lang="fr-FR" smtClean="0"/>
-              <a:t>05/04/2020</a:t>
+              <a:t>06/04/2020</a:t>
             </a:fld>
             <a:endParaRPr lang="fr-FR"/>
           </a:p>
@@ -2574,7 +2576,7 @@
           <a:p>
             <a:fld id="{8F6C6F0F-7534-4227-B0AE-457D579C3186}" type="datetimeFigureOut">
               <a:rPr lang="fr-FR" smtClean="0"/>
-              <a:t>05/04/2020</a:t>
+              <a:t>06/04/2020</a:t>
             </a:fld>
             <a:endParaRPr lang="fr-FR"/>
           </a:p>
@@ -2986,7 +2988,7 @@
           <a:p>
             <a:fld id="{8F6C6F0F-7534-4227-B0AE-457D579C3186}" type="datetimeFigureOut">
               <a:rPr lang="fr-FR" smtClean="0"/>
-              <a:t>05/04/2020</a:t>
+              <a:t>06/04/2020</a:t>
             </a:fld>
             <a:endParaRPr lang="fr-FR"/>
           </a:p>
@@ -3127,7 +3129,7 @@
           <a:p>
             <a:fld id="{8F6C6F0F-7534-4227-B0AE-457D579C3186}" type="datetimeFigureOut">
               <a:rPr lang="fr-FR" smtClean="0"/>
-              <a:t>05/04/2020</a:t>
+              <a:t>06/04/2020</a:t>
             </a:fld>
             <a:endParaRPr lang="fr-FR"/>
           </a:p>
@@ -3240,7 +3242,7 @@
           <a:p>
             <a:fld id="{8F6C6F0F-7534-4227-B0AE-457D579C3186}" type="datetimeFigureOut">
               <a:rPr lang="fr-FR" smtClean="0"/>
-              <a:t>05/04/2020</a:t>
+              <a:t>06/04/2020</a:t>
             </a:fld>
             <a:endParaRPr lang="fr-FR"/>
           </a:p>
@@ -3551,7 +3553,7 @@
           <a:p>
             <a:fld id="{8F6C6F0F-7534-4227-B0AE-457D579C3186}" type="datetimeFigureOut">
               <a:rPr lang="fr-FR" smtClean="0"/>
-              <a:t>05/04/2020</a:t>
+              <a:t>06/04/2020</a:t>
             </a:fld>
             <a:endParaRPr lang="fr-FR"/>
           </a:p>
@@ -3839,7 +3841,7 @@
           <a:p>
             <a:fld id="{8F6C6F0F-7534-4227-B0AE-457D579C3186}" type="datetimeFigureOut">
               <a:rPr lang="fr-FR" smtClean="0"/>
-              <a:t>05/04/2020</a:t>
+              <a:t>06/04/2020</a:t>
             </a:fld>
             <a:endParaRPr lang="fr-FR"/>
           </a:p>
@@ -4080,7 +4082,7 @@
           <a:p>
             <a:fld id="{8F6C6F0F-7534-4227-B0AE-457D579C3186}" type="datetimeFigureOut">
               <a:rPr lang="fr-FR" smtClean="0"/>
-              <a:t>05/04/2020</a:t>
+              <a:t>06/04/2020</a:t>
             </a:fld>
             <a:endParaRPr lang="fr-FR"/>
           </a:p>
@@ -7352,44 +7354,7 @@
       </p:grpSpPr>
       <p:sp>
         <p:nvSpPr>
-          <p:cNvPr id="2" name="Rectangle 1">
-            <a:extLst>
-              <a:ext uri="{FF2B5EF4-FFF2-40B4-BE49-F238E27FC236}">
-                <a16:creationId xmlns:a16="http://schemas.microsoft.com/office/drawing/2014/main" id="{68291C99-5A1E-4D38-A33A-83771E962E1D}"/>
-              </a:ext>
-            </a:extLst>
-          </p:cNvPr>
-          <p:cNvSpPr/>
-          <p:nvPr/>
-        </p:nvSpPr>
-        <p:spPr>
-          <a:xfrm>
-            <a:off x="5440351" y="394890"/>
-            <a:ext cx="6245621" cy="584775"/>
-          </a:xfrm>
-          <a:prstGeom prst="rect">
-            <a:avLst/>
-          </a:prstGeom>
-        </p:spPr>
-        <p:txBody>
-          <a:bodyPr wrap="none">
-            <a:spAutoFit/>
-          </a:bodyPr>
-          <a:lstStyle/>
-          <a:p>
-            <a:r>
-              <a:rPr lang="fr-FR" sz="3200" dirty="0">
-                <a:hlinkClick r:id="rId2"/>
-              </a:rPr>
-              <a:t>https://course.fast.ai/start_gcp.html</a:t>
-            </a:r>
-            <a:endParaRPr lang="fr-FR" sz="3200" dirty="0"/>
-          </a:p>
-        </p:txBody>
-      </p:sp>
-      <p:sp>
-        <p:nvSpPr>
-          <p:cNvPr id="3" name="ZoneTexte 2">
+          <p:cNvPr id="4" name="ZoneTexte 3">
             <a:extLst>
               <a:ext uri="{FF2B5EF4-FFF2-40B4-BE49-F238E27FC236}">
                 <a16:creationId xmlns:a16="http://schemas.microsoft.com/office/drawing/2014/main" id="{579CB3FE-4FB2-4415-B1BA-6D0C957B2A81}"/>
@@ -7402,7 +7367,7 @@
         <p:spPr>
           <a:xfrm>
             <a:off x="506028" y="328474"/>
-            <a:ext cx="4622997" cy="707886"/>
+            <a:ext cx="10623742" cy="707886"/>
           </a:xfrm>
           <a:prstGeom prst="rect">
             <a:avLst/>
@@ -7416,582 +7381,27 @@
           <a:lstStyle/>
           <a:p>
             <a:r>
-              <a:rPr lang="fr-FR" sz="4000" b="1" dirty="0"/>
-              <a:t>Option Google Cloud</a:t>
-            </a:r>
-          </a:p>
-        </p:txBody>
-      </p:sp>
-      <p:sp>
-        <p:nvSpPr>
-          <p:cNvPr id="4" name="Rectangle 3">
-            <a:extLst>
-              <a:ext uri="{FF2B5EF4-FFF2-40B4-BE49-F238E27FC236}">
-                <a16:creationId xmlns:a16="http://schemas.microsoft.com/office/drawing/2014/main" id="{BAC61827-57DE-49F1-8805-80C4CDB59158}"/>
-              </a:ext>
-            </a:extLst>
-          </p:cNvPr>
-          <p:cNvSpPr/>
-          <p:nvPr/>
-        </p:nvSpPr>
-        <p:spPr>
-          <a:xfrm>
-            <a:off x="506028" y="3586920"/>
-            <a:ext cx="6096000" cy="3139321"/>
-          </a:xfrm>
-          <a:prstGeom prst="rect">
-            <a:avLst/>
-          </a:prstGeom>
-        </p:spPr>
-        <p:txBody>
-          <a:bodyPr>
-            <a:spAutoFit/>
-          </a:bodyPr>
-          <a:lstStyle/>
-          <a:p>
-            <a:r>
-              <a:rPr lang="fr-FR" sz="1100" dirty="0">
-                <a:latin typeface="Courier New" panose="02070309020205020404" pitchFamily="49" charset="0"/>
-                <a:cs typeface="Courier New" panose="02070309020205020404" pitchFamily="49" charset="0"/>
-              </a:rPr>
-              <a:t>export IMAGE_FAMILY="</a:t>
-            </a:r>
-            <a:r>
-              <a:rPr lang="fr-FR" sz="1100" dirty="0" err="1">
-                <a:latin typeface="Courier New" panose="02070309020205020404" pitchFamily="49" charset="0"/>
-                <a:cs typeface="Courier New" panose="02070309020205020404" pitchFamily="49" charset="0"/>
-              </a:rPr>
-              <a:t>pytorch-latest-gpu</a:t>
-            </a:r>
-            <a:r>
-              <a:rPr lang="fr-FR" sz="1100" dirty="0">
-                <a:latin typeface="Courier New" panose="02070309020205020404" pitchFamily="49" charset="0"/>
-                <a:cs typeface="Courier New" panose="02070309020205020404" pitchFamily="49" charset="0"/>
-              </a:rPr>
-              <a:t>"</a:t>
-            </a:r>
-          </a:p>
-          <a:p>
-            <a:r>
-              <a:rPr lang="fr-FR" sz="1100" dirty="0">
-                <a:latin typeface="Courier New" panose="02070309020205020404" pitchFamily="49" charset="0"/>
-                <a:cs typeface="Courier New" panose="02070309020205020404" pitchFamily="49" charset="0"/>
-              </a:rPr>
-              <a:t>export ZONE="europe-west4-b"</a:t>
-            </a:r>
-          </a:p>
-          <a:p>
-            <a:r>
-              <a:rPr lang="fr-FR" sz="1100" dirty="0">
-                <a:latin typeface="Courier New" panose="02070309020205020404" pitchFamily="49" charset="0"/>
-                <a:cs typeface="Courier New" panose="02070309020205020404" pitchFamily="49" charset="0"/>
-              </a:rPr>
-              <a:t>export INSTANCE_NAME="fastaiv2"</a:t>
-            </a:r>
-          </a:p>
-          <a:p>
-            <a:r>
-              <a:rPr lang="fr-FR" sz="1100" dirty="0">
-                <a:latin typeface="Courier New" panose="02070309020205020404" pitchFamily="49" charset="0"/>
-                <a:cs typeface="Courier New" panose="02070309020205020404" pitchFamily="49" charset="0"/>
-              </a:rPr>
-              <a:t>export INSTANCE_TYPE="n1-highmem-8"</a:t>
-            </a:r>
-          </a:p>
-          <a:p>
-            <a:endParaRPr lang="fr-FR" sz="1100" dirty="0">
-              <a:latin typeface="Courier New" panose="02070309020205020404" pitchFamily="49" charset="0"/>
-              <a:cs typeface="Courier New" panose="02070309020205020404" pitchFamily="49" charset="0"/>
-            </a:endParaRPr>
-          </a:p>
-          <a:p>
-            <a:r>
-              <a:rPr lang="fr-FR" sz="1100" dirty="0" err="1">
-                <a:latin typeface="Courier New" panose="02070309020205020404" pitchFamily="49" charset="0"/>
-                <a:cs typeface="Courier New" panose="02070309020205020404" pitchFamily="49" charset="0"/>
-              </a:rPr>
-              <a:t>gcloud</a:t>
-            </a:r>
-            <a:r>
-              <a:rPr lang="fr-FR" sz="1100" dirty="0">
-                <a:latin typeface="Courier New" panose="02070309020205020404" pitchFamily="49" charset="0"/>
-                <a:cs typeface="Courier New" panose="02070309020205020404" pitchFamily="49" charset="0"/>
-              </a:rPr>
-              <a:t> </a:t>
-            </a:r>
-            <a:r>
-              <a:rPr lang="fr-FR" sz="1100" dirty="0" err="1">
-                <a:latin typeface="Courier New" panose="02070309020205020404" pitchFamily="49" charset="0"/>
-                <a:cs typeface="Courier New" panose="02070309020205020404" pitchFamily="49" charset="0"/>
-              </a:rPr>
-              <a:t>compute</a:t>
-            </a:r>
-            <a:r>
-              <a:rPr lang="fr-FR" sz="1100" dirty="0">
-                <a:latin typeface="Courier New" panose="02070309020205020404" pitchFamily="49" charset="0"/>
-                <a:cs typeface="Courier New" panose="02070309020205020404" pitchFamily="49" charset="0"/>
-              </a:rPr>
-              <a:t> instances </a:t>
-            </a:r>
-            <a:r>
-              <a:rPr lang="fr-FR" sz="1100" dirty="0" err="1">
-                <a:latin typeface="Courier New" panose="02070309020205020404" pitchFamily="49" charset="0"/>
-                <a:cs typeface="Courier New" panose="02070309020205020404" pitchFamily="49" charset="0"/>
-              </a:rPr>
-              <a:t>create</a:t>
-            </a:r>
-            <a:r>
-              <a:rPr lang="fr-FR" sz="1100" dirty="0">
-                <a:latin typeface="Courier New" panose="02070309020205020404" pitchFamily="49" charset="0"/>
-                <a:cs typeface="Courier New" panose="02070309020205020404" pitchFamily="49" charset="0"/>
-              </a:rPr>
-              <a:t> $INSTANCE_NAME \</a:t>
-            </a:r>
-          </a:p>
-          <a:p>
-            <a:r>
-              <a:rPr lang="fr-FR" sz="1100" dirty="0">
-                <a:latin typeface="Courier New" panose="02070309020205020404" pitchFamily="49" charset="0"/>
-                <a:cs typeface="Courier New" panose="02070309020205020404" pitchFamily="49" charset="0"/>
-              </a:rPr>
-              <a:t>        --zone=$ZONE \</a:t>
-            </a:r>
-          </a:p>
-          <a:p>
-            <a:r>
-              <a:rPr lang="fr-FR" sz="1100" dirty="0">
-                <a:latin typeface="Courier New" panose="02070309020205020404" pitchFamily="49" charset="0"/>
-                <a:cs typeface="Courier New" panose="02070309020205020404" pitchFamily="49" charset="0"/>
-              </a:rPr>
-              <a:t>        --image-</a:t>
-            </a:r>
-            <a:r>
-              <a:rPr lang="fr-FR" sz="1100" dirty="0" err="1">
-                <a:latin typeface="Courier New" panose="02070309020205020404" pitchFamily="49" charset="0"/>
-                <a:cs typeface="Courier New" panose="02070309020205020404" pitchFamily="49" charset="0"/>
-              </a:rPr>
-              <a:t>family</a:t>
-            </a:r>
-            <a:r>
-              <a:rPr lang="fr-FR" sz="1100" dirty="0">
-                <a:latin typeface="Courier New" panose="02070309020205020404" pitchFamily="49" charset="0"/>
-                <a:cs typeface="Courier New" panose="02070309020205020404" pitchFamily="49" charset="0"/>
-              </a:rPr>
-              <a:t>=$IMAGE_FAMILY \</a:t>
-            </a:r>
-          </a:p>
-          <a:p>
-            <a:r>
-              <a:rPr lang="fr-FR" sz="1100" dirty="0">
-                <a:latin typeface="Courier New" panose="02070309020205020404" pitchFamily="49" charset="0"/>
-                <a:cs typeface="Courier New" panose="02070309020205020404" pitchFamily="49" charset="0"/>
-              </a:rPr>
-              <a:t>        --image-</a:t>
-            </a:r>
-            <a:r>
-              <a:rPr lang="fr-FR" sz="1100" dirty="0" err="1">
-                <a:latin typeface="Courier New" panose="02070309020205020404" pitchFamily="49" charset="0"/>
-                <a:cs typeface="Courier New" panose="02070309020205020404" pitchFamily="49" charset="0"/>
-              </a:rPr>
-              <a:t>project</a:t>
-            </a:r>
-            <a:r>
-              <a:rPr lang="fr-FR" sz="1100" dirty="0">
-                <a:latin typeface="Courier New" panose="02070309020205020404" pitchFamily="49" charset="0"/>
-                <a:cs typeface="Courier New" panose="02070309020205020404" pitchFamily="49" charset="0"/>
-              </a:rPr>
-              <a:t>=</a:t>
-            </a:r>
-            <a:r>
-              <a:rPr lang="fr-FR" sz="1100" dirty="0" err="1">
-                <a:latin typeface="Courier New" panose="02070309020205020404" pitchFamily="49" charset="0"/>
-                <a:cs typeface="Courier New" panose="02070309020205020404" pitchFamily="49" charset="0"/>
-              </a:rPr>
-              <a:t>deeplearning</a:t>
-            </a:r>
-            <a:r>
-              <a:rPr lang="fr-FR" sz="1100" dirty="0">
-                <a:latin typeface="Courier New" panose="02070309020205020404" pitchFamily="49" charset="0"/>
-                <a:cs typeface="Courier New" panose="02070309020205020404" pitchFamily="49" charset="0"/>
-              </a:rPr>
-              <a:t>-platform-release \</a:t>
-            </a:r>
-          </a:p>
-          <a:p>
-            <a:r>
-              <a:rPr lang="fr-FR" sz="1100" dirty="0">
-                <a:latin typeface="Courier New" panose="02070309020205020404" pitchFamily="49" charset="0"/>
-                <a:cs typeface="Courier New" panose="02070309020205020404" pitchFamily="49" charset="0"/>
-              </a:rPr>
-              <a:t>        --maintenance-</a:t>
-            </a:r>
-            <a:r>
-              <a:rPr lang="fr-FR" sz="1100" dirty="0" err="1">
-                <a:latin typeface="Courier New" panose="02070309020205020404" pitchFamily="49" charset="0"/>
-                <a:cs typeface="Courier New" panose="02070309020205020404" pitchFamily="49" charset="0"/>
-              </a:rPr>
-              <a:t>policy</a:t>
-            </a:r>
-            <a:r>
-              <a:rPr lang="fr-FR" sz="1100" dirty="0">
-                <a:latin typeface="Courier New" panose="02070309020205020404" pitchFamily="49" charset="0"/>
-                <a:cs typeface="Courier New" panose="02070309020205020404" pitchFamily="49" charset="0"/>
-              </a:rPr>
-              <a:t>=TERMINATE \</a:t>
-            </a:r>
-          </a:p>
-          <a:p>
-            <a:r>
-              <a:rPr lang="fr-FR" sz="1100" dirty="0">
-                <a:latin typeface="Courier New" panose="02070309020205020404" pitchFamily="49" charset="0"/>
-                <a:cs typeface="Courier New" panose="02070309020205020404" pitchFamily="49" charset="0"/>
-              </a:rPr>
-              <a:t>        --</a:t>
-            </a:r>
-            <a:r>
-              <a:rPr lang="fr-FR" sz="1100" dirty="0" err="1">
-                <a:latin typeface="Courier New" panose="02070309020205020404" pitchFamily="49" charset="0"/>
-                <a:cs typeface="Courier New" panose="02070309020205020404" pitchFamily="49" charset="0"/>
-              </a:rPr>
-              <a:t>accelerator</a:t>
-            </a:r>
-            <a:r>
-              <a:rPr lang="fr-FR" sz="1100" dirty="0">
-                <a:latin typeface="Courier New" panose="02070309020205020404" pitchFamily="49" charset="0"/>
-                <a:cs typeface="Courier New" panose="02070309020205020404" pitchFamily="49" charset="0"/>
-              </a:rPr>
-              <a:t>="type=nvidia-tesla-t4,count=1" \</a:t>
-            </a:r>
-          </a:p>
-          <a:p>
-            <a:r>
-              <a:rPr lang="fr-FR" sz="1100" dirty="0">
-                <a:latin typeface="Courier New" panose="02070309020205020404" pitchFamily="49" charset="0"/>
-                <a:cs typeface="Courier New" panose="02070309020205020404" pitchFamily="49" charset="0"/>
-              </a:rPr>
-              <a:t>        --machine-type=$INSTANCE_TYPE \</a:t>
-            </a:r>
-          </a:p>
-          <a:p>
-            <a:r>
-              <a:rPr lang="fr-FR" sz="1100" dirty="0">
-                <a:latin typeface="Courier New" panose="02070309020205020404" pitchFamily="49" charset="0"/>
-                <a:cs typeface="Courier New" panose="02070309020205020404" pitchFamily="49" charset="0"/>
-              </a:rPr>
-              <a:t>        --boot-</a:t>
-            </a:r>
-            <a:r>
-              <a:rPr lang="fr-FR" sz="1100" dirty="0" err="1">
-                <a:latin typeface="Courier New" panose="02070309020205020404" pitchFamily="49" charset="0"/>
-                <a:cs typeface="Courier New" panose="02070309020205020404" pitchFamily="49" charset="0"/>
-              </a:rPr>
-              <a:t>disk</a:t>
-            </a:r>
-            <a:r>
-              <a:rPr lang="fr-FR" sz="1100" dirty="0">
-                <a:latin typeface="Courier New" panose="02070309020205020404" pitchFamily="49" charset="0"/>
-                <a:cs typeface="Courier New" panose="02070309020205020404" pitchFamily="49" charset="0"/>
-              </a:rPr>
-              <a:t>-size=200GB \</a:t>
-            </a:r>
-          </a:p>
-          <a:p>
-            <a:r>
-              <a:rPr lang="fr-FR" sz="1100" dirty="0">
-                <a:latin typeface="Courier New" panose="02070309020205020404" pitchFamily="49" charset="0"/>
-                <a:cs typeface="Courier New" panose="02070309020205020404" pitchFamily="49" charset="0"/>
-              </a:rPr>
-              <a:t>        --</a:t>
-            </a:r>
-            <a:r>
-              <a:rPr lang="fr-FR" sz="1100" dirty="0" err="1">
-                <a:latin typeface="Courier New" panose="02070309020205020404" pitchFamily="49" charset="0"/>
-                <a:cs typeface="Courier New" panose="02070309020205020404" pitchFamily="49" charset="0"/>
-              </a:rPr>
-              <a:t>metadata</a:t>
-            </a:r>
-            <a:r>
-              <a:rPr lang="fr-FR" sz="1100" dirty="0">
-                <a:latin typeface="Courier New" panose="02070309020205020404" pitchFamily="49" charset="0"/>
-                <a:cs typeface="Courier New" panose="02070309020205020404" pitchFamily="49" charset="0"/>
-              </a:rPr>
-              <a:t>="</a:t>
-            </a:r>
-            <a:r>
-              <a:rPr lang="fr-FR" sz="1100" dirty="0" err="1">
-                <a:latin typeface="Courier New" panose="02070309020205020404" pitchFamily="49" charset="0"/>
-                <a:cs typeface="Courier New" panose="02070309020205020404" pitchFamily="49" charset="0"/>
-              </a:rPr>
-              <a:t>install</a:t>
-            </a:r>
-            <a:r>
-              <a:rPr lang="fr-FR" sz="1100" dirty="0">
-                <a:latin typeface="Courier New" panose="02070309020205020404" pitchFamily="49" charset="0"/>
-                <a:cs typeface="Courier New" panose="02070309020205020404" pitchFamily="49" charset="0"/>
-              </a:rPr>
-              <a:t>-</a:t>
-            </a:r>
-            <a:r>
-              <a:rPr lang="fr-FR" sz="1100" dirty="0" err="1">
-                <a:latin typeface="Courier New" panose="02070309020205020404" pitchFamily="49" charset="0"/>
-                <a:cs typeface="Courier New" panose="02070309020205020404" pitchFamily="49" charset="0"/>
-              </a:rPr>
-              <a:t>nvidia</a:t>
-            </a:r>
-            <a:r>
-              <a:rPr lang="fr-FR" sz="1100" dirty="0">
-                <a:latin typeface="Courier New" panose="02070309020205020404" pitchFamily="49" charset="0"/>
-                <a:cs typeface="Courier New" panose="02070309020205020404" pitchFamily="49" charset="0"/>
-              </a:rPr>
-              <a:t>-driver=</a:t>
-            </a:r>
-            <a:r>
-              <a:rPr lang="fr-FR" sz="1100" dirty="0" err="1">
-                <a:latin typeface="Courier New" panose="02070309020205020404" pitchFamily="49" charset="0"/>
-                <a:cs typeface="Courier New" panose="02070309020205020404" pitchFamily="49" charset="0"/>
-              </a:rPr>
-              <a:t>True</a:t>
-            </a:r>
-            <a:r>
-              <a:rPr lang="fr-FR" sz="1100" dirty="0">
-                <a:latin typeface="Courier New" panose="02070309020205020404" pitchFamily="49" charset="0"/>
-                <a:cs typeface="Courier New" panose="02070309020205020404" pitchFamily="49" charset="0"/>
-              </a:rPr>
-              <a:t>" \</a:t>
-            </a:r>
-          </a:p>
-          <a:p>
-            <a:r>
-              <a:rPr lang="fr-FR" sz="1100" dirty="0">
-                <a:latin typeface="Courier New" panose="02070309020205020404" pitchFamily="49" charset="0"/>
-                <a:cs typeface="Courier New" panose="02070309020205020404" pitchFamily="49" charset="0"/>
-              </a:rPr>
-              <a:t>        --</a:t>
-            </a:r>
-            <a:r>
-              <a:rPr lang="fr-FR" sz="1100" dirty="0" err="1">
-                <a:latin typeface="Courier New" panose="02070309020205020404" pitchFamily="49" charset="0"/>
-                <a:cs typeface="Courier New" panose="02070309020205020404" pitchFamily="49" charset="0"/>
-              </a:rPr>
-              <a:t>preemptible</a:t>
-            </a:r>
-            <a:endParaRPr lang="fr-FR" sz="1100" dirty="0">
-              <a:latin typeface="Courier New" panose="02070309020205020404" pitchFamily="49" charset="0"/>
-              <a:cs typeface="Courier New" panose="02070309020205020404" pitchFamily="49" charset="0"/>
-            </a:endParaRPr>
-          </a:p>
-          <a:p>
-            <a:endParaRPr lang="fr-FR" sz="1100" dirty="0">
-              <a:latin typeface="Courier New" panose="02070309020205020404" pitchFamily="49" charset="0"/>
-              <a:cs typeface="Courier New" panose="02070309020205020404" pitchFamily="49" charset="0"/>
-            </a:endParaRPr>
-          </a:p>
-          <a:p>
-            <a:r>
-              <a:rPr lang="fr-FR" sz="1100" dirty="0" err="1">
-                <a:latin typeface="Courier New" panose="02070309020205020404" pitchFamily="49" charset="0"/>
-                <a:cs typeface="Courier New" panose="02070309020205020404" pitchFamily="49" charset="0"/>
-              </a:rPr>
-              <a:t>gcloud</a:t>
-            </a:r>
-            <a:r>
-              <a:rPr lang="fr-FR" sz="1100" dirty="0">
-                <a:latin typeface="Courier New" panose="02070309020205020404" pitchFamily="49" charset="0"/>
-                <a:cs typeface="Courier New" panose="02070309020205020404" pitchFamily="49" charset="0"/>
-              </a:rPr>
-              <a:t> </a:t>
-            </a:r>
-            <a:r>
-              <a:rPr lang="fr-FR" sz="1100" dirty="0" err="1">
-                <a:latin typeface="Courier New" panose="02070309020205020404" pitchFamily="49" charset="0"/>
-                <a:cs typeface="Courier New" panose="02070309020205020404" pitchFamily="49" charset="0"/>
-              </a:rPr>
-              <a:t>compute</a:t>
-            </a:r>
-            <a:r>
-              <a:rPr lang="fr-FR" sz="1100" dirty="0">
-                <a:latin typeface="Courier New" panose="02070309020205020404" pitchFamily="49" charset="0"/>
-                <a:cs typeface="Courier New" panose="02070309020205020404" pitchFamily="49" charset="0"/>
-              </a:rPr>
-              <a:t> </a:t>
-            </a:r>
-            <a:r>
-              <a:rPr lang="fr-FR" sz="1100" dirty="0" err="1">
-                <a:latin typeface="Courier New" panose="02070309020205020404" pitchFamily="49" charset="0"/>
-                <a:cs typeface="Courier New" panose="02070309020205020404" pitchFamily="49" charset="0"/>
-              </a:rPr>
-              <a:t>ssh</a:t>
-            </a:r>
-            <a:r>
-              <a:rPr lang="fr-FR" sz="1100" dirty="0">
-                <a:latin typeface="Courier New" panose="02070309020205020404" pitchFamily="49" charset="0"/>
-                <a:cs typeface="Courier New" panose="02070309020205020404" pitchFamily="49" charset="0"/>
-              </a:rPr>
-              <a:t> --zone=$ZONE </a:t>
-            </a:r>
-            <a:r>
-              <a:rPr lang="fr-FR" sz="1100" dirty="0" err="1">
-                <a:latin typeface="Courier New" panose="02070309020205020404" pitchFamily="49" charset="0"/>
-                <a:cs typeface="Courier New" panose="02070309020205020404" pitchFamily="49" charset="0"/>
-              </a:rPr>
-              <a:t>jupyter</a:t>
-            </a:r>
-            <a:r>
-              <a:rPr lang="fr-FR" sz="1100" dirty="0">
-                <a:latin typeface="Courier New" panose="02070309020205020404" pitchFamily="49" charset="0"/>
-                <a:cs typeface="Courier New" panose="02070309020205020404" pitchFamily="49" charset="0"/>
-              </a:rPr>
-              <a:t>@$INSTANCE_NAME -- -L 8080:localhost:8080</a:t>
-            </a:r>
-          </a:p>
-        </p:txBody>
-      </p:sp>
-      <p:sp>
-        <p:nvSpPr>
-          <p:cNvPr id="5" name="Rectangle 4">
-            <a:extLst>
-              <a:ext uri="{FF2B5EF4-FFF2-40B4-BE49-F238E27FC236}">
-                <a16:creationId xmlns:a16="http://schemas.microsoft.com/office/drawing/2014/main" id="{79484E6A-8FB1-48C5-BB6C-0A769EE0D38E}"/>
-              </a:ext>
-            </a:extLst>
-          </p:cNvPr>
-          <p:cNvSpPr/>
-          <p:nvPr/>
-        </p:nvSpPr>
-        <p:spPr>
-          <a:xfrm>
-            <a:off x="6220287" y="2986755"/>
-            <a:ext cx="6096000" cy="1200329"/>
-          </a:xfrm>
-          <a:prstGeom prst="rect">
-            <a:avLst/>
-          </a:prstGeom>
-        </p:spPr>
-        <p:txBody>
-          <a:bodyPr>
-            <a:spAutoFit/>
-          </a:bodyPr>
-          <a:lstStyle/>
-          <a:p>
-            <a:r>
-              <a:rPr lang="fr-FR" dirty="0"/>
-              <a:t>europe-west4-b</a:t>
-            </a:r>
-          </a:p>
-          <a:p>
-            <a:endParaRPr lang="fr-FR" dirty="0"/>
-          </a:p>
-          <a:p>
-            <a:r>
-              <a:rPr lang="fr-FR" dirty="0"/>
-              <a:t>n1-highmem-8	8	52 Go	$0.5212	$0.10990</a:t>
-            </a:r>
-          </a:p>
-          <a:p>
-            <a:r>
-              <a:rPr lang="fr-FR" dirty="0"/>
-              <a:t>NVIDIA® Tesla® T4		16 Go 	$0.35 	$0.11 </a:t>
-            </a:r>
-          </a:p>
-        </p:txBody>
-      </p:sp>
-      <p:sp>
-        <p:nvSpPr>
-          <p:cNvPr id="6" name="ZoneTexte 5">
-            <a:extLst>
-              <a:ext uri="{FF2B5EF4-FFF2-40B4-BE49-F238E27FC236}">
-                <a16:creationId xmlns:a16="http://schemas.microsoft.com/office/drawing/2014/main" id="{C4A6F4E2-F89E-4386-AC76-1DD2A1A47276}"/>
-              </a:ext>
-            </a:extLst>
-          </p:cNvPr>
-          <p:cNvSpPr txBox="1"/>
-          <p:nvPr/>
-        </p:nvSpPr>
-        <p:spPr>
-          <a:xfrm>
-            <a:off x="8968059" y="4556415"/>
-            <a:ext cx="2584747" cy="1200329"/>
-          </a:xfrm>
-          <a:prstGeom prst="rect">
-            <a:avLst/>
-          </a:prstGeom>
-          <a:noFill/>
-        </p:spPr>
-        <p:txBody>
-          <a:bodyPr wrap="none" rtlCol="0">
-            <a:spAutoFit/>
-          </a:bodyPr>
-          <a:lstStyle/>
-          <a:p>
-            <a:r>
-              <a:rPr lang="fr-FR" dirty="0"/>
-              <a:t>300$ free </a:t>
-            </a:r>
-            <a:r>
-              <a:rPr lang="fr-FR" dirty="0" err="1"/>
-              <a:t>credits</a:t>
-            </a:r>
-            <a:r>
-              <a:rPr lang="fr-FR" dirty="0"/>
-              <a:t> =</a:t>
-            </a:r>
-          </a:p>
-          <a:p>
-            <a:pPr marL="285750" indent="-285750">
-              <a:buFont typeface="Arial" panose="020B0604020202020204" pitchFamily="34" charset="0"/>
-              <a:buChar char="•"/>
-            </a:pPr>
-            <a:r>
-              <a:rPr lang="fr-FR" dirty="0"/>
-              <a:t>47h </a:t>
-            </a:r>
-            <a:r>
-              <a:rPr lang="fr-FR" dirty="0" err="1"/>
-              <a:t>compute</a:t>
-            </a:r>
-            <a:r>
-              <a:rPr lang="fr-FR" dirty="0"/>
-              <a:t> par mois</a:t>
-            </a:r>
-          </a:p>
-          <a:p>
-            <a:pPr marL="285750" indent="-285750">
-              <a:buFont typeface="Arial" panose="020B0604020202020204" pitchFamily="34" charset="0"/>
-              <a:buChar char="•"/>
-            </a:pPr>
-            <a:r>
-              <a:rPr lang="fr-FR" dirty="0"/>
-              <a:t>Plus stockage</a:t>
-            </a:r>
-          </a:p>
-          <a:p>
-            <a:pPr marL="285750" indent="-285750">
-              <a:buFont typeface="Arial" panose="020B0604020202020204" pitchFamily="34" charset="0"/>
-              <a:buChar char="•"/>
-            </a:pPr>
-            <a:r>
-              <a:rPr lang="fr-FR" dirty="0"/>
-              <a:t>Pendant 6 mois</a:t>
-            </a:r>
+              <a:rPr lang="fr-FR" sz="4000" b="1" dirty="0" smtClean="0"/>
+              <a:t>Que faire si quota de machines gratuites épuisé ?</a:t>
+            </a:r>
+            <a:endParaRPr lang="fr-FR" sz="4000" b="1" dirty="0"/>
           </a:p>
         </p:txBody>
       </p:sp>
       <p:pic>
         <p:nvPicPr>
-          <p:cNvPr id="7" name="Image 6">
-            <a:extLst>
-              <a:ext uri="{FF2B5EF4-FFF2-40B4-BE49-F238E27FC236}">
-                <a16:creationId xmlns:a16="http://schemas.microsoft.com/office/drawing/2014/main" id="{B1D892D9-2204-4872-883B-431795ABC16E}"/>
-              </a:ext>
-            </a:extLst>
-          </p:cNvPr>
-          <p:cNvPicPr>
-            <a:picLocks noChangeAspect="1"/>
-          </p:cNvPicPr>
+          <p:cNvPr id="5" name="Image 4">
+            <a:extLst>
+              <a:ext uri="{FF2B5EF4-FFF2-40B4-BE49-F238E27FC236}">
+                <a16:creationId xmlns:a16="http://schemas.microsoft.com/office/drawing/2014/main" id="{C9DE2DB8-9B16-4F32-BCDD-72C1A8EEDB16}"/>
+              </a:ext>
+            </a:extLst>
+          </p:cNvPr>
+          <p:cNvPicPr/>
           <p:nvPr/>
         </p:nvPicPr>
         <p:blipFill>
-          <a:blip r:embed="rId3" cstate="email">
+          <a:blip r:embed="rId2" cstate="email">
             <a:extLst>
               <a:ext uri="{28A0092B-C50C-407E-A947-70E740481C1C}">
                 <a14:useLocalDpi xmlns:a14="http://schemas.microsoft.com/office/drawing/2010/main"/>
@@ -8004,8 +7414,1629 @@
         </p:blipFill>
         <p:spPr>
           <a:xfrm>
-            <a:off x="506028" y="1139966"/>
-            <a:ext cx="7909681" cy="2286653"/>
+            <a:off x="1056260" y="1722915"/>
+            <a:ext cx="7296433" cy="2344307"/>
+          </a:xfrm>
+          <a:prstGeom prst="rect">
+            <a:avLst/>
+          </a:prstGeom>
+        </p:spPr>
+      </p:pic>
+      <p:sp>
+        <p:nvSpPr>
+          <p:cNvPr id="6" name="Rectangle 5">
+            <a:extLst>
+              <a:ext uri="{FF2B5EF4-FFF2-40B4-BE49-F238E27FC236}">
+                <a16:creationId xmlns:a16="http://schemas.microsoft.com/office/drawing/2014/main" id="{5B1C96BF-4700-4E8E-B2EB-70738F53B91A}"/>
+              </a:ext>
+            </a:extLst>
+          </p:cNvPr>
+          <p:cNvSpPr/>
+          <p:nvPr/>
+        </p:nvSpPr>
+        <p:spPr>
+          <a:xfrm>
+            <a:off x="960675" y="1334219"/>
+            <a:ext cx="8267391" cy="388696"/>
+          </a:xfrm>
+          <a:prstGeom prst="rect">
+            <a:avLst/>
+          </a:prstGeom>
+        </p:spPr>
+        <p:txBody>
+          <a:bodyPr wrap="none">
+            <a:spAutoFit/>
+          </a:bodyPr>
+          <a:lstStyle/>
+          <a:p>
+            <a:pPr marL="342900" lvl="0" indent="-342900">
+              <a:lnSpc>
+                <a:spcPct val="107000"/>
+              </a:lnSpc>
+              <a:spcAft>
+                <a:spcPts val="800"/>
+              </a:spcAft>
+              <a:buFont typeface="Wingdings" panose="05000000000000000000" pitchFamily="2" charset="2"/>
+              <a:buChar char=""/>
+            </a:pPr>
+            <a:r>
+              <a:rPr lang="fr-FR" dirty="0" smtClean="0">
+                <a:latin typeface="Calibri" panose="020F0502020204030204" pitchFamily="34" charset="0"/>
+                <a:ea typeface="Calibri" panose="020F0502020204030204" pitchFamily="34" charset="0"/>
+                <a:cs typeface="Times New Roman" panose="02020603050405020304" pitchFamily="18" charset="0"/>
+              </a:rPr>
+              <a:t>Sélectionner une machine M4000 avec un plus petit GPU (1792 CUDA </a:t>
+            </a:r>
+            <a:r>
+              <a:rPr lang="fr-FR" dirty="0" err="1" smtClean="0">
+                <a:latin typeface="Calibri" panose="020F0502020204030204" pitchFamily="34" charset="0"/>
+                <a:ea typeface="Calibri" panose="020F0502020204030204" pitchFamily="34" charset="0"/>
+                <a:cs typeface="Times New Roman" panose="02020603050405020304" pitchFamily="18" charset="0"/>
+              </a:rPr>
+              <a:t>cores</a:t>
+            </a:r>
+            <a:r>
+              <a:rPr lang="fr-FR" dirty="0" smtClean="0">
+                <a:latin typeface="Calibri" panose="020F0502020204030204" pitchFamily="34" charset="0"/>
+                <a:ea typeface="Calibri" panose="020F0502020204030204" pitchFamily="34" charset="0"/>
+                <a:cs typeface="Times New Roman" panose="02020603050405020304" pitchFamily="18" charset="0"/>
+              </a:rPr>
+              <a:t> – 8 Go)</a:t>
+            </a:r>
+            <a:endParaRPr lang="fr-FR" dirty="0">
+              <a:latin typeface="Calibri" panose="020F0502020204030204" pitchFamily="34" charset="0"/>
+              <a:ea typeface="Calibri" panose="020F0502020204030204" pitchFamily="34" charset="0"/>
+              <a:cs typeface="Times New Roman" panose="02020603050405020304" pitchFamily="18" charset="0"/>
+            </a:endParaRPr>
+          </a:p>
+        </p:txBody>
+      </p:sp>
+      <p:sp>
+        <p:nvSpPr>
+          <p:cNvPr id="7" name="Rectangle 6">
+            <a:extLst>
+              <a:ext uri="{FF2B5EF4-FFF2-40B4-BE49-F238E27FC236}">
+                <a16:creationId xmlns:a16="http://schemas.microsoft.com/office/drawing/2014/main" id="{5B1C96BF-4700-4E8E-B2EB-70738F53B91A}"/>
+              </a:ext>
+            </a:extLst>
+          </p:cNvPr>
+          <p:cNvSpPr/>
+          <p:nvPr/>
+        </p:nvSpPr>
+        <p:spPr>
+          <a:xfrm>
+            <a:off x="1004079" y="4434692"/>
+            <a:ext cx="2695803" cy="388696"/>
+          </a:xfrm>
+          <a:prstGeom prst="rect">
+            <a:avLst/>
+          </a:prstGeom>
+        </p:spPr>
+        <p:txBody>
+          <a:bodyPr wrap="none">
+            <a:spAutoFit/>
+          </a:bodyPr>
+          <a:lstStyle/>
+          <a:p>
+            <a:pPr marL="342900" lvl="0" indent="-342900">
+              <a:lnSpc>
+                <a:spcPct val="107000"/>
+              </a:lnSpc>
+              <a:spcAft>
+                <a:spcPts val="800"/>
+              </a:spcAft>
+              <a:buFont typeface="Wingdings" panose="05000000000000000000" pitchFamily="2" charset="2"/>
+              <a:buChar char=""/>
+            </a:pPr>
+            <a:r>
+              <a:rPr lang="fr-FR" dirty="0" smtClean="0">
+                <a:latin typeface="Calibri" panose="020F0502020204030204" pitchFamily="34" charset="0"/>
+                <a:ea typeface="Calibri" panose="020F0502020204030204" pitchFamily="34" charset="0"/>
+                <a:cs typeface="Times New Roman" panose="02020603050405020304" pitchFamily="18" charset="0"/>
+              </a:rPr>
+              <a:t>Passer à l’offre payante</a:t>
+            </a:r>
+            <a:endParaRPr lang="fr-FR" dirty="0">
+              <a:latin typeface="Calibri" panose="020F0502020204030204" pitchFamily="34" charset="0"/>
+              <a:ea typeface="Calibri" panose="020F0502020204030204" pitchFamily="34" charset="0"/>
+              <a:cs typeface="Times New Roman" panose="02020603050405020304" pitchFamily="18" charset="0"/>
+            </a:endParaRPr>
+          </a:p>
+        </p:txBody>
+      </p:sp>
+      <p:pic>
+        <p:nvPicPr>
+          <p:cNvPr id="8" name="Image 7"/>
+          <p:cNvPicPr>
+            <a:picLocks noChangeAspect="1"/>
+          </p:cNvPicPr>
+          <p:nvPr/>
+        </p:nvPicPr>
+        <p:blipFill>
+          <a:blip r:embed="rId3" cstate="email">
+            <a:extLst>
+              <a:ext uri="{28A0092B-C50C-407E-A947-70E740481C1C}">
+                <a14:useLocalDpi xmlns:a14="http://schemas.microsoft.com/office/drawing/2010/main"/>
+              </a:ext>
+            </a:extLst>
+          </a:blip>
+          <a:stretch>
+            <a:fillRect/>
+          </a:stretch>
+        </p:blipFill>
+        <p:spPr>
+          <a:xfrm>
+            <a:off x="5316672" y="4844614"/>
+            <a:ext cx="1456351" cy="1811971"/>
+          </a:xfrm>
+          <a:prstGeom prst="rect">
+            <a:avLst/>
+          </a:prstGeom>
+        </p:spPr>
+      </p:pic>
+      <p:pic>
+        <p:nvPicPr>
+          <p:cNvPr id="9" name="Image 8"/>
+          <p:cNvPicPr>
+            <a:picLocks noChangeAspect="1"/>
+          </p:cNvPicPr>
+          <p:nvPr/>
+        </p:nvPicPr>
+        <p:blipFill>
+          <a:blip r:embed="rId4" cstate="email">
+            <a:extLst>
+              <a:ext uri="{28A0092B-C50C-407E-A947-70E740481C1C}">
+                <a14:useLocalDpi xmlns:a14="http://schemas.microsoft.com/office/drawing/2010/main"/>
+              </a:ext>
+            </a:extLst>
+          </a:blip>
+          <a:stretch>
+            <a:fillRect/>
+          </a:stretch>
+        </p:blipFill>
+        <p:spPr>
+          <a:xfrm>
+            <a:off x="7080912" y="4844614"/>
+            <a:ext cx="2147154" cy="1314078"/>
+          </a:xfrm>
+          <a:prstGeom prst="rect">
+            <a:avLst/>
+          </a:prstGeom>
+        </p:spPr>
+      </p:pic>
+      <p:cxnSp>
+        <p:nvCxnSpPr>
+          <p:cNvPr id="11" name="Connecteur droit avec flèche 10"/>
+          <p:cNvCxnSpPr/>
+          <p:nvPr/>
+        </p:nvCxnSpPr>
+        <p:spPr>
+          <a:xfrm>
+            <a:off x="5688624" y="2387891"/>
+            <a:ext cx="0" cy="844062"/>
+          </a:xfrm>
+          <a:prstGeom prst="straightConnector1">
+            <a:avLst/>
+          </a:prstGeom>
+          <a:ln w="57150">
+            <a:solidFill>
+              <a:srgbClr val="FF0000"/>
+            </a:solidFill>
+            <a:tailEnd type="triangle"/>
+          </a:ln>
+        </p:spPr>
+        <p:style>
+          <a:lnRef idx="1">
+            <a:schemeClr val="accent1"/>
+          </a:lnRef>
+          <a:fillRef idx="0">
+            <a:schemeClr val="accent1"/>
+          </a:fillRef>
+          <a:effectRef idx="0">
+            <a:schemeClr val="accent1"/>
+          </a:effectRef>
+          <a:fontRef idx="minor">
+            <a:schemeClr val="tx1"/>
+          </a:fontRef>
+        </p:style>
+      </p:cxnSp>
+      <p:pic>
+        <p:nvPicPr>
+          <p:cNvPr id="12" name="Image 11"/>
+          <p:cNvPicPr>
+            <a:picLocks noChangeAspect="1"/>
+          </p:cNvPicPr>
+          <p:nvPr/>
+        </p:nvPicPr>
+        <p:blipFill>
+          <a:blip r:embed="rId5" cstate="email">
+            <a:extLst>
+              <a:ext uri="{28A0092B-C50C-407E-A947-70E740481C1C}">
+                <a14:useLocalDpi xmlns:a14="http://schemas.microsoft.com/office/drawing/2010/main"/>
+              </a:ext>
+            </a:extLst>
+          </a:blip>
+          <a:stretch>
+            <a:fillRect/>
+          </a:stretch>
+        </p:blipFill>
+        <p:spPr>
+          <a:xfrm>
+            <a:off x="9583721" y="1722915"/>
+            <a:ext cx="2233822" cy="4787778"/>
+          </a:xfrm>
+          <a:prstGeom prst="rect">
+            <a:avLst/>
+          </a:prstGeom>
+        </p:spPr>
+      </p:pic>
+      <p:pic>
+        <p:nvPicPr>
+          <p:cNvPr id="13" name="Image 12"/>
+          <p:cNvPicPr>
+            <a:picLocks noChangeAspect="1"/>
+          </p:cNvPicPr>
+          <p:nvPr/>
+        </p:nvPicPr>
+        <p:blipFill>
+          <a:blip r:embed="rId6" cstate="email">
+            <a:extLst>
+              <a:ext uri="{28A0092B-C50C-407E-A947-70E740481C1C}">
+                <a14:useLocalDpi xmlns:a14="http://schemas.microsoft.com/office/drawing/2010/main"/>
+              </a:ext>
+            </a:extLst>
+          </a:blip>
+          <a:stretch>
+            <a:fillRect/>
+          </a:stretch>
+        </p:blipFill>
+        <p:spPr>
+          <a:xfrm>
+            <a:off x="231215" y="5190858"/>
+            <a:ext cx="4891453" cy="682703"/>
+          </a:xfrm>
+          <a:prstGeom prst="rect">
+            <a:avLst/>
+          </a:prstGeom>
+        </p:spPr>
+      </p:pic>
+      <p:pic>
+        <p:nvPicPr>
+          <p:cNvPr id="14" name="Image 13"/>
+          <p:cNvPicPr>
+            <a:picLocks noChangeAspect="1"/>
+          </p:cNvPicPr>
+          <p:nvPr/>
+        </p:nvPicPr>
+        <p:blipFill>
+          <a:blip r:embed="rId7" cstate="email">
+            <a:extLst>
+              <a:ext uri="{28A0092B-C50C-407E-A947-70E740481C1C}">
+                <a14:useLocalDpi xmlns:a14="http://schemas.microsoft.com/office/drawing/2010/main"/>
+              </a:ext>
+            </a:extLst>
+          </a:blip>
+          <a:stretch>
+            <a:fillRect/>
+          </a:stretch>
+        </p:blipFill>
+        <p:spPr>
+          <a:xfrm>
+            <a:off x="231215" y="4844614"/>
+            <a:ext cx="4907629" cy="346244"/>
+          </a:xfrm>
+          <a:prstGeom prst="rect">
+            <a:avLst/>
+          </a:prstGeom>
+        </p:spPr>
+      </p:pic>
+    </p:spTree>
+    <p:extLst>
+      <p:ext uri="{BB962C8B-B14F-4D97-AF65-F5344CB8AC3E}">
+        <p14:creationId xmlns:p14="http://schemas.microsoft.com/office/powerpoint/2010/main" val="3839793792"/>
+      </p:ext>
+    </p:extLst>
+  </p:cSld>
+  <p:clrMapOvr>
+    <a:masterClrMapping/>
+  </p:clrMapOvr>
+</p:sld>
+</file>
+
+<file path=ppt/slides/slide21.xml><?xml version="1.0" encoding="utf-8"?>
+<p:sld xmlns:a="http://schemas.openxmlformats.org/drawingml/2006/main" xmlns:r="http://schemas.openxmlformats.org/officeDocument/2006/relationships" xmlns:p="http://schemas.openxmlformats.org/presentationml/2006/main">
+  <p:cSld>
+    <p:spTree>
+      <p:nvGrpSpPr>
+        <p:cNvPr id="1" name=""/>
+        <p:cNvGrpSpPr/>
+        <p:nvPr/>
+      </p:nvGrpSpPr>
+      <p:grpSpPr>
+        <a:xfrm>
+          <a:off x="0" y="0"/>
+          <a:ext cx="0" cy="0"/>
+          <a:chOff x="0" y="0"/>
+          <a:chExt cx="0" cy="0"/>
+        </a:xfrm>
+      </p:grpSpPr>
+      <p:sp>
+        <p:nvSpPr>
+          <p:cNvPr id="4" name="ZoneTexte 3">
+            <a:extLst>
+              <a:ext uri="{FF2B5EF4-FFF2-40B4-BE49-F238E27FC236}">
+                <a16:creationId xmlns:a16="http://schemas.microsoft.com/office/drawing/2014/main" id="{579CB3FE-4FB2-4415-B1BA-6D0C957B2A81}"/>
+              </a:ext>
+            </a:extLst>
+          </p:cNvPr>
+          <p:cNvSpPr txBox="1"/>
+          <p:nvPr/>
+        </p:nvSpPr>
+        <p:spPr>
+          <a:xfrm>
+            <a:off x="506028" y="328474"/>
+            <a:ext cx="4562211" cy="707886"/>
+          </a:xfrm>
+          <a:prstGeom prst="rect">
+            <a:avLst/>
+          </a:prstGeom>
+          <a:noFill/>
+        </p:spPr>
+        <p:txBody>
+          <a:bodyPr wrap="none" rtlCol="0">
+            <a:spAutoFit/>
+          </a:bodyPr>
+          <a:lstStyle/>
+          <a:p>
+            <a:r>
+              <a:rPr lang="fr-FR" sz="4000" b="1" dirty="0"/>
+              <a:t>Option </a:t>
+            </a:r>
+            <a:r>
+              <a:rPr lang="fr-FR" sz="4000" b="1" dirty="0" smtClean="0"/>
+              <a:t>PC personnel</a:t>
+            </a:r>
+            <a:endParaRPr lang="fr-FR" sz="4000" b="1" dirty="0"/>
+          </a:p>
+        </p:txBody>
+      </p:sp>
+      <p:sp>
+        <p:nvSpPr>
+          <p:cNvPr id="5" name="Rectangle 4"/>
+          <p:cNvSpPr/>
+          <p:nvPr/>
+        </p:nvSpPr>
+        <p:spPr>
+          <a:xfrm>
+            <a:off x="612529" y="1813366"/>
+            <a:ext cx="7678615" cy="369332"/>
+          </a:xfrm>
+          <a:prstGeom prst="rect">
+            <a:avLst/>
+          </a:prstGeom>
+        </p:spPr>
+        <p:txBody>
+          <a:bodyPr wrap="square">
+            <a:spAutoFit/>
+          </a:bodyPr>
+          <a:lstStyle/>
+          <a:p>
+            <a:r>
+              <a:rPr lang="fr-FR" dirty="0">
+                <a:hlinkClick r:id="rId2"/>
+              </a:rPr>
+              <a:t>https://www.windowscentral.com/install-windows-subsystem-linux-windows-10</a:t>
+            </a:r>
+            <a:endParaRPr lang="fr-FR" dirty="0"/>
+          </a:p>
+        </p:txBody>
+      </p:sp>
+      <p:sp>
+        <p:nvSpPr>
+          <p:cNvPr id="6" name="Rectangle 5">
+            <a:extLst>
+              <a:ext uri="{FF2B5EF4-FFF2-40B4-BE49-F238E27FC236}">
+                <a16:creationId xmlns:a16="http://schemas.microsoft.com/office/drawing/2014/main" id="{DE9CC235-7543-4846-AE01-6C5704C642CF}"/>
+              </a:ext>
+            </a:extLst>
+          </p:cNvPr>
+          <p:cNvSpPr/>
+          <p:nvPr/>
+        </p:nvSpPr>
+        <p:spPr>
+          <a:xfrm>
+            <a:off x="506028" y="1332885"/>
+            <a:ext cx="6096000" cy="375552"/>
+          </a:xfrm>
+          <a:prstGeom prst="rect">
+            <a:avLst/>
+          </a:prstGeom>
+        </p:spPr>
+        <p:txBody>
+          <a:bodyPr>
+            <a:spAutoFit/>
+          </a:bodyPr>
+          <a:lstStyle/>
+          <a:p>
+            <a:pPr marL="342900" lvl="0" indent="-342900">
+              <a:lnSpc>
+                <a:spcPct val="107000"/>
+              </a:lnSpc>
+              <a:spcAft>
+                <a:spcPts val="800"/>
+              </a:spcAft>
+              <a:buFont typeface="Wingdings" panose="05000000000000000000" pitchFamily="2" charset="2"/>
+              <a:buChar char=""/>
+            </a:pPr>
+            <a:r>
+              <a:rPr lang="fr-FR" dirty="0" smtClean="0">
+                <a:latin typeface="Calibri" panose="020F0502020204030204" pitchFamily="34" charset="0"/>
+                <a:ea typeface="Calibri" panose="020F0502020204030204" pitchFamily="34" charset="0"/>
+                <a:cs typeface="Times New Roman" panose="02020603050405020304" pitchFamily="18" charset="0"/>
+              </a:rPr>
+              <a:t>Activer Windows </a:t>
+            </a:r>
+            <a:r>
+              <a:rPr lang="fr-FR" dirty="0" err="1" smtClean="0">
+                <a:latin typeface="Calibri" panose="020F0502020204030204" pitchFamily="34" charset="0"/>
+                <a:ea typeface="Calibri" panose="020F0502020204030204" pitchFamily="34" charset="0"/>
+                <a:cs typeface="Times New Roman" panose="02020603050405020304" pitchFamily="18" charset="0"/>
+              </a:rPr>
+              <a:t>Subsystem</a:t>
+            </a:r>
+            <a:r>
+              <a:rPr lang="fr-FR" dirty="0" smtClean="0">
+                <a:latin typeface="Calibri" panose="020F0502020204030204" pitchFamily="34" charset="0"/>
+                <a:ea typeface="Calibri" panose="020F0502020204030204" pitchFamily="34" charset="0"/>
+                <a:cs typeface="Times New Roman" panose="02020603050405020304" pitchFamily="18" charset="0"/>
+              </a:rPr>
+              <a:t> for Linux</a:t>
+            </a:r>
+            <a:endParaRPr lang="fr-FR" dirty="0">
+              <a:latin typeface="Calibri" panose="020F0502020204030204" pitchFamily="34" charset="0"/>
+              <a:ea typeface="Calibri" panose="020F0502020204030204" pitchFamily="34" charset="0"/>
+              <a:cs typeface="Times New Roman" panose="02020603050405020304" pitchFamily="18" charset="0"/>
+            </a:endParaRPr>
+          </a:p>
+        </p:txBody>
+      </p:sp>
+      <p:pic>
+        <p:nvPicPr>
+          <p:cNvPr id="7" name="Image 6"/>
+          <p:cNvPicPr>
+            <a:picLocks noChangeAspect="1"/>
+          </p:cNvPicPr>
+          <p:nvPr/>
+        </p:nvPicPr>
+        <p:blipFill>
+          <a:blip r:embed="rId3" cstate="email">
+            <a:extLst>
+              <a:ext uri="{28A0092B-C50C-407E-A947-70E740481C1C}">
+                <a14:useLocalDpi xmlns:a14="http://schemas.microsoft.com/office/drawing/2010/main"/>
+              </a:ext>
+            </a:extLst>
+          </a:blip>
+          <a:stretch>
+            <a:fillRect/>
+          </a:stretch>
+        </p:blipFill>
+        <p:spPr>
+          <a:xfrm>
+            <a:off x="8463065" y="808343"/>
+            <a:ext cx="3283459" cy="1374355"/>
+          </a:xfrm>
+          <a:prstGeom prst="rect">
+            <a:avLst/>
+          </a:prstGeom>
+        </p:spPr>
+      </p:pic>
+      <p:sp>
+        <p:nvSpPr>
+          <p:cNvPr id="8" name="Rectangle 7">
+            <a:extLst>
+              <a:ext uri="{FF2B5EF4-FFF2-40B4-BE49-F238E27FC236}">
+                <a16:creationId xmlns:a16="http://schemas.microsoft.com/office/drawing/2014/main" id="{DE9CC235-7543-4846-AE01-6C5704C642CF}"/>
+              </a:ext>
+            </a:extLst>
+          </p:cNvPr>
+          <p:cNvSpPr/>
+          <p:nvPr/>
+        </p:nvSpPr>
+        <p:spPr>
+          <a:xfrm>
+            <a:off x="506030" y="2479890"/>
+            <a:ext cx="6096000" cy="375552"/>
+          </a:xfrm>
+          <a:prstGeom prst="rect">
+            <a:avLst/>
+          </a:prstGeom>
+        </p:spPr>
+        <p:txBody>
+          <a:bodyPr>
+            <a:spAutoFit/>
+          </a:bodyPr>
+          <a:lstStyle/>
+          <a:p>
+            <a:pPr marL="342900" lvl="0" indent="-342900">
+              <a:lnSpc>
+                <a:spcPct val="107000"/>
+              </a:lnSpc>
+              <a:spcAft>
+                <a:spcPts val="800"/>
+              </a:spcAft>
+              <a:buFont typeface="Wingdings" panose="05000000000000000000" pitchFamily="2" charset="2"/>
+              <a:buChar char=""/>
+            </a:pPr>
+            <a:r>
+              <a:rPr lang="fr-FR" dirty="0" smtClean="0">
+                <a:latin typeface="Calibri" panose="020F0502020204030204" pitchFamily="34" charset="0"/>
+                <a:ea typeface="Calibri" panose="020F0502020204030204" pitchFamily="34" charset="0"/>
+                <a:cs typeface="Times New Roman" panose="02020603050405020304" pitchFamily="18" charset="0"/>
+              </a:rPr>
+              <a:t>Installer Anaconda Python</a:t>
+            </a:r>
+            <a:endParaRPr lang="fr-FR" dirty="0">
+              <a:latin typeface="Calibri" panose="020F0502020204030204" pitchFamily="34" charset="0"/>
+              <a:ea typeface="Calibri" panose="020F0502020204030204" pitchFamily="34" charset="0"/>
+              <a:cs typeface="Times New Roman" panose="02020603050405020304" pitchFamily="18" charset="0"/>
+            </a:endParaRPr>
+          </a:p>
+        </p:txBody>
+      </p:sp>
+      <p:sp>
+        <p:nvSpPr>
+          <p:cNvPr id="11" name="Rectangle 10"/>
+          <p:cNvSpPr/>
+          <p:nvPr/>
+        </p:nvSpPr>
+        <p:spPr>
+          <a:xfrm>
+            <a:off x="612530" y="2954151"/>
+            <a:ext cx="7511563" cy="646331"/>
+          </a:xfrm>
+          <a:prstGeom prst="rect">
+            <a:avLst/>
+          </a:prstGeom>
+        </p:spPr>
+        <p:txBody>
+          <a:bodyPr wrap="square">
+            <a:spAutoFit/>
+          </a:bodyPr>
+          <a:lstStyle/>
+          <a:p>
+            <a:r>
+              <a:rPr lang="fr-FR" dirty="0">
+                <a:hlinkClick r:id="rId4"/>
+              </a:rPr>
+              <a:t>https://www.digitalocean.com/community/tutorials/how-to-install-anaconda-on-ubuntu-18-04-quickstart-fr</a:t>
+            </a:r>
+            <a:endParaRPr lang="fr-FR" dirty="0"/>
+          </a:p>
+        </p:txBody>
+      </p:sp>
+      <p:sp>
+        <p:nvSpPr>
+          <p:cNvPr id="12" name="Rectangle 11"/>
+          <p:cNvSpPr/>
+          <p:nvPr/>
+        </p:nvSpPr>
+        <p:spPr>
+          <a:xfrm>
+            <a:off x="612530" y="3699191"/>
+            <a:ext cx="5890202" cy="369332"/>
+          </a:xfrm>
+          <a:prstGeom prst="rect">
+            <a:avLst/>
+          </a:prstGeom>
+        </p:spPr>
+        <p:txBody>
+          <a:bodyPr wrap="none">
+            <a:spAutoFit/>
+          </a:bodyPr>
+          <a:lstStyle/>
+          <a:p>
+            <a:r>
+              <a:rPr lang="fr-FR" dirty="0">
+                <a:hlinkClick r:id="rId5"/>
+              </a:rPr>
+              <a:t>https://www.anaconda.com/distribution/#download-section</a:t>
+            </a:r>
+            <a:endParaRPr lang="fr-FR" dirty="0"/>
+          </a:p>
+        </p:txBody>
+      </p:sp>
+      <p:pic>
+        <p:nvPicPr>
+          <p:cNvPr id="13" name="Image 12"/>
+          <p:cNvPicPr>
+            <a:picLocks noChangeAspect="1"/>
+          </p:cNvPicPr>
+          <p:nvPr/>
+        </p:nvPicPr>
+        <p:blipFill>
+          <a:blip r:embed="rId6"/>
+          <a:stretch>
+            <a:fillRect/>
+          </a:stretch>
+        </p:blipFill>
+        <p:spPr>
+          <a:xfrm>
+            <a:off x="8690138" y="3164502"/>
+            <a:ext cx="2829309" cy="776039"/>
+          </a:xfrm>
+          <a:prstGeom prst="rect">
+            <a:avLst/>
+          </a:prstGeom>
+        </p:spPr>
+      </p:pic>
+      <p:sp>
+        <p:nvSpPr>
+          <p:cNvPr id="14" name="Rectangle 13">
+            <a:extLst>
+              <a:ext uri="{FF2B5EF4-FFF2-40B4-BE49-F238E27FC236}">
+                <a16:creationId xmlns:a16="http://schemas.microsoft.com/office/drawing/2014/main" id="{DE9CC235-7543-4846-AE01-6C5704C642CF}"/>
+              </a:ext>
+            </a:extLst>
+          </p:cNvPr>
+          <p:cNvSpPr/>
+          <p:nvPr/>
+        </p:nvSpPr>
+        <p:spPr>
+          <a:xfrm>
+            <a:off x="506028" y="4892696"/>
+            <a:ext cx="6650910" cy="388696"/>
+          </a:xfrm>
+          <a:prstGeom prst="rect">
+            <a:avLst/>
+          </a:prstGeom>
+        </p:spPr>
+        <p:txBody>
+          <a:bodyPr wrap="square">
+            <a:spAutoFit/>
+          </a:bodyPr>
+          <a:lstStyle/>
+          <a:p>
+            <a:pPr marL="342900" lvl="0" indent="-342900">
+              <a:lnSpc>
+                <a:spcPct val="107000"/>
+              </a:lnSpc>
+              <a:spcAft>
+                <a:spcPts val="800"/>
+              </a:spcAft>
+              <a:buFont typeface="Wingdings" panose="05000000000000000000" pitchFamily="2" charset="2"/>
+              <a:buChar char=""/>
+            </a:pPr>
+            <a:r>
+              <a:rPr lang="fr-FR" dirty="0" smtClean="0">
+                <a:latin typeface="Calibri" panose="020F0502020204030204" pitchFamily="34" charset="0"/>
+                <a:ea typeface="Calibri" panose="020F0502020204030204" pitchFamily="34" charset="0"/>
+                <a:cs typeface="Times New Roman" panose="02020603050405020304" pitchFamily="18" charset="0"/>
+              </a:rPr>
+              <a:t>Installer </a:t>
+            </a:r>
+            <a:r>
+              <a:rPr lang="fr-FR" dirty="0" err="1" smtClean="0">
+                <a:latin typeface="Calibri" panose="020F0502020204030204" pitchFamily="34" charset="0"/>
+                <a:ea typeface="Calibri" panose="020F0502020204030204" pitchFamily="34" charset="0"/>
+                <a:cs typeface="Times New Roman" panose="02020603050405020304" pitchFamily="18" charset="0"/>
+              </a:rPr>
+              <a:t>Jupyter</a:t>
+            </a:r>
+            <a:r>
+              <a:rPr lang="fr-FR" dirty="0" smtClean="0">
+                <a:latin typeface="Calibri" panose="020F0502020204030204" pitchFamily="34" charset="0"/>
+                <a:ea typeface="Calibri" panose="020F0502020204030204" pitchFamily="34" charset="0"/>
+                <a:cs typeface="Times New Roman" panose="02020603050405020304" pitchFamily="18" charset="0"/>
+              </a:rPr>
+              <a:t>, </a:t>
+            </a:r>
+            <a:r>
+              <a:rPr lang="fr-FR" dirty="0" err="1" smtClean="0">
+                <a:latin typeface="Calibri" panose="020F0502020204030204" pitchFamily="34" charset="0"/>
+                <a:ea typeface="Calibri" panose="020F0502020204030204" pitchFamily="34" charset="0"/>
+                <a:cs typeface="Times New Roman" panose="02020603050405020304" pitchFamily="18" charset="0"/>
+              </a:rPr>
+              <a:t>fastai</a:t>
+            </a:r>
+            <a:r>
+              <a:rPr lang="fr-FR" dirty="0" smtClean="0">
+                <a:latin typeface="Calibri" panose="020F0502020204030204" pitchFamily="34" charset="0"/>
+                <a:ea typeface="Calibri" panose="020F0502020204030204" pitchFamily="34" charset="0"/>
+                <a:cs typeface="Times New Roman" panose="02020603050405020304" pitchFamily="18" charset="0"/>
+              </a:rPr>
+              <a:t> et </a:t>
+            </a:r>
+            <a:r>
+              <a:rPr lang="fr-FR" dirty="0" err="1" smtClean="0">
+                <a:latin typeface="Calibri" panose="020F0502020204030204" pitchFamily="34" charset="0"/>
+                <a:ea typeface="Calibri" panose="020F0502020204030204" pitchFamily="34" charset="0"/>
+                <a:cs typeface="Times New Roman" panose="02020603050405020304" pitchFamily="18" charset="0"/>
+              </a:rPr>
+              <a:t>PyTorch</a:t>
+            </a:r>
+            <a:r>
+              <a:rPr lang="fr-FR" dirty="0" smtClean="0">
+                <a:latin typeface="Calibri" panose="020F0502020204030204" pitchFamily="34" charset="0"/>
+                <a:ea typeface="Calibri" panose="020F0502020204030204" pitchFamily="34" charset="0"/>
+                <a:cs typeface="Times New Roman" panose="02020603050405020304" pitchFamily="18" charset="0"/>
+              </a:rPr>
+              <a:t> dans un environnement virtuel</a:t>
+            </a:r>
+            <a:endParaRPr lang="fr-FR" dirty="0">
+              <a:latin typeface="Calibri" panose="020F0502020204030204" pitchFamily="34" charset="0"/>
+              <a:ea typeface="Calibri" panose="020F0502020204030204" pitchFamily="34" charset="0"/>
+              <a:cs typeface="Times New Roman" panose="02020603050405020304" pitchFamily="18" charset="0"/>
+            </a:endParaRPr>
+          </a:p>
+        </p:txBody>
+      </p:sp>
+      <p:sp>
+        <p:nvSpPr>
+          <p:cNvPr id="15" name="Rectangle 14"/>
+          <p:cNvSpPr/>
+          <p:nvPr/>
+        </p:nvSpPr>
+        <p:spPr>
+          <a:xfrm>
+            <a:off x="612529" y="4167232"/>
+            <a:ext cx="10228387" cy="369332"/>
+          </a:xfrm>
+          <a:prstGeom prst="rect">
+            <a:avLst/>
+          </a:prstGeom>
+        </p:spPr>
+        <p:txBody>
+          <a:bodyPr wrap="square">
+            <a:spAutoFit/>
+          </a:bodyPr>
+          <a:lstStyle/>
+          <a:p>
+            <a:r>
+              <a:rPr lang="fr-FR" dirty="0">
+                <a:hlinkClick r:id="rId7"/>
+              </a:rPr>
+              <a:t>https://docs.conda.io/projects/conda/en/latest/user-guide/tasks/manage-environments.html</a:t>
+            </a:r>
+            <a:endParaRPr lang="fr-FR" dirty="0"/>
+          </a:p>
+        </p:txBody>
+      </p:sp>
+      <p:sp>
+        <p:nvSpPr>
+          <p:cNvPr id="17" name="Rectangle 16"/>
+          <p:cNvSpPr/>
+          <p:nvPr/>
+        </p:nvSpPr>
+        <p:spPr>
+          <a:xfrm>
+            <a:off x="1035524" y="5408575"/>
+            <a:ext cx="3684983" cy="369332"/>
+          </a:xfrm>
+          <a:prstGeom prst="rect">
+            <a:avLst/>
+          </a:prstGeom>
+        </p:spPr>
+        <p:txBody>
+          <a:bodyPr wrap="none">
+            <a:spAutoFit/>
+          </a:bodyPr>
+          <a:lstStyle/>
+          <a:p>
+            <a:r>
+              <a:rPr lang="sv-SE" dirty="0" smtClean="0"/>
+              <a:t>conda install -c pytorch -c fastai fastai</a:t>
+            </a:r>
+            <a:endParaRPr lang="fr-FR" dirty="0"/>
+          </a:p>
+        </p:txBody>
+      </p:sp>
+      <p:sp>
+        <p:nvSpPr>
+          <p:cNvPr id="19" name="Rectangle 18"/>
+          <p:cNvSpPr/>
+          <p:nvPr/>
+        </p:nvSpPr>
+        <p:spPr>
+          <a:xfrm>
+            <a:off x="1035524" y="5777907"/>
+            <a:ext cx="1757982" cy="369332"/>
+          </a:xfrm>
+          <a:prstGeom prst="rect">
+            <a:avLst/>
+          </a:prstGeom>
+        </p:spPr>
+        <p:txBody>
+          <a:bodyPr wrap="none">
+            <a:spAutoFit/>
+          </a:bodyPr>
+          <a:lstStyle/>
+          <a:p>
+            <a:r>
+              <a:rPr lang="fr-FR" dirty="0" err="1"/>
+              <a:t>pip</a:t>
+            </a:r>
+            <a:r>
+              <a:rPr lang="fr-FR" dirty="0"/>
+              <a:t> </a:t>
+            </a:r>
+            <a:r>
+              <a:rPr lang="fr-FR" dirty="0" err="1"/>
+              <a:t>install</a:t>
+            </a:r>
+            <a:r>
+              <a:rPr lang="fr-FR" dirty="0"/>
+              <a:t> fastai2</a:t>
+            </a:r>
+          </a:p>
+        </p:txBody>
+      </p:sp>
+      <p:sp>
+        <p:nvSpPr>
+          <p:cNvPr id="20" name="Rectangle 19"/>
+          <p:cNvSpPr/>
+          <p:nvPr/>
+        </p:nvSpPr>
+        <p:spPr>
+          <a:xfrm>
+            <a:off x="1035524" y="6147239"/>
+            <a:ext cx="1813125" cy="369332"/>
+          </a:xfrm>
+          <a:prstGeom prst="rect">
+            <a:avLst/>
+          </a:prstGeom>
+        </p:spPr>
+        <p:txBody>
+          <a:bodyPr wrap="none">
+            <a:spAutoFit/>
+          </a:bodyPr>
+          <a:lstStyle/>
+          <a:p>
+            <a:r>
+              <a:rPr lang="fr-FR" dirty="0" err="1"/>
+              <a:t>jupyter</a:t>
+            </a:r>
+            <a:r>
+              <a:rPr lang="fr-FR" dirty="0"/>
+              <a:t> notebook</a:t>
+            </a:r>
+          </a:p>
+        </p:txBody>
+      </p:sp>
+      <p:pic>
+        <p:nvPicPr>
+          <p:cNvPr id="22" name="Image 21"/>
+          <p:cNvPicPr>
+            <a:picLocks noChangeAspect="1"/>
+          </p:cNvPicPr>
+          <p:nvPr/>
+        </p:nvPicPr>
+        <p:blipFill>
+          <a:blip r:embed="rId8" cstate="email">
+            <a:extLst>
+              <a:ext uri="{28A0092B-C50C-407E-A947-70E740481C1C}">
+                <a14:useLocalDpi xmlns:a14="http://schemas.microsoft.com/office/drawing/2010/main"/>
+              </a:ext>
+            </a:extLst>
+          </a:blip>
+          <a:stretch>
+            <a:fillRect/>
+          </a:stretch>
+        </p:blipFill>
+        <p:spPr>
+          <a:xfrm>
+            <a:off x="9040923" y="5018997"/>
+            <a:ext cx="2127741" cy="1497574"/>
+          </a:xfrm>
+          <a:prstGeom prst="rect">
+            <a:avLst/>
+          </a:prstGeom>
+        </p:spPr>
+      </p:pic>
+    </p:spTree>
+    <p:extLst>
+      <p:ext uri="{BB962C8B-B14F-4D97-AF65-F5344CB8AC3E}">
+        <p14:creationId xmlns:p14="http://schemas.microsoft.com/office/powerpoint/2010/main" val="1723300113"/>
+      </p:ext>
+    </p:extLst>
+  </p:cSld>
+  <p:clrMapOvr>
+    <a:masterClrMapping/>
+  </p:clrMapOvr>
+</p:sld>
+</file>
+
+<file path=ppt/slides/slide22.xml><?xml version="1.0" encoding="utf-8"?>
+<p:sld xmlns:a="http://schemas.openxmlformats.org/drawingml/2006/main" xmlns:r="http://schemas.openxmlformats.org/officeDocument/2006/relationships" xmlns:p="http://schemas.openxmlformats.org/presentationml/2006/main">
+  <p:cSld>
+    <p:spTree>
+      <p:nvGrpSpPr>
+        <p:cNvPr id="1" name=""/>
+        <p:cNvGrpSpPr/>
+        <p:nvPr/>
+      </p:nvGrpSpPr>
+      <p:grpSpPr>
+        <a:xfrm>
+          <a:off x="0" y="0"/>
+          <a:ext cx="0" cy="0"/>
+          <a:chOff x="0" y="0"/>
+          <a:chExt cx="0" cy="0"/>
+        </a:xfrm>
+      </p:grpSpPr>
+      <p:sp>
+        <p:nvSpPr>
+          <p:cNvPr id="2" name="Rectangle 1">
+            <a:extLst>
+              <a:ext uri="{FF2B5EF4-FFF2-40B4-BE49-F238E27FC236}">
+                <a16:creationId xmlns:a16="http://schemas.microsoft.com/office/drawing/2014/main" id="{68291C99-5A1E-4D38-A33A-83771E962E1D}"/>
+              </a:ext>
+            </a:extLst>
+          </p:cNvPr>
+          <p:cNvSpPr/>
+          <p:nvPr/>
+        </p:nvSpPr>
+        <p:spPr>
+          <a:xfrm>
+            <a:off x="5440351" y="394890"/>
+            <a:ext cx="6245621" cy="584775"/>
+          </a:xfrm>
+          <a:prstGeom prst="rect">
+            <a:avLst/>
+          </a:prstGeom>
+        </p:spPr>
+        <p:txBody>
+          <a:bodyPr wrap="none">
+            <a:spAutoFit/>
+          </a:bodyPr>
+          <a:lstStyle/>
+          <a:p>
+            <a:r>
+              <a:rPr lang="fr-FR" sz="3200" dirty="0">
+                <a:hlinkClick r:id="rId2"/>
+              </a:rPr>
+              <a:t>https://course.fast.ai/start_gcp.html</a:t>
+            </a:r>
+            <a:endParaRPr lang="fr-FR" sz="3200" dirty="0"/>
+          </a:p>
+        </p:txBody>
+      </p:sp>
+      <p:sp>
+        <p:nvSpPr>
+          <p:cNvPr id="3" name="ZoneTexte 2">
+            <a:extLst>
+              <a:ext uri="{FF2B5EF4-FFF2-40B4-BE49-F238E27FC236}">
+                <a16:creationId xmlns:a16="http://schemas.microsoft.com/office/drawing/2014/main" id="{579CB3FE-4FB2-4415-B1BA-6D0C957B2A81}"/>
+              </a:ext>
+            </a:extLst>
+          </p:cNvPr>
+          <p:cNvSpPr txBox="1"/>
+          <p:nvPr/>
+        </p:nvSpPr>
+        <p:spPr>
+          <a:xfrm>
+            <a:off x="506028" y="328474"/>
+            <a:ext cx="4622997" cy="707886"/>
+          </a:xfrm>
+          <a:prstGeom prst="rect">
+            <a:avLst/>
+          </a:prstGeom>
+          <a:noFill/>
+        </p:spPr>
+        <p:txBody>
+          <a:bodyPr wrap="none" rtlCol="0">
+            <a:spAutoFit/>
+          </a:bodyPr>
+          <a:lstStyle/>
+          <a:p>
+            <a:r>
+              <a:rPr lang="fr-FR" sz="4000" b="1" dirty="0"/>
+              <a:t>Option Google Cloud</a:t>
+            </a:r>
+          </a:p>
+        </p:txBody>
+      </p:sp>
+      <p:sp>
+        <p:nvSpPr>
+          <p:cNvPr id="4" name="Rectangle 3">
+            <a:extLst>
+              <a:ext uri="{FF2B5EF4-FFF2-40B4-BE49-F238E27FC236}">
+                <a16:creationId xmlns:a16="http://schemas.microsoft.com/office/drawing/2014/main" id="{BAC61827-57DE-49F1-8805-80C4CDB59158}"/>
+              </a:ext>
+            </a:extLst>
+          </p:cNvPr>
+          <p:cNvSpPr/>
+          <p:nvPr/>
+        </p:nvSpPr>
+        <p:spPr>
+          <a:xfrm>
+            <a:off x="506028" y="3586920"/>
+            <a:ext cx="7311804" cy="2970044"/>
+          </a:xfrm>
+          <a:prstGeom prst="rect">
+            <a:avLst/>
+          </a:prstGeom>
+        </p:spPr>
+        <p:txBody>
+          <a:bodyPr wrap="square">
+            <a:spAutoFit/>
+          </a:bodyPr>
+          <a:lstStyle/>
+          <a:p>
+            <a:r>
+              <a:rPr lang="fr-FR" sz="1100" dirty="0">
+                <a:latin typeface="Courier New" panose="02070309020205020404" pitchFamily="49" charset="0"/>
+                <a:cs typeface="Courier New" panose="02070309020205020404" pitchFamily="49" charset="0"/>
+              </a:rPr>
+              <a:t>export IMAGE_FAMILY="</a:t>
+            </a:r>
+            <a:r>
+              <a:rPr lang="fr-FR" sz="1100" dirty="0" err="1">
+                <a:latin typeface="Courier New" panose="02070309020205020404" pitchFamily="49" charset="0"/>
+                <a:cs typeface="Courier New" panose="02070309020205020404" pitchFamily="49" charset="0"/>
+              </a:rPr>
+              <a:t>pytorch-latest-gpu</a:t>
+            </a:r>
+            <a:r>
+              <a:rPr lang="fr-FR" sz="1100" dirty="0">
+                <a:latin typeface="Courier New" panose="02070309020205020404" pitchFamily="49" charset="0"/>
+                <a:cs typeface="Courier New" panose="02070309020205020404" pitchFamily="49" charset="0"/>
+              </a:rPr>
+              <a:t>"</a:t>
+            </a:r>
+          </a:p>
+          <a:p>
+            <a:r>
+              <a:rPr lang="fr-FR" sz="1100" dirty="0">
+                <a:latin typeface="Courier New" panose="02070309020205020404" pitchFamily="49" charset="0"/>
+                <a:cs typeface="Courier New" panose="02070309020205020404" pitchFamily="49" charset="0"/>
+              </a:rPr>
+              <a:t>export ZONE="europe-west4-b"</a:t>
+            </a:r>
+          </a:p>
+          <a:p>
+            <a:r>
+              <a:rPr lang="fr-FR" sz="1100" dirty="0">
+                <a:latin typeface="Courier New" panose="02070309020205020404" pitchFamily="49" charset="0"/>
+                <a:cs typeface="Courier New" panose="02070309020205020404" pitchFamily="49" charset="0"/>
+              </a:rPr>
+              <a:t>export INSTANCE_NAME="fastaiv2"</a:t>
+            </a:r>
+          </a:p>
+          <a:p>
+            <a:r>
+              <a:rPr lang="fr-FR" sz="1100" dirty="0">
+                <a:latin typeface="Courier New" panose="02070309020205020404" pitchFamily="49" charset="0"/>
+                <a:cs typeface="Courier New" panose="02070309020205020404" pitchFamily="49" charset="0"/>
+              </a:rPr>
+              <a:t>export INSTANCE_TYPE="n1-highmem-8"</a:t>
+            </a:r>
+          </a:p>
+          <a:p>
+            <a:endParaRPr lang="fr-FR" sz="1100" dirty="0">
+              <a:latin typeface="Courier New" panose="02070309020205020404" pitchFamily="49" charset="0"/>
+              <a:cs typeface="Courier New" panose="02070309020205020404" pitchFamily="49" charset="0"/>
+            </a:endParaRPr>
+          </a:p>
+          <a:p>
+            <a:r>
+              <a:rPr lang="fr-FR" sz="1100" dirty="0" err="1">
+                <a:latin typeface="Courier New" panose="02070309020205020404" pitchFamily="49" charset="0"/>
+                <a:cs typeface="Courier New" panose="02070309020205020404" pitchFamily="49" charset="0"/>
+              </a:rPr>
+              <a:t>gcloud</a:t>
+            </a:r>
+            <a:r>
+              <a:rPr lang="fr-FR" sz="1100" dirty="0">
+                <a:latin typeface="Courier New" panose="02070309020205020404" pitchFamily="49" charset="0"/>
+                <a:cs typeface="Courier New" panose="02070309020205020404" pitchFamily="49" charset="0"/>
+              </a:rPr>
+              <a:t> </a:t>
+            </a:r>
+            <a:r>
+              <a:rPr lang="fr-FR" sz="1100" dirty="0" err="1">
+                <a:latin typeface="Courier New" panose="02070309020205020404" pitchFamily="49" charset="0"/>
+                <a:cs typeface="Courier New" panose="02070309020205020404" pitchFamily="49" charset="0"/>
+              </a:rPr>
+              <a:t>compute</a:t>
+            </a:r>
+            <a:r>
+              <a:rPr lang="fr-FR" sz="1100" dirty="0">
+                <a:latin typeface="Courier New" panose="02070309020205020404" pitchFamily="49" charset="0"/>
+                <a:cs typeface="Courier New" panose="02070309020205020404" pitchFamily="49" charset="0"/>
+              </a:rPr>
+              <a:t> instances </a:t>
+            </a:r>
+            <a:r>
+              <a:rPr lang="fr-FR" sz="1100" dirty="0" err="1">
+                <a:latin typeface="Courier New" panose="02070309020205020404" pitchFamily="49" charset="0"/>
+                <a:cs typeface="Courier New" panose="02070309020205020404" pitchFamily="49" charset="0"/>
+              </a:rPr>
+              <a:t>create</a:t>
+            </a:r>
+            <a:r>
+              <a:rPr lang="fr-FR" sz="1100" dirty="0">
+                <a:latin typeface="Courier New" panose="02070309020205020404" pitchFamily="49" charset="0"/>
+                <a:cs typeface="Courier New" panose="02070309020205020404" pitchFamily="49" charset="0"/>
+              </a:rPr>
+              <a:t> $INSTANCE_NAME \</a:t>
+            </a:r>
+          </a:p>
+          <a:p>
+            <a:r>
+              <a:rPr lang="fr-FR" sz="1100" dirty="0">
+                <a:latin typeface="Courier New" panose="02070309020205020404" pitchFamily="49" charset="0"/>
+                <a:cs typeface="Courier New" panose="02070309020205020404" pitchFamily="49" charset="0"/>
+              </a:rPr>
+              <a:t>        --zone=$ZONE \</a:t>
+            </a:r>
+          </a:p>
+          <a:p>
+            <a:r>
+              <a:rPr lang="fr-FR" sz="1100" dirty="0">
+                <a:latin typeface="Courier New" panose="02070309020205020404" pitchFamily="49" charset="0"/>
+                <a:cs typeface="Courier New" panose="02070309020205020404" pitchFamily="49" charset="0"/>
+              </a:rPr>
+              <a:t>        --image-</a:t>
+            </a:r>
+            <a:r>
+              <a:rPr lang="fr-FR" sz="1100" dirty="0" err="1">
+                <a:latin typeface="Courier New" panose="02070309020205020404" pitchFamily="49" charset="0"/>
+                <a:cs typeface="Courier New" panose="02070309020205020404" pitchFamily="49" charset="0"/>
+              </a:rPr>
+              <a:t>family</a:t>
+            </a:r>
+            <a:r>
+              <a:rPr lang="fr-FR" sz="1100" dirty="0">
+                <a:latin typeface="Courier New" panose="02070309020205020404" pitchFamily="49" charset="0"/>
+                <a:cs typeface="Courier New" panose="02070309020205020404" pitchFamily="49" charset="0"/>
+              </a:rPr>
+              <a:t>=$IMAGE_FAMILY \</a:t>
+            </a:r>
+          </a:p>
+          <a:p>
+            <a:r>
+              <a:rPr lang="fr-FR" sz="1100" dirty="0">
+                <a:latin typeface="Courier New" panose="02070309020205020404" pitchFamily="49" charset="0"/>
+                <a:cs typeface="Courier New" panose="02070309020205020404" pitchFamily="49" charset="0"/>
+              </a:rPr>
+              <a:t>        --image-</a:t>
+            </a:r>
+            <a:r>
+              <a:rPr lang="fr-FR" sz="1100" dirty="0" err="1">
+                <a:latin typeface="Courier New" panose="02070309020205020404" pitchFamily="49" charset="0"/>
+                <a:cs typeface="Courier New" panose="02070309020205020404" pitchFamily="49" charset="0"/>
+              </a:rPr>
+              <a:t>project</a:t>
+            </a:r>
+            <a:r>
+              <a:rPr lang="fr-FR" sz="1100" dirty="0">
+                <a:latin typeface="Courier New" panose="02070309020205020404" pitchFamily="49" charset="0"/>
+                <a:cs typeface="Courier New" panose="02070309020205020404" pitchFamily="49" charset="0"/>
+              </a:rPr>
+              <a:t>=</a:t>
+            </a:r>
+            <a:r>
+              <a:rPr lang="fr-FR" sz="1100" dirty="0" err="1">
+                <a:latin typeface="Courier New" panose="02070309020205020404" pitchFamily="49" charset="0"/>
+                <a:cs typeface="Courier New" panose="02070309020205020404" pitchFamily="49" charset="0"/>
+              </a:rPr>
+              <a:t>deeplearning</a:t>
+            </a:r>
+            <a:r>
+              <a:rPr lang="fr-FR" sz="1100" dirty="0">
+                <a:latin typeface="Courier New" panose="02070309020205020404" pitchFamily="49" charset="0"/>
+                <a:cs typeface="Courier New" panose="02070309020205020404" pitchFamily="49" charset="0"/>
+              </a:rPr>
+              <a:t>-platform-release \</a:t>
+            </a:r>
+          </a:p>
+          <a:p>
+            <a:r>
+              <a:rPr lang="fr-FR" sz="1100" dirty="0">
+                <a:latin typeface="Courier New" panose="02070309020205020404" pitchFamily="49" charset="0"/>
+                <a:cs typeface="Courier New" panose="02070309020205020404" pitchFamily="49" charset="0"/>
+              </a:rPr>
+              <a:t>        --maintenance-</a:t>
+            </a:r>
+            <a:r>
+              <a:rPr lang="fr-FR" sz="1100" dirty="0" err="1">
+                <a:latin typeface="Courier New" panose="02070309020205020404" pitchFamily="49" charset="0"/>
+                <a:cs typeface="Courier New" panose="02070309020205020404" pitchFamily="49" charset="0"/>
+              </a:rPr>
+              <a:t>policy</a:t>
+            </a:r>
+            <a:r>
+              <a:rPr lang="fr-FR" sz="1100" dirty="0">
+                <a:latin typeface="Courier New" panose="02070309020205020404" pitchFamily="49" charset="0"/>
+                <a:cs typeface="Courier New" panose="02070309020205020404" pitchFamily="49" charset="0"/>
+              </a:rPr>
+              <a:t>=TERMINATE \</a:t>
+            </a:r>
+          </a:p>
+          <a:p>
+            <a:r>
+              <a:rPr lang="fr-FR" sz="1100" dirty="0">
+                <a:latin typeface="Courier New" panose="02070309020205020404" pitchFamily="49" charset="0"/>
+                <a:cs typeface="Courier New" panose="02070309020205020404" pitchFamily="49" charset="0"/>
+              </a:rPr>
+              <a:t>        --</a:t>
+            </a:r>
+            <a:r>
+              <a:rPr lang="fr-FR" sz="1100" dirty="0" err="1">
+                <a:latin typeface="Courier New" panose="02070309020205020404" pitchFamily="49" charset="0"/>
+                <a:cs typeface="Courier New" panose="02070309020205020404" pitchFamily="49" charset="0"/>
+              </a:rPr>
+              <a:t>accelerator</a:t>
+            </a:r>
+            <a:r>
+              <a:rPr lang="fr-FR" sz="1100" dirty="0">
+                <a:latin typeface="Courier New" panose="02070309020205020404" pitchFamily="49" charset="0"/>
+                <a:cs typeface="Courier New" panose="02070309020205020404" pitchFamily="49" charset="0"/>
+              </a:rPr>
+              <a:t>="type=nvidia-tesla-t4,count=1" \</a:t>
+            </a:r>
+          </a:p>
+          <a:p>
+            <a:r>
+              <a:rPr lang="fr-FR" sz="1100" dirty="0">
+                <a:latin typeface="Courier New" panose="02070309020205020404" pitchFamily="49" charset="0"/>
+                <a:cs typeface="Courier New" panose="02070309020205020404" pitchFamily="49" charset="0"/>
+              </a:rPr>
+              <a:t>        --machine-type=$INSTANCE_TYPE \</a:t>
+            </a:r>
+          </a:p>
+          <a:p>
+            <a:r>
+              <a:rPr lang="fr-FR" sz="1100" dirty="0">
+                <a:latin typeface="Courier New" panose="02070309020205020404" pitchFamily="49" charset="0"/>
+                <a:cs typeface="Courier New" panose="02070309020205020404" pitchFamily="49" charset="0"/>
+              </a:rPr>
+              <a:t>        --boot-</a:t>
+            </a:r>
+            <a:r>
+              <a:rPr lang="fr-FR" sz="1100" dirty="0" err="1">
+                <a:latin typeface="Courier New" panose="02070309020205020404" pitchFamily="49" charset="0"/>
+                <a:cs typeface="Courier New" panose="02070309020205020404" pitchFamily="49" charset="0"/>
+              </a:rPr>
+              <a:t>disk</a:t>
+            </a:r>
+            <a:r>
+              <a:rPr lang="fr-FR" sz="1100" dirty="0">
+                <a:latin typeface="Courier New" panose="02070309020205020404" pitchFamily="49" charset="0"/>
+                <a:cs typeface="Courier New" panose="02070309020205020404" pitchFamily="49" charset="0"/>
+              </a:rPr>
+              <a:t>-size=200GB \</a:t>
+            </a:r>
+          </a:p>
+          <a:p>
+            <a:r>
+              <a:rPr lang="fr-FR" sz="1100" dirty="0">
+                <a:latin typeface="Courier New" panose="02070309020205020404" pitchFamily="49" charset="0"/>
+                <a:cs typeface="Courier New" panose="02070309020205020404" pitchFamily="49" charset="0"/>
+              </a:rPr>
+              <a:t>        --</a:t>
+            </a:r>
+            <a:r>
+              <a:rPr lang="fr-FR" sz="1100" dirty="0" err="1">
+                <a:latin typeface="Courier New" panose="02070309020205020404" pitchFamily="49" charset="0"/>
+                <a:cs typeface="Courier New" panose="02070309020205020404" pitchFamily="49" charset="0"/>
+              </a:rPr>
+              <a:t>metadata</a:t>
+            </a:r>
+            <a:r>
+              <a:rPr lang="fr-FR" sz="1100" dirty="0">
+                <a:latin typeface="Courier New" panose="02070309020205020404" pitchFamily="49" charset="0"/>
+                <a:cs typeface="Courier New" panose="02070309020205020404" pitchFamily="49" charset="0"/>
+              </a:rPr>
+              <a:t>="</a:t>
+            </a:r>
+            <a:r>
+              <a:rPr lang="fr-FR" sz="1100" dirty="0" err="1">
+                <a:latin typeface="Courier New" panose="02070309020205020404" pitchFamily="49" charset="0"/>
+                <a:cs typeface="Courier New" panose="02070309020205020404" pitchFamily="49" charset="0"/>
+              </a:rPr>
+              <a:t>install</a:t>
+            </a:r>
+            <a:r>
+              <a:rPr lang="fr-FR" sz="1100" dirty="0">
+                <a:latin typeface="Courier New" panose="02070309020205020404" pitchFamily="49" charset="0"/>
+                <a:cs typeface="Courier New" panose="02070309020205020404" pitchFamily="49" charset="0"/>
+              </a:rPr>
+              <a:t>-</a:t>
+            </a:r>
+            <a:r>
+              <a:rPr lang="fr-FR" sz="1100" dirty="0" err="1">
+                <a:latin typeface="Courier New" panose="02070309020205020404" pitchFamily="49" charset="0"/>
+                <a:cs typeface="Courier New" panose="02070309020205020404" pitchFamily="49" charset="0"/>
+              </a:rPr>
+              <a:t>nvidia</a:t>
+            </a:r>
+            <a:r>
+              <a:rPr lang="fr-FR" sz="1100" dirty="0">
+                <a:latin typeface="Courier New" panose="02070309020205020404" pitchFamily="49" charset="0"/>
+                <a:cs typeface="Courier New" panose="02070309020205020404" pitchFamily="49" charset="0"/>
+              </a:rPr>
+              <a:t>-driver=</a:t>
+            </a:r>
+            <a:r>
+              <a:rPr lang="fr-FR" sz="1100" dirty="0" err="1">
+                <a:latin typeface="Courier New" panose="02070309020205020404" pitchFamily="49" charset="0"/>
+                <a:cs typeface="Courier New" panose="02070309020205020404" pitchFamily="49" charset="0"/>
+              </a:rPr>
+              <a:t>True</a:t>
+            </a:r>
+            <a:r>
+              <a:rPr lang="fr-FR" sz="1100" dirty="0">
+                <a:latin typeface="Courier New" panose="02070309020205020404" pitchFamily="49" charset="0"/>
+                <a:cs typeface="Courier New" panose="02070309020205020404" pitchFamily="49" charset="0"/>
+              </a:rPr>
+              <a:t>" </a:t>
+            </a:r>
+            <a:r>
+              <a:rPr lang="fr-FR" sz="1100" dirty="0">
+                <a:solidFill>
+                  <a:srgbClr val="00B050"/>
+                </a:solidFill>
+                <a:latin typeface="Courier New" panose="02070309020205020404" pitchFamily="49" charset="0"/>
+                <a:cs typeface="Courier New" panose="02070309020205020404" pitchFamily="49" charset="0"/>
+              </a:rPr>
+              <a:t>\</a:t>
+            </a:r>
+          </a:p>
+          <a:p>
+            <a:r>
+              <a:rPr lang="fr-FR" sz="1100" dirty="0">
+                <a:solidFill>
+                  <a:srgbClr val="00B050"/>
+                </a:solidFill>
+                <a:latin typeface="Courier New" panose="02070309020205020404" pitchFamily="49" charset="0"/>
+                <a:cs typeface="Courier New" panose="02070309020205020404" pitchFamily="49" charset="0"/>
+              </a:rPr>
+              <a:t>        --</a:t>
+            </a:r>
+            <a:r>
+              <a:rPr lang="fr-FR" sz="1100" dirty="0" err="1">
+                <a:solidFill>
+                  <a:srgbClr val="00B050"/>
+                </a:solidFill>
+                <a:latin typeface="Courier New" panose="02070309020205020404" pitchFamily="49" charset="0"/>
+                <a:cs typeface="Courier New" panose="02070309020205020404" pitchFamily="49" charset="0"/>
+              </a:rPr>
+              <a:t>preemptible</a:t>
+            </a:r>
+            <a:endParaRPr lang="fr-FR" sz="1100" dirty="0">
+              <a:solidFill>
+                <a:srgbClr val="00B050"/>
+              </a:solidFill>
+              <a:latin typeface="Courier New" panose="02070309020205020404" pitchFamily="49" charset="0"/>
+              <a:cs typeface="Courier New" panose="02070309020205020404" pitchFamily="49" charset="0"/>
+            </a:endParaRPr>
+          </a:p>
+          <a:p>
+            <a:endParaRPr lang="fr-FR" sz="1100" dirty="0">
+              <a:latin typeface="Courier New" panose="02070309020205020404" pitchFamily="49" charset="0"/>
+              <a:cs typeface="Courier New" panose="02070309020205020404" pitchFamily="49" charset="0"/>
+            </a:endParaRPr>
+          </a:p>
+          <a:p>
+            <a:r>
+              <a:rPr lang="fr-FR" sz="1100" dirty="0" err="1">
+                <a:latin typeface="Courier New" panose="02070309020205020404" pitchFamily="49" charset="0"/>
+                <a:cs typeface="Courier New" panose="02070309020205020404" pitchFamily="49" charset="0"/>
+              </a:rPr>
+              <a:t>gcloud</a:t>
+            </a:r>
+            <a:r>
+              <a:rPr lang="fr-FR" sz="1100" dirty="0">
+                <a:latin typeface="Courier New" panose="02070309020205020404" pitchFamily="49" charset="0"/>
+                <a:cs typeface="Courier New" panose="02070309020205020404" pitchFamily="49" charset="0"/>
+              </a:rPr>
+              <a:t> </a:t>
+            </a:r>
+            <a:r>
+              <a:rPr lang="fr-FR" sz="1100" dirty="0" err="1">
+                <a:latin typeface="Courier New" panose="02070309020205020404" pitchFamily="49" charset="0"/>
+                <a:cs typeface="Courier New" panose="02070309020205020404" pitchFamily="49" charset="0"/>
+              </a:rPr>
+              <a:t>compute</a:t>
+            </a:r>
+            <a:r>
+              <a:rPr lang="fr-FR" sz="1100" dirty="0">
+                <a:latin typeface="Courier New" panose="02070309020205020404" pitchFamily="49" charset="0"/>
+                <a:cs typeface="Courier New" panose="02070309020205020404" pitchFamily="49" charset="0"/>
+              </a:rPr>
+              <a:t> </a:t>
+            </a:r>
+            <a:r>
+              <a:rPr lang="fr-FR" sz="1100" dirty="0" err="1">
+                <a:latin typeface="Courier New" panose="02070309020205020404" pitchFamily="49" charset="0"/>
+                <a:cs typeface="Courier New" panose="02070309020205020404" pitchFamily="49" charset="0"/>
+              </a:rPr>
+              <a:t>ssh</a:t>
+            </a:r>
+            <a:r>
+              <a:rPr lang="fr-FR" sz="1100" dirty="0">
+                <a:latin typeface="Courier New" panose="02070309020205020404" pitchFamily="49" charset="0"/>
+                <a:cs typeface="Courier New" panose="02070309020205020404" pitchFamily="49" charset="0"/>
+              </a:rPr>
+              <a:t> --zone=$ZONE </a:t>
+            </a:r>
+            <a:r>
+              <a:rPr lang="fr-FR" sz="1100" dirty="0" err="1">
+                <a:latin typeface="Courier New" panose="02070309020205020404" pitchFamily="49" charset="0"/>
+                <a:cs typeface="Courier New" panose="02070309020205020404" pitchFamily="49" charset="0"/>
+              </a:rPr>
+              <a:t>jupyter</a:t>
+            </a:r>
+            <a:r>
+              <a:rPr lang="fr-FR" sz="1100" dirty="0">
+                <a:latin typeface="Courier New" panose="02070309020205020404" pitchFamily="49" charset="0"/>
+                <a:cs typeface="Courier New" panose="02070309020205020404" pitchFamily="49" charset="0"/>
+              </a:rPr>
+              <a:t>@$INSTANCE_NAME -- -L 8080:localhost:8080</a:t>
+            </a:r>
+          </a:p>
+        </p:txBody>
+      </p:sp>
+      <p:sp>
+        <p:nvSpPr>
+          <p:cNvPr id="5" name="Rectangle 4">
+            <a:extLst>
+              <a:ext uri="{FF2B5EF4-FFF2-40B4-BE49-F238E27FC236}">
+                <a16:creationId xmlns:a16="http://schemas.microsoft.com/office/drawing/2014/main" id="{79484E6A-8FB1-48C5-BB6C-0A769EE0D38E}"/>
+              </a:ext>
+            </a:extLst>
+          </p:cNvPr>
+          <p:cNvSpPr/>
+          <p:nvPr/>
+        </p:nvSpPr>
+        <p:spPr>
+          <a:xfrm>
+            <a:off x="6220287" y="2986755"/>
+            <a:ext cx="6096000" cy="1200329"/>
+          </a:xfrm>
+          <a:prstGeom prst="rect">
+            <a:avLst/>
+          </a:prstGeom>
+        </p:spPr>
+        <p:txBody>
+          <a:bodyPr>
+            <a:spAutoFit/>
+          </a:bodyPr>
+          <a:lstStyle/>
+          <a:p>
+            <a:r>
+              <a:rPr lang="fr-FR" dirty="0"/>
+              <a:t>europe-west4-b</a:t>
+            </a:r>
+          </a:p>
+          <a:p>
+            <a:endParaRPr lang="fr-FR" dirty="0"/>
+          </a:p>
+          <a:p>
+            <a:r>
+              <a:rPr lang="fr-FR" dirty="0"/>
+              <a:t>n1-highmem-8	8	52 Go	$0.5212	$0.10990</a:t>
+            </a:r>
+          </a:p>
+          <a:p>
+            <a:r>
+              <a:rPr lang="fr-FR" dirty="0"/>
+              <a:t>NVIDIA® Tesla® T4		16 Go 	$0.35 	$0.11 </a:t>
+            </a:r>
+          </a:p>
+        </p:txBody>
+      </p:sp>
+      <p:sp>
+        <p:nvSpPr>
+          <p:cNvPr id="6" name="ZoneTexte 5">
+            <a:extLst>
+              <a:ext uri="{FF2B5EF4-FFF2-40B4-BE49-F238E27FC236}">
+                <a16:creationId xmlns:a16="http://schemas.microsoft.com/office/drawing/2014/main" id="{C4A6F4E2-F89E-4386-AC76-1DD2A1A47276}"/>
+              </a:ext>
+            </a:extLst>
+          </p:cNvPr>
+          <p:cNvSpPr txBox="1"/>
+          <p:nvPr/>
+        </p:nvSpPr>
+        <p:spPr>
+          <a:xfrm>
+            <a:off x="8968059" y="4556415"/>
+            <a:ext cx="2584747" cy="1200329"/>
+          </a:xfrm>
+          <a:prstGeom prst="rect">
+            <a:avLst/>
+          </a:prstGeom>
+          <a:noFill/>
+        </p:spPr>
+        <p:txBody>
+          <a:bodyPr wrap="none" rtlCol="0">
+            <a:spAutoFit/>
+          </a:bodyPr>
+          <a:lstStyle/>
+          <a:p>
+            <a:r>
+              <a:rPr lang="fr-FR" dirty="0"/>
+              <a:t>300$ free </a:t>
+            </a:r>
+            <a:r>
+              <a:rPr lang="fr-FR" dirty="0" err="1"/>
+              <a:t>credits</a:t>
+            </a:r>
+            <a:r>
+              <a:rPr lang="fr-FR" dirty="0"/>
+              <a:t> =</a:t>
+            </a:r>
+          </a:p>
+          <a:p>
+            <a:pPr marL="285750" indent="-285750">
+              <a:buFont typeface="Arial" panose="020B0604020202020204" pitchFamily="34" charset="0"/>
+              <a:buChar char="•"/>
+            </a:pPr>
+            <a:r>
+              <a:rPr lang="fr-FR" dirty="0"/>
+              <a:t>47h </a:t>
+            </a:r>
+            <a:r>
+              <a:rPr lang="fr-FR" dirty="0" err="1"/>
+              <a:t>compute</a:t>
+            </a:r>
+            <a:r>
+              <a:rPr lang="fr-FR" dirty="0"/>
+              <a:t> par mois</a:t>
+            </a:r>
+          </a:p>
+          <a:p>
+            <a:pPr marL="285750" indent="-285750">
+              <a:buFont typeface="Arial" panose="020B0604020202020204" pitchFamily="34" charset="0"/>
+              <a:buChar char="•"/>
+            </a:pPr>
+            <a:r>
+              <a:rPr lang="fr-FR" dirty="0"/>
+              <a:t>Plus stockage</a:t>
+            </a:r>
+          </a:p>
+          <a:p>
+            <a:pPr marL="285750" indent="-285750">
+              <a:buFont typeface="Arial" panose="020B0604020202020204" pitchFamily="34" charset="0"/>
+              <a:buChar char="•"/>
+            </a:pPr>
+            <a:r>
+              <a:rPr lang="fr-FR" dirty="0"/>
+              <a:t>Pendant 6 mois</a:t>
+            </a:r>
+          </a:p>
+        </p:txBody>
+      </p:sp>
+      <p:pic>
+        <p:nvPicPr>
+          <p:cNvPr id="7" name="Image 6">
+            <a:extLst>
+              <a:ext uri="{FF2B5EF4-FFF2-40B4-BE49-F238E27FC236}">
+                <a16:creationId xmlns:a16="http://schemas.microsoft.com/office/drawing/2014/main" id="{B1D892D9-2204-4872-883B-431795ABC16E}"/>
+              </a:ext>
+            </a:extLst>
+          </p:cNvPr>
+          <p:cNvPicPr>
+            <a:picLocks noChangeAspect="1"/>
+          </p:cNvPicPr>
+          <p:nvPr/>
+        </p:nvPicPr>
+        <p:blipFill>
+          <a:blip r:embed="rId3" cstate="email">
+            <a:extLst>
+              <a:ext uri="{28A0092B-C50C-407E-A947-70E740481C1C}">
+                <a14:useLocalDpi xmlns:a14="http://schemas.microsoft.com/office/drawing/2010/main"/>
+              </a:ext>
+            </a:extLst>
+          </a:blip>
+          <a:stretch>
+            <a:fillRect/>
+          </a:stretch>
+        </p:blipFill>
+        <p:spPr>
+          <a:xfrm>
+            <a:off x="631199" y="1245473"/>
+            <a:ext cx="7186633" cy="2077623"/>
           </a:xfrm>
           <a:prstGeom prst="rect">
             <a:avLst/>

</xml_diff>

<commit_message>
mise à jour fastcore également
</commit_message>
<xml_diff>
--- a/slides/00_environnement.pptx
+++ b/slides/00_environnement.pptx
@@ -5804,7 +5804,7 @@
         </p:blipFill>
         <p:spPr>
           <a:xfrm>
-            <a:off x="602309" y="2408470"/>
+            <a:off x="602309" y="2821709"/>
             <a:ext cx="8835634" cy="2592948"/>
           </a:xfrm>
           <a:prstGeom prst="rect">
@@ -5827,7 +5827,7 @@
         <p:spPr>
           <a:xfrm>
             <a:off x="602309" y="613008"/>
-            <a:ext cx="9985479" cy="1572418"/>
+            <a:ext cx="9985479" cy="1984518"/>
           </a:xfrm>
           <a:prstGeom prst="rect">
             <a:avLst/>
@@ -5871,10 +5871,50 @@
             </a:pPr>
             <a:r>
               <a:rPr lang="fr-FR" dirty="0" err="1"/>
+              <a:t>p</a:t>
+            </a:r>
+            <a:r>
+              <a:rPr lang="fr-FR" dirty="0" err="1" smtClean="0"/>
+              <a:t>ip</a:t>
+            </a:r>
+            <a:r>
+              <a:rPr lang="fr-FR" dirty="0" smtClean="0"/>
+              <a:t> </a:t>
+            </a:r>
+            <a:r>
+              <a:rPr lang="fr-FR" dirty="0" err="1" smtClean="0"/>
+              <a:t>install</a:t>
+            </a:r>
+            <a:r>
+              <a:rPr lang="fr-FR" dirty="0" smtClean="0"/>
+              <a:t> </a:t>
+            </a:r>
+            <a:r>
+              <a:rPr lang="fr-FR" dirty="0" err="1" smtClean="0"/>
+              <a:t>fastcore</a:t>
+            </a:r>
+            <a:r>
+              <a:rPr lang="fr-FR" dirty="0" smtClean="0"/>
+              <a:t> --upgrade</a:t>
+            </a:r>
+          </a:p>
+          <a:p>
+            <a:pPr marL="342900" indent="-342900">
+              <a:lnSpc>
+                <a:spcPct val="107000"/>
+              </a:lnSpc>
+              <a:spcAft>
+                <a:spcPts val="800"/>
+              </a:spcAft>
+              <a:buFont typeface="Wingdings" panose="05000000000000000000" pitchFamily="2" charset="2"/>
+              <a:buChar char="§"/>
+            </a:pPr>
+            <a:r>
+              <a:rPr lang="fr-FR" dirty="0" err="1" smtClean="0"/>
               <a:t>pip</a:t>
             </a:r>
             <a:r>
-              <a:rPr lang="fr-FR" dirty="0"/>
+              <a:rPr lang="fr-FR" dirty="0" smtClean="0"/>
               <a:t> </a:t>
             </a:r>
             <a:r>
@@ -5950,7 +5990,7 @@
         </p:blipFill>
         <p:spPr>
           <a:xfrm>
-            <a:off x="602309" y="5224462"/>
+            <a:off x="602309" y="5637701"/>
             <a:ext cx="8725948" cy="759243"/>
           </a:xfrm>
           <a:prstGeom prst="rect">

</xml_diff>